<commit_message>
fix: add Command Create to Aula 5
</commit_message>
<xml_diff>
--- a/Aula 5/ComandosDDL.pptx
+++ b/Aula 5/ComandosDDL.pptx
@@ -4,17 +4,21 @@
   <p:sldMasterIdLst>
     <p:sldMasterId id="2147483648" r:id="rId1"/>
   </p:sldMasterIdLst>
+  <p:notesMasterIdLst>
+    <p:notesMasterId r:id="rId13"/>
+  </p:notesMasterIdLst>
   <p:sldIdLst>
     <p:sldId id="256" r:id="rId2"/>
     <p:sldId id="263" r:id="rId3"/>
     <p:sldId id="258" r:id="rId4"/>
-    <p:sldId id="260" r:id="rId5"/>
-    <p:sldId id="264" r:id="rId6"/>
-    <p:sldId id="259" r:id="rId7"/>
-    <p:sldId id="261" r:id="rId8"/>
-    <p:sldId id="262" r:id="rId9"/>
-    <p:sldId id="265" r:id="rId10"/>
-    <p:sldId id="275" r:id="rId11"/>
+    <p:sldId id="276" r:id="rId5"/>
+    <p:sldId id="260" r:id="rId6"/>
+    <p:sldId id="264" r:id="rId7"/>
+    <p:sldId id="259" r:id="rId8"/>
+    <p:sldId id="261" r:id="rId9"/>
+    <p:sldId id="262" r:id="rId10"/>
+    <p:sldId id="265" r:id="rId11"/>
+    <p:sldId id="275" r:id="rId12"/>
   </p:sldIdLst>
   <p:sldSz cx="12192000" cy="6858000"/>
   <p:notesSz cx="6858000" cy="9144000"/>
@@ -113,38 +117,15 @@
       </a:defRPr>
     </a:lvl9pPr>
   </p:defaultTextStyle>
+  <p:extLst>
+    <p:ext uri="{EFAFB233-063F-42B5-8137-9DF3F51BA10A}">
+      <p15:sldGuideLst xmlns:p15="http://schemas.microsoft.com/office/powerpoint/2012/main"/>
+    </p:ext>
+  </p:extLst>
 </p:presentation>
 </file>
 
 <file path=ppt/ink/ink1.xml><?xml version="1.0" encoding="utf-8"?>
-<inkml:ink xmlns:inkml="http://www.w3.org/2003/InkML">
-  <inkml:definitions>
-    <inkml:context xml:id="ctx0">
-      <inkml:inkSource xml:id="inkSrc0">
-        <inkml:traceFormat>
-          <inkml:channel name="X" type="integer" min="-2.14748E9" max="2.14748E9" units="cm"/>
-          <inkml:channel name="Y" type="integer" min="-2.14748E9" max="2.14748E9" units="cm"/>
-          <inkml:channel name="F" type="integer" max="32767" units="dev"/>
-        </inkml:traceFormat>
-        <inkml:channelProperties>
-          <inkml:channelProperty channel="X" name="resolution" value="1000" units="1/cm"/>
-          <inkml:channelProperty channel="Y" name="resolution" value="1000" units="1/cm"/>
-          <inkml:channelProperty channel="F" name="resolution" value="0" units="1/dev"/>
-        </inkml:channelProperties>
-      </inkml:inkSource>
-      <inkml:timestamp xml:id="ts0" timeString="2025-07-21T21:57:40.699"/>
-    </inkml:context>
-    <inkml:brush xml:id="br0">
-      <inkml:brushProperty name="width" value="0.035" units="cm"/>
-      <inkml:brushProperty name="height" value="0.035" units="cm"/>
-      <inkml:brushProperty name="color" value="#E71224"/>
-    </inkml:brush>
-  </inkml:definitions>
-  <inkml:trace contextRef="#ctx0" brushRef="#br0">1 0 24438,'4810'48'0</inkml:trace>
-</inkml:ink>
-</file>
-
-<file path=ppt/ink/ink2.xml><?xml version="1.0" encoding="utf-8"?>
 <inkml:ink xmlns:inkml="http://www.w3.org/2003/InkML">
   <inkml:definitions>
     <inkml:context xml:id="ctx0">
@@ -172,7 +153,7 @@
 </inkml:ink>
 </file>
 
-<file path=ppt/ink/ink3.xml><?xml version="1.0" encoding="utf-8"?>
+<file path=ppt/ink/ink2.xml><?xml version="1.0" encoding="utf-8"?>
 <inkml:ink xmlns:inkml="http://www.w3.org/2003/InkML">
   <inkml:definitions>
     <inkml:context xml:id="ctx0">
@@ -197,6 +178,34 @@
     </inkml:brush>
   </inkml:definitions>
   <inkml:trace contextRef="#ctx0" brushRef="#br0">1 10 23977,'2907'0'0</inkml:trace>
+</inkml:ink>
+</file>
+
+<file path=ppt/ink/ink3.xml><?xml version="1.0" encoding="utf-8"?>
+<inkml:ink xmlns:inkml="http://www.w3.org/2003/InkML">
+  <inkml:definitions>
+    <inkml:context xml:id="ctx0">
+      <inkml:inkSource xml:id="inkSrc0">
+        <inkml:traceFormat>
+          <inkml:channel name="X" type="integer" min="-2.14748E9" max="2.14748E9" units="cm"/>
+          <inkml:channel name="Y" type="integer" min="-2.14748E9" max="2.14748E9" units="cm"/>
+          <inkml:channel name="F" type="integer" max="32767" units="dev"/>
+        </inkml:traceFormat>
+        <inkml:channelProperties>
+          <inkml:channelProperty channel="X" name="resolution" value="1000" units="1/cm"/>
+          <inkml:channelProperty channel="Y" name="resolution" value="1000" units="1/cm"/>
+          <inkml:channelProperty channel="F" name="resolution" value="0" units="1/dev"/>
+        </inkml:channelProperties>
+      </inkml:inkSource>
+      <inkml:timestamp xml:id="ts0" timeString="2026-01-20T20:09:45.438"/>
+    </inkml:context>
+    <inkml:brush xml:id="br0">
+      <inkml:brushProperty name="width" value="0.035" units="cm"/>
+      <inkml:brushProperty name="height" value="0.035" units="cm"/>
+      <inkml:brushProperty name="color" value="#E71224"/>
+    </inkml:brush>
+  </inkml:definitions>
+  <inkml:trace contextRef="#ctx0" brushRef="#br0">1 7 23713,'4613'0'0</inkml:trace>
 </inkml:ink>
 </file>
 
@@ -312,6 +321,439 @@
 </inkml:ink>
 </file>
 
+<file path=ppt/notesMasters/notesMaster1.xml><?xml version="1.0" encoding="utf-8"?>
+<p:notesMaster xmlns:a="http://schemas.openxmlformats.org/drawingml/2006/main" xmlns:r="http://schemas.openxmlformats.org/officeDocument/2006/relationships" xmlns:p="http://schemas.openxmlformats.org/presentationml/2006/main">
+  <p:cSld>
+    <p:bg>
+      <p:bgRef idx="1001">
+        <a:schemeClr val="bg1"/>
+      </p:bgRef>
+    </p:bg>
+    <p:spTree>
+      <p:nvGrpSpPr>
+        <p:cNvPr id="1" name=""/>
+        <p:cNvGrpSpPr/>
+        <p:nvPr/>
+      </p:nvGrpSpPr>
+      <p:grpSpPr>
+        <a:xfrm>
+          <a:off x="0" y="0"/>
+          <a:ext cx="0" cy="0"/>
+          <a:chOff x="0" y="0"/>
+          <a:chExt cx="0" cy="0"/>
+        </a:xfrm>
+      </p:grpSpPr>
+      <p:sp>
+        <p:nvSpPr>
+          <p:cNvPr id="2" name="Espaço Reservado para Cabeçalho 1"/>
+          <p:cNvSpPr>
+            <a:spLocks noGrp="1"/>
+          </p:cNvSpPr>
+          <p:nvPr>
+            <p:ph type="hdr" sz="quarter"/>
+          </p:nvPr>
+        </p:nvSpPr>
+        <p:spPr>
+          <a:xfrm>
+            <a:off x="0" y="0"/>
+            <a:ext cx="2971800" cy="458788"/>
+          </a:xfrm>
+          <a:prstGeom prst="rect">
+            <a:avLst/>
+          </a:prstGeom>
+        </p:spPr>
+        <p:txBody>
+          <a:bodyPr vert="horz" lIns="91440" tIns="45720" rIns="91440" bIns="45720" rtlCol="0"/>
+          <a:lstStyle>
+            <a:lvl1pPr algn="l">
+              <a:defRPr sz="1200"/>
+            </a:lvl1pPr>
+          </a:lstStyle>
+          <a:p>
+            <a:endParaRPr lang="pt-BR"/>
+          </a:p>
+        </p:txBody>
+      </p:sp>
+      <p:sp>
+        <p:nvSpPr>
+          <p:cNvPr id="3" name="Espaço Reservado para Data 2"/>
+          <p:cNvSpPr>
+            <a:spLocks noGrp="1"/>
+          </p:cNvSpPr>
+          <p:nvPr>
+            <p:ph type="dt" idx="1"/>
+          </p:nvPr>
+        </p:nvSpPr>
+        <p:spPr>
+          <a:xfrm>
+            <a:off x="3884613" y="0"/>
+            <a:ext cx="2971800" cy="458788"/>
+          </a:xfrm>
+          <a:prstGeom prst="rect">
+            <a:avLst/>
+          </a:prstGeom>
+        </p:spPr>
+        <p:txBody>
+          <a:bodyPr vert="horz" lIns="91440" tIns="45720" rIns="91440" bIns="45720" rtlCol="0"/>
+          <a:lstStyle>
+            <a:lvl1pPr algn="r">
+              <a:defRPr sz="1200"/>
+            </a:lvl1pPr>
+          </a:lstStyle>
+          <a:p>
+            <a:fld id="{E2588FEF-F436-4522-91D9-3FBB4B3CDA67}" type="datetimeFigureOut">
+              <a:rPr lang="pt-BR" smtClean="0"/>
+              <a:t>20/01/2026</a:t>
+            </a:fld>
+            <a:endParaRPr lang="pt-BR"/>
+          </a:p>
+        </p:txBody>
+      </p:sp>
+      <p:sp>
+        <p:nvSpPr>
+          <p:cNvPr id="4" name="Espaço Reservado para Imagem de Slide 3"/>
+          <p:cNvSpPr>
+            <a:spLocks noGrp="1" noRot="1" noChangeAspect="1"/>
+          </p:cNvSpPr>
+          <p:nvPr>
+            <p:ph type="sldImg" idx="2"/>
+          </p:nvPr>
+        </p:nvSpPr>
+        <p:spPr>
+          <a:xfrm>
+            <a:off x="685800" y="1143000"/>
+            <a:ext cx="5486400" cy="3086100"/>
+          </a:xfrm>
+          <a:prstGeom prst="rect">
+            <a:avLst/>
+          </a:prstGeom>
+          <a:noFill/>
+          <a:ln w="12700">
+            <a:solidFill>
+              <a:prstClr val="black"/>
+            </a:solidFill>
+          </a:ln>
+        </p:spPr>
+        <p:txBody>
+          <a:bodyPr vert="horz" lIns="91440" tIns="45720" rIns="91440" bIns="45720" rtlCol="0" anchor="ctr"/>
+          <a:lstStyle/>
+          <a:p>
+            <a:endParaRPr lang="pt-BR"/>
+          </a:p>
+        </p:txBody>
+      </p:sp>
+      <p:sp>
+        <p:nvSpPr>
+          <p:cNvPr id="5" name="Espaço Reservado para Anotações 4"/>
+          <p:cNvSpPr>
+            <a:spLocks noGrp="1"/>
+          </p:cNvSpPr>
+          <p:nvPr>
+            <p:ph type="body" sz="quarter" idx="3"/>
+          </p:nvPr>
+        </p:nvSpPr>
+        <p:spPr>
+          <a:xfrm>
+            <a:off x="685800" y="4400550"/>
+            <a:ext cx="5486400" cy="3600450"/>
+          </a:xfrm>
+          <a:prstGeom prst="rect">
+            <a:avLst/>
+          </a:prstGeom>
+        </p:spPr>
+        <p:txBody>
+          <a:bodyPr vert="horz" lIns="91440" tIns="45720" rIns="91440" bIns="45720" rtlCol="0"/>
+          <a:lstStyle/>
+          <a:p>
+            <a:pPr lvl="0"/>
+            <a:r>
+              <a:rPr lang="pt-BR"/>
+              <a:t>Clique para editar os estilos de texto Mestres</a:t>
+            </a:r>
+          </a:p>
+          <a:p>
+            <a:pPr lvl="1"/>
+            <a:r>
+              <a:rPr lang="pt-BR"/>
+              <a:t>Segundo nível</a:t>
+            </a:r>
+          </a:p>
+          <a:p>
+            <a:pPr lvl="2"/>
+            <a:r>
+              <a:rPr lang="pt-BR"/>
+              <a:t>Terceiro nível</a:t>
+            </a:r>
+          </a:p>
+          <a:p>
+            <a:pPr lvl="3"/>
+            <a:r>
+              <a:rPr lang="pt-BR"/>
+              <a:t>Quarto nível</a:t>
+            </a:r>
+          </a:p>
+          <a:p>
+            <a:pPr lvl="4"/>
+            <a:r>
+              <a:rPr lang="pt-BR"/>
+              <a:t>Quinto nível</a:t>
+            </a:r>
+          </a:p>
+        </p:txBody>
+      </p:sp>
+      <p:sp>
+        <p:nvSpPr>
+          <p:cNvPr id="6" name="Espaço Reservado para Rodapé 5"/>
+          <p:cNvSpPr>
+            <a:spLocks noGrp="1"/>
+          </p:cNvSpPr>
+          <p:nvPr>
+            <p:ph type="ftr" sz="quarter" idx="4"/>
+          </p:nvPr>
+        </p:nvSpPr>
+        <p:spPr>
+          <a:xfrm>
+            <a:off x="0" y="8685213"/>
+            <a:ext cx="2971800" cy="458787"/>
+          </a:xfrm>
+          <a:prstGeom prst="rect">
+            <a:avLst/>
+          </a:prstGeom>
+        </p:spPr>
+        <p:txBody>
+          <a:bodyPr vert="horz" lIns="91440" tIns="45720" rIns="91440" bIns="45720" rtlCol="0" anchor="b"/>
+          <a:lstStyle>
+            <a:lvl1pPr algn="l">
+              <a:defRPr sz="1200"/>
+            </a:lvl1pPr>
+          </a:lstStyle>
+          <a:p>
+            <a:endParaRPr lang="pt-BR"/>
+          </a:p>
+        </p:txBody>
+      </p:sp>
+      <p:sp>
+        <p:nvSpPr>
+          <p:cNvPr id="7" name="Espaço Reservado para Número de Slide 6"/>
+          <p:cNvSpPr>
+            <a:spLocks noGrp="1"/>
+          </p:cNvSpPr>
+          <p:nvPr>
+            <p:ph type="sldNum" sz="quarter" idx="5"/>
+          </p:nvPr>
+        </p:nvSpPr>
+        <p:spPr>
+          <a:xfrm>
+            <a:off x="3884613" y="8685213"/>
+            <a:ext cx="2971800" cy="458787"/>
+          </a:xfrm>
+          <a:prstGeom prst="rect">
+            <a:avLst/>
+          </a:prstGeom>
+        </p:spPr>
+        <p:txBody>
+          <a:bodyPr vert="horz" lIns="91440" tIns="45720" rIns="91440" bIns="45720" rtlCol="0" anchor="b"/>
+          <a:lstStyle>
+            <a:lvl1pPr algn="r">
+              <a:defRPr sz="1200"/>
+            </a:lvl1pPr>
+          </a:lstStyle>
+          <a:p>
+            <a:fld id="{D7F532B0-B003-473B-9208-A2E213C2D0C0}" type="slidenum">
+              <a:rPr lang="pt-BR" smtClean="0"/>
+              <a:t>‹nº›</a:t>
+            </a:fld>
+            <a:endParaRPr lang="pt-BR"/>
+          </a:p>
+        </p:txBody>
+      </p:sp>
+    </p:spTree>
+    <p:extLst>
+      <p:ext uri="{BB962C8B-B14F-4D97-AF65-F5344CB8AC3E}">
+        <p14:creationId xmlns:p14="http://schemas.microsoft.com/office/powerpoint/2010/main" val="1630493906"/>
+      </p:ext>
+    </p:extLst>
+  </p:cSld>
+  <p:clrMap bg1="lt1" tx1="dk1" bg2="lt2" tx2="dk2" accent1="accent1" accent2="accent2" accent3="accent3" accent4="accent4" accent5="accent5" accent6="accent6" hlink="hlink" folHlink="folHlink"/>
+  <p:notesStyle>
+    <a:lvl1pPr marL="0" algn="l" defTabSz="914400" rtl="0" eaLnBrk="1" latinLnBrk="0" hangingPunct="1">
+      <a:defRPr sz="1200" kern="1200">
+        <a:solidFill>
+          <a:schemeClr val="tx1"/>
+        </a:solidFill>
+        <a:latin typeface="+mn-lt"/>
+        <a:ea typeface="+mn-ea"/>
+        <a:cs typeface="+mn-cs"/>
+      </a:defRPr>
+    </a:lvl1pPr>
+    <a:lvl2pPr marL="457200" algn="l" defTabSz="914400" rtl="0" eaLnBrk="1" latinLnBrk="0" hangingPunct="1">
+      <a:defRPr sz="1200" kern="1200">
+        <a:solidFill>
+          <a:schemeClr val="tx1"/>
+        </a:solidFill>
+        <a:latin typeface="+mn-lt"/>
+        <a:ea typeface="+mn-ea"/>
+        <a:cs typeface="+mn-cs"/>
+      </a:defRPr>
+    </a:lvl2pPr>
+    <a:lvl3pPr marL="914400" algn="l" defTabSz="914400" rtl="0" eaLnBrk="1" latinLnBrk="0" hangingPunct="1">
+      <a:defRPr sz="1200" kern="1200">
+        <a:solidFill>
+          <a:schemeClr val="tx1"/>
+        </a:solidFill>
+        <a:latin typeface="+mn-lt"/>
+        <a:ea typeface="+mn-ea"/>
+        <a:cs typeface="+mn-cs"/>
+      </a:defRPr>
+    </a:lvl3pPr>
+    <a:lvl4pPr marL="1371600" algn="l" defTabSz="914400" rtl="0" eaLnBrk="1" latinLnBrk="0" hangingPunct="1">
+      <a:defRPr sz="1200" kern="1200">
+        <a:solidFill>
+          <a:schemeClr val="tx1"/>
+        </a:solidFill>
+        <a:latin typeface="+mn-lt"/>
+        <a:ea typeface="+mn-ea"/>
+        <a:cs typeface="+mn-cs"/>
+      </a:defRPr>
+    </a:lvl4pPr>
+    <a:lvl5pPr marL="1828800" algn="l" defTabSz="914400" rtl="0" eaLnBrk="1" latinLnBrk="0" hangingPunct="1">
+      <a:defRPr sz="1200" kern="1200">
+        <a:solidFill>
+          <a:schemeClr val="tx1"/>
+        </a:solidFill>
+        <a:latin typeface="+mn-lt"/>
+        <a:ea typeface="+mn-ea"/>
+        <a:cs typeface="+mn-cs"/>
+      </a:defRPr>
+    </a:lvl5pPr>
+    <a:lvl6pPr marL="2286000" algn="l" defTabSz="914400" rtl="0" eaLnBrk="1" latinLnBrk="0" hangingPunct="1">
+      <a:defRPr sz="1200" kern="1200">
+        <a:solidFill>
+          <a:schemeClr val="tx1"/>
+        </a:solidFill>
+        <a:latin typeface="+mn-lt"/>
+        <a:ea typeface="+mn-ea"/>
+        <a:cs typeface="+mn-cs"/>
+      </a:defRPr>
+    </a:lvl6pPr>
+    <a:lvl7pPr marL="2743200" algn="l" defTabSz="914400" rtl="0" eaLnBrk="1" latinLnBrk="0" hangingPunct="1">
+      <a:defRPr sz="1200" kern="1200">
+        <a:solidFill>
+          <a:schemeClr val="tx1"/>
+        </a:solidFill>
+        <a:latin typeface="+mn-lt"/>
+        <a:ea typeface="+mn-ea"/>
+        <a:cs typeface="+mn-cs"/>
+      </a:defRPr>
+    </a:lvl7pPr>
+    <a:lvl8pPr marL="3200400" algn="l" defTabSz="914400" rtl="0" eaLnBrk="1" latinLnBrk="0" hangingPunct="1">
+      <a:defRPr sz="1200" kern="1200">
+        <a:solidFill>
+          <a:schemeClr val="tx1"/>
+        </a:solidFill>
+        <a:latin typeface="+mn-lt"/>
+        <a:ea typeface="+mn-ea"/>
+        <a:cs typeface="+mn-cs"/>
+      </a:defRPr>
+    </a:lvl8pPr>
+    <a:lvl9pPr marL="3657600" algn="l" defTabSz="914400" rtl="0" eaLnBrk="1" latinLnBrk="0" hangingPunct="1">
+      <a:defRPr sz="1200" kern="1200">
+        <a:solidFill>
+          <a:schemeClr val="tx1"/>
+        </a:solidFill>
+        <a:latin typeface="+mn-lt"/>
+        <a:ea typeface="+mn-ea"/>
+        <a:cs typeface="+mn-cs"/>
+      </a:defRPr>
+    </a:lvl9pPr>
+  </p:notesStyle>
+</p:notesMaster>
+</file>
+
+<file path=ppt/notesSlides/notesSlide1.xml><?xml version="1.0" encoding="utf-8"?>
+<p:notes xmlns:a="http://schemas.openxmlformats.org/drawingml/2006/main" xmlns:r="http://schemas.openxmlformats.org/officeDocument/2006/relationships" xmlns:p="http://schemas.openxmlformats.org/presentationml/2006/main">
+  <p:cSld>
+    <p:spTree>
+      <p:nvGrpSpPr>
+        <p:cNvPr id="1" name=""/>
+        <p:cNvGrpSpPr/>
+        <p:nvPr/>
+      </p:nvGrpSpPr>
+      <p:grpSpPr>
+        <a:xfrm>
+          <a:off x="0" y="0"/>
+          <a:ext cx="0" cy="0"/>
+          <a:chOff x="0" y="0"/>
+          <a:chExt cx="0" cy="0"/>
+        </a:xfrm>
+      </p:grpSpPr>
+      <p:sp>
+        <p:nvSpPr>
+          <p:cNvPr id="2" name="Espaço Reservado para Imagem de Slide 1"/>
+          <p:cNvSpPr>
+            <a:spLocks noGrp="1" noRot="1" noChangeAspect="1"/>
+          </p:cNvSpPr>
+          <p:nvPr>
+            <p:ph type="sldImg"/>
+          </p:nvPr>
+        </p:nvSpPr>
+        <p:spPr/>
+      </p:sp>
+      <p:sp>
+        <p:nvSpPr>
+          <p:cNvPr id="3" name="Espaço Reservado para Anotações 2"/>
+          <p:cNvSpPr>
+            <a:spLocks noGrp="1"/>
+          </p:cNvSpPr>
+          <p:nvPr>
+            <p:ph type="body" idx="1"/>
+          </p:nvPr>
+        </p:nvSpPr>
+        <p:spPr/>
+        <p:txBody>
+          <a:bodyPr/>
+          <a:lstStyle/>
+          <a:p>
+            <a:endParaRPr lang="pt-BR" dirty="0"/>
+          </a:p>
+        </p:txBody>
+      </p:sp>
+      <p:sp>
+        <p:nvSpPr>
+          <p:cNvPr id="4" name="Espaço Reservado para Número de Slide 3"/>
+          <p:cNvSpPr>
+            <a:spLocks noGrp="1"/>
+          </p:cNvSpPr>
+          <p:nvPr>
+            <p:ph type="sldNum" sz="quarter" idx="5"/>
+          </p:nvPr>
+        </p:nvSpPr>
+        <p:spPr/>
+        <p:txBody>
+          <a:bodyPr/>
+          <a:lstStyle/>
+          <a:p>
+            <a:fld id="{5F42E039-2C2B-455F-97AD-3DF3B59C34CF}" type="slidenum">
+              <a:rPr lang="pt-BR" smtClean="0"/>
+              <a:t>4</a:t>
+            </a:fld>
+            <a:endParaRPr lang="pt-BR"/>
+          </a:p>
+        </p:txBody>
+      </p:sp>
+    </p:spTree>
+    <p:extLst>
+      <p:ext uri="{BB962C8B-B14F-4D97-AF65-F5344CB8AC3E}">
+        <p14:creationId xmlns:p14="http://schemas.microsoft.com/office/powerpoint/2010/main" val="2000681800"/>
+      </p:ext>
+    </p:extLst>
+  </p:cSld>
+  <p:clrMapOvr>
+    <a:masterClrMapping/>
+  </p:clrMapOvr>
+</p:notes>
+</file>
+
 <file path=ppt/slideLayouts/slideLayout1.xml><?xml version="1.0" encoding="utf-8"?>
 <p:sldLayout xmlns:a="http://schemas.openxmlformats.org/drawingml/2006/main" xmlns:r="http://schemas.openxmlformats.org/officeDocument/2006/relationships" xmlns:p="http://schemas.openxmlformats.org/presentationml/2006/main" type="title" preserve="1">
   <p:cSld name="Slide de Título">
@@ -459,7 +901,7 @@
           <a:p>
             <a:fld id="{8ADEC918-6A4C-437B-AF1C-9622FE800873}" type="datetimeFigureOut">
               <a:rPr lang="pt-BR" smtClean="0"/>
-              <a:t>21/07/2025</a:t>
+              <a:t>20/01/2026</a:t>
             </a:fld>
             <a:endParaRPr lang="pt-BR"/>
           </a:p>
@@ -657,7 +1099,7 @@
           <a:p>
             <a:fld id="{8ADEC918-6A4C-437B-AF1C-9622FE800873}" type="datetimeFigureOut">
               <a:rPr lang="pt-BR" smtClean="0"/>
-              <a:t>21/07/2025</a:t>
+              <a:t>20/01/2026</a:t>
             </a:fld>
             <a:endParaRPr lang="pt-BR"/>
           </a:p>
@@ -865,7 +1307,7 @@
           <a:p>
             <a:fld id="{8ADEC918-6A4C-437B-AF1C-9622FE800873}" type="datetimeFigureOut">
               <a:rPr lang="pt-BR" smtClean="0"/>
-              <a:t>21/07/2025</a:t>
+              <a:t>20/01/2026</a:t>
             </a:fld>
             <a:endParaRPr lang="pt-BR"/>
           </a:p>
@@ -1063,7 +1505,7 @@
           <a:p>
             <a:fld id="{8ADEC918-6A4C-437B-AF1C-9622FE800873}" type="datetimeFigureOut">
               <a:rPr lang="pt-BR" smtClean="0"/>
-              <a:t>21/07/2025</a:t>
+              <a:t>20/01/2026</a:t>
             </a:fld>
             <a:endParaRPr lang="pt-BR"/>
           </a:p>
@@ -1338,7 +1780,7 @@
           <a:p>
             <a:fld id="{8ADEC918-6A4C-437B-AF1C-9622FE800873}" type="datetimeFigureOut">
               <a:rPr lang="pt-BR" smtClean="0"/>
-              <a:t>21/07/2025</a:t>
+              <a:t>20/01/2026</a:t>
             </a:fld>
             <a:endParaRPr lang="pt-BR"/>
           </a:p>
@@ -1603,7 +2045,7 @@
           <a:p>
             <a:fld id="{8ADEC918-6A4C-437B-AF1C-9622FE800873}" type="datetimeFigureOut">
               <a:rPr lang="pt-BR" smtClean="0"/>
-              <a:t>21/07/2025</a:t>
+              <a:t>20/01/2026</a:t>
             </a:fld>
             <a:endParaRPr lang="pt-BR"/>
           </a:p>
@@ -2015,7 +2457,7 @@
           <a:p>
             <a:fld id="{8ADEC918-6A4C-437B-AF1C-9622FE800873}" type="datetimeFigureOut">
               <a:rPr lang="pt-BR" smtClean="0"/>
-              <a:t>21/07/2025</a:t>
+              <a:t>20/01/2026</a:t>
             </a:fld>
             <a:endParaRPr lang="pt-BR"/>
           </a:p>
@@ -2156,7 +2598,7 @@
           <a:p>
             <a:fld id="{8ADEC918-6A4C-437B-AF1C-9622FE800873}" type="datetimeFigureOut">
               <a:rPr lang="pt-BR" smtClean="0"/>
-              <a:t>21/07/2025</a:t>
+              <a:t>20/01/2026</a:t>
             </a:fld>
             <a:endParaRPr lang="pt-BR"/>
           </a:p>
@@ -2269,7 +2711,7 @@
           <a:p>
             <a:fld id="{8ADEC918-6A4C-437B-AF1C-9622FE800873}" type="datetimeFigureOut">
               <a:rPr lang="pt-BR" smtClean="0"/>
-              <a:t>21/07/2025</a:t>
+              <a:t>20/01/2026</a:t>
             </a:fld>
             <a:endParaRPr lang="pt-BR"/>
           </a:p>
@@ -2580,7 +3022,7 @@
           <a:p>
             <a:fld id="{8ADEC918-6A4C-437B-AF1C-9622FE800873}" type="datetimeFigureOut">
               <a:rPr lang="pt-BR" smtClean="0"/>
-              <a:t>21/07/2025</a:t>
+              <a:t>20/01/2026</a:t>
             </a:fld>
             <a:endParaRPr lang="pt-BR"/>
           </a:p>
@@ -2868,7 +3310,7 @@
           <a:p>
             <a:fld id="{8ADEC918-6A4C-437B-AF1C-9622FE800873}" type="datetimeFigureOut">
               <a:rPr lang="pt-BR" smtClean="0"/>
-              <a:t>21/07/2025</a:t>
+              <a:t>20/01/2026</a:t>
             </a:fld>
             <a:endParaRPr lang="pt-BR"/>
           </a:p>
@@ -3109,7 +3551,7 @@
           <a:p>
             <a:fld id="{8ADEC918-6A4C-437B-AF1C-9622FE800873}" type="datetimeFigureOut">
               <a:rPr lang="pt-BR" smtClean="0"/>
-              <a:t>21/07/2025</a:t>
+              <a:t>20/01/2026</a:t>
             </a:fld>
             <a:endParaRPr lang="pt-BR"/>
           </a:p>
@@ -3725,6 +4167,752 @@
         <p:cNvPr id="1" name="">
           <a:extLst>
             <a:ext uri="{FF2B5EF4-FFF2-40B4-BE49-F238E27FC236}">
+              <a16:creationId xmlns:a16="http://schemas.microsoft.com/office/drawing/2014/main" id="{DFD74B3E-BF56-2FB0-BD21-370EC9442A46}"/>
+            </a:ext>
+          </a:extLst>
+        </p:cNvPr>
+        <p:cNvGrpSpPr/>
+        <p:nvPr/>
+      </p:nvGrpSpPr>
+      <p:grpSpPr>
+        <a:xfrm>
+          <a:off x="0" y="0"/>
+          <a:ext cx="0" cy="0"/>
+          <a:chOff x="0" y="0"/>
+          <a:chExt cx="0" cy="0"/>
+        </a:xfrm>
+      </p:grpSpPr>
+      <p:pic>
+        <p:nvPicPr>
+          <p:cNvPr id="5" name="Imagem 4">
+            <a:extLst>
+              <a:ext uri="{FF2B5EF4-FFF2-40B4-BE49-F238E27FC236}">
+                <a16:creationId xmlns:a16="http://schemas.microsoft.com/office/drawing/2014/main" id="{9F0E214E-D45B-BB9E-2317-56B6D93F6627}"/>
+              </a:ext>
+            </a:extLst>
+          </p:cNvPr>
+          <p:cNvPicPr>
+            <a:picLocks noChangeAspect="1"/>
+          </p:cNvPicPr>
+          <p:nvPr/>
+        </p:nvPicPr>
+        <p:blipFill>
+          <a:blip r:embed="rId2">
+            <a:extLst>
+              <a:ext uri="{28A0092B-C50C-407E-A947-70E740481C1C}">
+                <a14:useLocalDpi xmlns:a14="http://schemas.microsoft.com/office/drawing/2010/main" val="0"/>
+              </a:ext>
+            </a:extLst>
+          </a:blip>
+          <a:stretch>
+            <a:fillRect/>
+          </a:stretch>
+        </p:blipFill>
+        <p:spPr>
+          <a:xfrm>
+            <a:off x="0" y="0"/>
+            <a:ext cx="12192000" cy="6858000"/>
+          </a:xfrm>
+          <a:prstGeom prst="rect">
+            <a:avLst/>
+          </a:prstGeom>
+        </p:spPr>
+      </p:pic>
+      <p:sp>
+        <p:nvSpPr>
+          <p:cNvPr id="2" name="CaixaDeTexto 1">
+            <a:extLst>
+              <a:ext uri="{FF2B5EF4-FFF2-40B4-BE49-F238E27FC236}">
+                <a16:creationId xmlns:a16="http://schemas.microsoft.com/office/drawing/2014/main" id="{209A396E-A5FD-0E7C-4C13-36A282E1FEE1}"/>
+              </a:ext>
+            </a:extLst>
+          </p:cNvPr>
+          <p:cNvSpPr txBox="1"/>
+          <p:nvPr/>
+        </p:nvSpPr>
+        <p:spPr>
+          <a:xfrm>
+            <a:off x="5186740" y="197595"/>
+            <a:ext cx="1818520" cy="646331"/>
+          </a:xfrm>
+          <a:prstGeom prst="rect">
+            <a:avLst/>
+          </a:prstGeom>
+          <a:noFill/>
+        </p:spPr>
+        <p:txBody>
+          <a:bodyPr wrap="square" rtlCol="0">
+            <a:spAutoFit/>
+          </a:bodyPr>
+          <a:lstStyle/>
+          <a:p>
+            <a:r>
+              <a:rPr lang="en-US" sz="3600" dirty="0" err="1"/>
+              <a:t>Exercício</a:t>
+            </a:r>
+            <a:endParaRPr lang="pt-BR" sz="3600" dirty="0"/>
+          </a:p>
+        </p:txBody>
+      </p:sp>
+      <p:sp>
+        <p:nvSpPr>
+          <p:cNvPr id="3" name="CaixaDeTexto 2">
+            <a:extLst>
+              <a:ext uri="{FF2B5EF4-FFF2-40B4-BE49-F238E27FC236}">
+                <a16:creationId xmlns:a16="http://schemas.microsoft.com/office/drawing/2014/main" id="{BDC55075-4B50-0E84-DEF8-D1AFBA0E2829}"/>
+              </a:ext>
+            </a:extLst>
+          </p:cNvPr>
+          <p:cNvSpPr txBox="1"/>
+          <p:nvPr/>
+        </p:nvSpPr>
+        <p:spPr>
+          <a:xfrm>
+            <a:off x="1459523" y="1011115"/>
+            <a:ext cx="8976946" cy="5632311"/>
+          </a:xfrm>
+          <a:prstGeom prst="rect">
+            <a:avLst/>
+          </a:prstGeom>
+          <a:noFill/>
+        </p:spPr>
+        <p:txBody>
+          <a:bodyPr wrap="square" rtlCol="0">
+            <a:spAutoFit/>
+          </a:bodyPr>
+          <a:lstStyle/>
+          <a:p>
+            <a:r>
+              <a:rPr lang="en-US" sz="2000" dirty="0" err="1"/>
+              <a:t>Utilizando</a:t>
+            </a:r>
+            <a:r>
+              <a:rPr lang="en-US" sz="2000" dirty="0"/>
+              <a:t> </a:t>
+            </a:r>
+            <a:r>
+              <a:rPr lang="en-US" sz="2000" dirty="0" err="1"/>
+              <a:t>os</a:t>
+            </a:r>
+            <a:r>
+              <a:rPr lang="en-US" sz="2000" dirty="0"/>
+              <a:t> </a:t>
+            </a:r>
+            <a:r>
+              <a:rPr lang="en-US" sz="2000" dirty="0" err="1"/>
+              <a:t>conceitos</a:t>
+            </a:r>
+            <a:r>
+              <a:rPr lang="en-US" sz="2000" dirty="0"/>
+              <a:t> </a:t>
+            </a:r>
+            <a:r>
+              <a:rPr lang="en-US" sz="2000" dirty="0" err="1"/>
+              <a:t>abordados</a:t>
+            </a:r>
+            <a:r>
+              <a:rPr lang="en-US" sz="2000" dirty="0"/>
+              <a:t> </a:t>
+            </a:r>
+            <a:r>
+              <a:rPr lang="en-US" sz="2000" dirty="0" err="1"/>
+              <a:t>nesta</a:t>
+            </a:r>
+            <a:r>
+              <a:rPr lang="en-US" sz="2000" dirty="0"/>
+              <a:t> aula, </a:t>
+            </a:r>
+            <a:r>
+              <a:rPr lang="en-US" sz="2000" dirty="0" err="1"/>
+              <a:t>faça</a:t>
+            </a:r>
+            <a:r>
+              <a:rPr lang="en-US" sz="2000" dirty="0"/>
+              <a:t> o que se </a:t>
+            </a:r>
+            <a:r>
+              <a:rPr lang="en-US" sz="2000" dirty="0" err="1"/>
+              <a:t>pede</a:t>
+            </a:r>
+            <a:r>
+              <a:rPr lang="en-US" sz="2000" dirty="0"/>
+              <a:t>:</a:t>
+            </a:r>
+          </a:p>
+          <a:p>
+            <a:endParaRPr lang="en-US" sz="2000" dirty="0"/>
+          </a:p>
+          <a:p>
+            <a:pPr marL="342900" indent="-342900">
+              <a:buAutoNum type="arabicPeriod"/>
+            </a:pPr>
+            <a:r>
+              <a:rPr lang="en-US" sz="2000" dirty="0" err="1"/>
+              <a:t>Crie</a:t>
+            </a:r>
+            <a:r>
+              <a:rPr lang="en-US" sz="2000" dirty="0"/>
+              <a:t> um banco de dados </a:t>
+            </a:r>
+            <a:r>
+              <a:rPr lang="en-US" sz="2000" dirty="0" err="1"/>
+              <a:t>chamado</a:t>
+            </a:r>
+            <a:r>
+              <a:rPr lang="en-US" sz="2000" dirty="0"/>
+              <a:t> ‘database1’ </a:t>
+            </a:r>
+            <a:r>
+              <a:rPr lang="en-US" sz="2000" dirty="0" err="1"/>
+              <a:t>verificando</a:t>
+            </a:r>
+            <a:r>
+              <a:rPr lang="en-US" sz="2000" dirty="0"/>
+              <a:t> </a:t>
+            </a:r>
+            <a:r>
+              <a:rPr lang="en-US" sz="2000" dirty="0" err="1"/>
+              <a:t>sua</a:t>
+            </a:r>
+            <a:r>
+              <a:rPr lang="en-US" sz="2000" dirty="0"/>
+              <a:t> </a:t>
+            </a:r>
+            <a:r>
+              <a:rPr lang="en-US" sz="2000" dirty="0" err="1"/>
+              <a:t>existência</a:t>
+            </a:r>
+            <a:r>
+              <a:rPr lang="en-US" sz="2000" dirty="0"/>
+              <a:t>. Caso </a:t>
+            </a:r>
+            <a:r>
+              <a:rPr lang="en-US" sz="2000" dirty="0" err="1"/>
+              <a:t>exista</a:t>
+            </a:r>
+            <a:r>
+              <a:rPr lang="en-US" sz="2000" dirty="0"/>
+              <a:t>, </a:t>
+            </a:r>
+            <a:r>
+              <a:rPr lang="en-US" sz="2000" dirty="0" err="1"/>
+              <a:t>exclua</a:t>
+            </a:r>
+            <a:r>
+              <a:rPr lang="en-US" sz="2000" dirty="0"/>
+              <a:t> antes </a:t>
+            </a:r>
+            <a:r>
+              <a:rPr lang="en-US" sz="2000" dirty="0" err="1"/>
+              <a:t>mesmo</a:t>
+            </a:r>
+            <a:r>
+              <a:rPr lang="en-US" sz="2000" dirty="0"/>
+              <a:t> de </a:t>
+            </a:r>
+            <a:r>
+              <a:rPr lang="en-US" sz="2000" dirty="0" err="1"/>
+              <a:t>criá</a:t>
+            </a:r>
+            <a:r>
+              <a:rPr lang="en-US" sz="2000" dirty="0"/>
+              <a:t>-lo;</a:t>
+            </a:r>
+          </a:p>
+          <a:p>
+            <a:pPr marL="342900" indent="-342900">
+              <a:buAutoNum type="arabicPeriod"/>
+            </a:pPr>
+            <a:r>
+              <a:rPr lang="en-US" sz="2000" dirty="0"/>
+              <a:t>Execute o </a:t>
+            </a:r>
+            <a:r>
+              <a:rPr lang="en-US" sz="2000" dirty="0" err="1"/>
+              <a:t>comando</a:t>
+            </a:r>
+            <a:r>
+              <a:rPr lang="en-US" sz="2000" dirty="0"/>
+              <a:t> para </a:t>
+            </a:r>
+            <a:r>
+              <a:rPr lang="en-US" sz="2000" dirty="0" err="1"/>
+              <a:t>utilizar</a:t>
+            </a:r>
+            <a:r>
+              <a:rPr lang="en-US" sz="2000" dirty="0"/>
+              <a:t> </a:t>
+            </a:r>
+            <a:r>
+              <a:rPr lang="en-US" sz="2000" dirty="0" err="1"/>
+              <a:t>seu</a:t>
+            </a:r>
+            <a:r>
+              <a:rPr lang="en-US" sz="2000" dirty="0"/>
+              <a:t> banco de dados;</a:t>
+            </a:r>
+          </a:p>
+          <a:p>
+            <a:pPr marL="342900" indent="-342900">
+              <a:buAutoNum type="arabicPeriod"/>
+            </a:pPr>
+            <a:r>
+              <a:rPr lang="en-US" sz="2000" dirty="0" err="1"/>
+              <a:t>Crie</a:t>
+            </a:r>
+            <a:r>
+              <a:rPr lang="en-US" sz="2000" dirty="0"/>
+              <a:t> </a:t>
+            </a:r>
+            <a:r>
+              <a:rPr lang="en-US" sz="2000" dirty="0" err="1"/>
+              <a:t>uma</a:t>
+            </a:r>
+            <a:r>
+              <a:rPr lang="en-US" sz="2000" dirty="0"/>
+              <a:t> nova </a:t>
+            </a:r>
+            <a:r>
+              <a:rPr lang="en-US" sz="2000" dirty="0" err="1"/>
+              <a:t>tabela</a:t>
+            </a:r>
+            <a:r>
+              <a:rPr lang="en-US" sz="2000" dirty="0"/>
+              <a:t> ‘Pessoa’, </a:t>
+            </a:r>
+            <a:r>
+              <a:rPr lang="en-US" sz="2000" dirty="0" err="1"/>
+              <a:t>esta</a:t>
+            </a:r>
+            <a:r>
+              <a:rPr lang="en-US" sz="2000" dirty="0"/>
+              <a:t> </a:t>
+            </a:r>
+            <a:r>
+              <a:rPr lang="en-US" sz="2000" dirty="0" err="1"/>
+              <a:t>tabela</a:t>
+            </a:r>
+            <a:r>
+              <a:rPr lang="en-US" sz="2000" dirty="0"/>
+              <a:t> </a:t>
+            </a:r>
+            <a:r>
+              <a:rPr lang="en-US" sz="2000" dirty="0" err="1"/>
+              <a:t>deve</a:t>
+            </a:r>
+            <a:r>
+              <a:rPr lang="en-US" sz="2000" dirty="0"/>
+              <a:t> </a:t>
+            </a:r>
+            <a:r>
+              <a:rPr lang="en-US" sz="2000" dirty="0" err="1"/>
+              <a:t>conter</a:t>
+            </a:r>
+            <a:r>
+              <a:rPr lang="en-US" sz="2000" dirty="0"/>
+              <a:t> um </a:t>
+            </a:r>
+            <a:r>
+              <a:rPr lang="en-US" sz="2000" dirty="0" err="1"/>
+              <a:t>identificador</a:t>
+            </a:r>
+            <a:r>
+              <a:rPr lang="en-US" sz="2000" dirty="0"/>
+              <a:t> </a:t>
+            </a:r>
+            <a:r>
+              <a:rPr lang="en-US" sz="2000" dirty="0" err="1"/>
+              <a:t>único</a:t>
+            </a:r>
+            <a:r>
+              <a:rPr lang="en-US" sz="2000" dirty="0"/>
+              <a:t> </a:t>
+            </a:r>
+            <a:r>
+              <a:rPr lang="en-US" sz="2000" dirty="0" err="1"/>
+              <a:t>obrigatório</a:t>
+            </a:r>
+            <a:r>
+              <a:rPr lang="en-US" sz="2000" dirty="0"/>
+              <a:t> e auto-incremental, um </a:t>
+            </a:r>
+            <a:r>
+              <a:rPr lang="en-US" sz="2000" dirty="0" err="1"/>
+              <a:t>nome</a:t>
+            </a:r>
+            <a:r>
+              <a:rPr lang="en-US" sz="2000" dirty="0"/>
+              <a:t> (40 </a:t>
+            </a:r>
+            <a:r>
+              <a:rPr lang="en-US" sz="2000" dirty="0" err="1"/>
+              <a:t>caracteres</a:t>
+            </a:r>
+            <a:r>
+              <a:rPr lang="en-US" sz="2000" dirty="0"/>
+              <a:t>), um campo de </a:t>
+            </a:r>
+            <a:r>
+              <a:rPr lang="en-US" sz="2000" dirty="0" err="1"/>
+              <a:t>endereço</a:t>
+            </a:r>
+            <a:r>
+              <a:rPr lang="en-US" sz="2000" dirty="0"/>
+              <a:t> e </a:t>
+            </a:r>
+            <a:r>
+              <a:rPr lang="en-US" sz="2000" dirty="0" err="1"/>
+              <a:t>uma</a:t>
+            </a:r>
+            <a:r>
+              <a:rPr lang="en-US" sz="2000" dirty="0"/>
+              <a:t> </a:t>
+            </a:r>
+            <a:r>
+              <a:rPr lang="en-US" sz="2000" dirty="0" err="1"/>
+              <a:t>profissão</a:t>
+            </a:r>
+            <a:r>
+              <a:rPr lang="en-US" sz="2000" dirty="0"/>
+              <a:t> (</a:t>
+            </a:r>
+            <a:r>
+              <a:rPr lang="en-US" sz="2000" dirty="0" err="1"/>
+              <a:t>obrigatório</a:t>
+            </a:r>
+            <a:r>
+              <a:rPr lang="en-US" sz="2000" dirty="0"/>
+              <a:t>);</a:t>
+            </a:r>
+          </a:p>
+          <a:p>
+            <a:pPr marL="342900" indent="-342900">
+              <a:buAutoNum type="arabicPeriod"/>
+            </a:pPr>
+            <a:r>
+              <a:rPr lang="en-US" sz="2000" dirty="0" err="1"/>
+              <a:t>Faça</a:t>
+            </a:r>
+            <a:r>
+              <a:rPr lang="en-US" sz="2000" dirty="0"/>
+              <a:t> a </a:t>
+            </a:r>
+            <a:r>
+              <a:rPr lang="en-US" sz="2000" dirty="0" err="1"/>
+              <a:t>inserção</a:t>
+            </a:r>
+            <a:r>
+              <a:rPr lang="en-US" sz="2000" dirty="0"/>
+              <a:t> de 3 </a:t>
+            </a:r>
+            <a:r>
+              <a:rPr lang="en-US" sz="2000" dirty="0" err="1"/>
+              <a:t>pessoas</a:t>
+            </a:r>
+            <a:r>
+              <a:rPr lang="en-US" sz="2000" dirty="0"/>
+              <a:t>;</a:t>
+            </a:r>
+          </a:p>
+          <a:p>
+            <a:pPr marL="342900" indent="-342900">
+              <a:buAutoNum type="arabicPeriod"/>
+            </a:pPr>
+            <a:r>
+              <a:rPr lang="en-US" sz="2000" dirty="0" err="1"/>
+              <a:t>Inclua</a:t>
+            </a:r>
+            <a:r>
+              <a:rPr lang="en-US" sz="2000" dirty="0"/>
+              <a:t> </a:t>
+            </a:r>
+            <a:r>
+              <a:rPr lang="en-US" sz="2000" dirty="0" err="1"/>
+              <a:t>uma</a:t>
+            </a:r>
+            <a:r>
+              <a:rPr lang="en-US" sz="2000" dirty="0"/>
+              <a:t> nova </a:t>
+            </a:r>
+            <a:r>
+              <a:rPr lang="en-US" sz="2000" dirty="0" err="1"/>
+              <a:t>coluna</a:t>
+            </a:r>
+            <a:r>
+              <a:rPr lang="en-US" sz="2000" dirty="0"/>
+              <a:t> para o </a:t>
+            </a:r>
+            <a:r>
+              <a:rPr lang="en-US" sz="2000" dirty="0" err="1"/>
+              <a:t>telefone</a:t>
+            </a:r>
+            <a:r>
+              <a:rPr lang="en-US" sz="2000" dirty="0"/>
+              <a:t>;</a:t>
+            </a:r>
+          </a:p>
+          <a:p>
+            <a:pPr marL="342900" indent="-342900">
+              <a:buAutoNum type="arabicPeriod"/>
+            </a:pPr>
+            <a:r>
+              <a:rPr lang="en-US" sz="2000" dirty="0" err="1"/>
+              <a:t>Exclua</a:t>
+            </a:r>
+            <a:r>
+              <a:rPr lang="en-US" sz="2000" dirty="0"/>
+              <a:t> a </a:t>
+            </a:r>
+            <a:r>
+              <a:rPr lang="en-US" sz="2000" dirty="0" err="1"/>
+              <a:t>coluna</a:t>
+            </a:r>
+            <a:r>
+              <a:rPr lang="en-US" sz="2000" dirty="0"/>
+              <a:t> de </a:t>
+            </a:r>
+            <a:r>
+              <a:rPr lang="en-US" sz="2000" dirty="0" err="1"/>
+              <a:t>endereço</a:t>
+            </a:r>
+            <a:r>
+              <a:rPr lang="en-US" sz="2000" dirty="0"/>
+              <a:t>;</a:t>
+            </a:r>
+          </a:p>
+          <a:p>
+            <a:pPr marL="342900" indent="-342900">
+              <a:buAutoNum type="arabicPeriod"/>
+            </a:pPr>
+            <a:r>
+              <a:rPr lang="en-US" sz="2000" dirty="0" err="1"/>
+              <a:t>Atualize</a:t>
+            </a:r>
+            <a:r>
+              <a:rPr lang="en-US" sz="2000" dirty="0"/>
+              <a:t> as </a:t>
+            </a:r>
+            <a:r>
+              <a:rPr lang="en-US" sz="2000" dirty="0" err="1"/>
+              <a:t>pessoas</a:t>
+            </a:r>
+            <a:r>
+              <a:rPr lang="en-US" sz="2000" dirty="0"/>
+              <a:t> </a:t>
+            </a:r>
+            <a:r>
+              <a:rPr lang="en-US" sz="2000" dirty="0" err="1"/>
+              <a:t>adicionando</a:t>
+            </a:r>
+            <a:r>
+              <a:rPr lang="en-US" sz="2000" dirty="0"/>
+              <a:t> </a:t>
+            </a:r>
+            <a:r>
+              <a:rPr lang="en-US" sz="2000" dirty="0" err="1"/>
+              <a:t>telefone</a:t>
+            </a:r>
+            <a:r>
+              <a:rPr lang="en-US" sz="2000" dirty="0"/>
+              <a:t> para as duas </a:t>
+            </a:r>
+            <a:r>
+              <a:rPr lang="en-US" sz="2000" dirty="0" err="1"/>
+              <a:t>últimas</a:t>
+            </a:r>
+            <a:r>
+              <a:rPr lang="en-US" sz="2000" dirty="0"/>
+              <a:t>;</a:t>
+            </a:r>
+          </a:p>
+          <a:p>
+            <a:pPr marL="342900" indent="-342900">
+              <a:buAutoNum type="arabicPeriod"/>
+            </a:pPr>
+            <a:r>
+              <a:rPr lang="en-US" sz="2000" dirty="0" err="1"/>
+              <a:t>Modifique</a:t>
+            </a:r>
+            <a:r>
+              <a:rPr lang="en-US" sz="2000" dirty="0"/>
+              <a:t> a </a:t>
+            </a:r>
+            <a:r>
+              <a:rPr lang="en-US" sz="2000" dirty="0" err="1"/>
+              <a:t>capacidade</a:t>
+            </a:r>
+            <a:r>
+              <a:rPr lang="en-US" sz="2000" dirty="0"/>
+              <a:t> do </a:t>
+            </a:r>
+            <a:r>
+              <a:rPr lang="en-US" sz="2000" dirty="0" err="1"/>
+              <a:t>tipo</a:t>
+            </a:r>
+            <a:r>
+              <a:rPr lang="en-US" sz="2000" dirty="0"/>
+              <a:t> do campo ‘</a:t>
+            </a:r>
+            <a:r>
+              <a:rPr lang="en-US" sz="2000" dirty="0" err="1"/>
+              <a:t>nome</a:t>
+            </a:r>
+            <a:r>
+              <a:rPr lang="en-US" sz="2000" dirty="0"/>
+              <a:t>’ para 30;</a:t>
+            </a:r>
+          </a:p>
+          <a:p>
+            <a:pPr marL="342900" indent="-342900">
+              <a:buAutoNum type="arabicPeriod"/>
+            </a:pPr>
+            <a:r>
+              <a:rPr lang="en-US" sz="2000" dirty="0" err="1"/>
+              <a:t>Exclua</a:t>
+            </a:r>
+            <a:r>
+              <a:rPr lang="en-US" sz="2000" dirty="0"/>
+              <a:t> a </a:t>
+            </a:r>
+            <a:r>
+              <a:rPr lang="en-US" sz="2000" dirty="0" err="1"/>
+              <a:t>primeira</a:t>
+            </a:r>
+            <a:r>
+              <a:rPr lang="en-US" sz="2000" dirty="0"/>
+              <a:t> </a:t>
+            </a:r>
+            <a:r>
+              <a:rPr lang="en-US" sz="2000" dirty="0" err="1"/>
+              <a:t>pessoa</a:t>
+            </a:r>
+            <a:r>
+              <a:rPr lang="en-US" sz="2000" dirty="0"/>
+              <a:t>;</a:t>
+            </a:r>
+          </a:p>
+          <a:p>
+            <a:pPr marL="342900" indent="-342900">
+              <a:buAutoNum type="arabicPeriod"/>
+            </a:pPr>
+            <a:r>
+              <a:rPr lang="en-US" sz="2000" dirty="0"/>
+              <a:t> </a:t>
+            </a:r>
+            <a:r>
+              <a:rPr lang="en-US" sz="2000" dirty="0" err="1"/>
+              <a:t>Mostre</a:t>
+            </a:r>
+            <a:r>
+              <a:rPr lang="en-US" sz="2000" dirty="0"/>
+              <a:t> </a:t>
+            </a:r>
+            <a:r>
+              <a:rPr lang="en-US" sz="2000" dirty="0" err="1"/>
+              <a:t>todos</a:t>
+            </a:r>
+            <a:r>
+              <a:rPr lang="en-US" sz="2000" dirty="0"/>
+              <a:t> </a:t>
+            </a:r>
+            <a:r>
+              <a:rPr lang="en-US" sz="2000" dirty="0" err="1"/>
+              <a:t>os</a:t>
+            </a:r>
+            <a:r>
+              <a:rPr lang="en-US" sz="2000" dirty="0"/>
+              <a:t> dados;</a:t>
+            </a:r>
+          </a:p>
+          <a:p>
+            <a:pPr marL="342900" indent="-342900">
+              <a:buAutoNum type="arabicPeriod"/>
+            </a:pPr>
+            <a:r>
+              <a:rPr lang="en-US" sz="2000" dirty="0"/>
+              <a:t> Delete </a:t>
+            </a:r>
+            <a:r>
+              <a:rPr lang="en-US" sz="2000" dirty="0" err="1"/>
+              <a:t>todos</a:t>
+            </a:r>
+            <a:r>
+              <a:rPr lang="en-US" sz="2000" dirty="0"/>
+              <a:t> </a:t>
+            </a:r>
+            <a:r>
+              <a:rPr lang="en-US" sz="2000" dirty="0" err="1"/>
+              <a:t>os</a:t>
+            </a:r>
+            <a:r>
+              <a:rPr lang="en-US" sz="2000" dirty="0"/>
+              <a:t> dados das </a:t>
+            </a:r>
+            <a:r>
+              <a:rPr lang="en-US" sz="2000" dirty="0" err="1"/>
+              <a:t>tabelas</a:t>
+            </a:r>
+            <a:r>
+              <a:rPr lang="en-US" sz="2000" dirty="0"/>
+              <a:t> com um </a:t>
+            </a:r>
+            <a:r>
+              <a:rPr lang="en-US" sz="2000" dirty="0" err="1"/>
+              <a:t>comando</a:t>
+            </a:r>
+            <a:r>
+              <a:rPr lang="en-US" sz="2000" dirty="0"/>
+              <a:t>.</a:t>
+            </a:r>
+          </a:p>
+          <a:p>
+            <a:endParaRPr lang="en-US" sz="2000" dirty="0"/>
+          </a:p>
+          <a:p>
+            <a:r>
+              <a:rPr lang="en-US" sz="2000" dirty="0"/>
+              <a:t>OBS: </a:t>
+            </a:r>
+            <a:r>
+              <a:rPr lang="en-US" sz="2000" dirty="0" err="1"/>
+              <a:t>Não</a:t>
+            </a:r>
+            <a:r>
+              <a:rPr lang="en-US" sz="2000" dirty="0"/>
+              <a:t> se </a:t>
+            </a:r>
+            <a:r>
+              <a:rPr lang="en-US" sz="2000" dirty="0" err="1"/>
+              <a:t>esqueça</a:t>
+            </a:r>
+            <a:r>
+              <a:rPr lang="en-US" sz="2000" dirty="0"/>
+              <a:t> de usar SET SQL_SAFE_UPDATES = 0;</a:t>
+            </a:r>
+          </a:p>
+        </p:txBody>
+      </p:sp>
+    </p:spTree>
+    <p:extLst>
+      <p:ext uri="{BB962C8B-B14F-4D97-AF65-F5344CB8AC3E}">
+        <p14:creationId xmlns:p14="http://schemas.microsoft.com/office/powerpoint/2010/main" val="2334101492"/>
+      </p:ext>
+    </p:extLst>
+  </p:cSld>
+  <p:clrMapOvr>
+    <a:masterClrMapping/>
+  </p:clrMapOvr>
+</p:sld>
+</file>
+
+<file path=ppt/slides/slide11.xml><?xml version="1.0" encoding="utf-8"?>
+<p:sld xmlns:a="http://schemas.openxmlformats.org/drawingml/2006/main" xmlns:r="http://schemas.openxmlformats.org/officeDocument/2006/relationships" xmlns:p="http://schemas.openxmlformats.org/presentationml/2006/main">
+  <p:cSld>
+    <p:spTree>
+      <p:nvGrpSpPr>
+        <p:cNvPr id="1" name="">
+          <a:extLst>
+            <a:ext uri="{FF2B5EF4-FFF2-40B4-BE49-F238E27FC236}">
               <a16:creationId xmlns:a16="http://schemas.microsoft.com/office/drawing/2014/main" id="{A9F73D6E-FC32-50DA-1CBC-9FDC465B155C}"/>
             </a:ext>
           </a:extLst>
@@ -4390,6 +5578,55 @@
           </a:p>
         </p:txBody>
       </p:sp>
+      <p:sp>
+        <p:nvSpPr>
+          <p:cNvPr id="8" name="Seta: para a Direita 7">
+            <a:extLst>
+              <a:ext uri="{FF2B5EF4-FFF2-40B4-BE49-F238E27FC236}">
+                <a16:creationId xmlns:a16="http://schemas.microsoft.com/office/drawing/2014/main" id="{5C7BCAF4-BD4C-0798-192A-479758143CFC}"/>
+              </a:ext>
+            </a:extLst>
+          </p:cNvPr>
+          <p:cNvSpPr/>
+          <p:nvPr/>
+        </p:nvSpPr>
+        <p:spPr>
+          <a:xfrm flipH="1">
+            <a:off x="2971798" y="2404991"/>
+            <a:ext cx="422031" cy="263768"/>
+          </a:xfrm>
+          <a:prstGeom prst="rightArrow">
+            <a:avLst/>
+          </a:prstGeom>
+          <a:solidFill>
+            <a:srgbClr val="FF0000"/>
+          </a:solidFill>
+        </p:spPr>
+        <p:style>
+          <a:lnRef idx="2">
+            <a:schemeClr val="accent1">
+              <a:shade val="15000"/>
+            </a:schemeClr>
+          </a:lnRef>
+          <a:fillRef idx="1">
+            <a:schemeClr val="accent1"/>
+          </a:fillRef>
+          <a:effectRef idx="0">
+            <a:schemeClr val="accent1"/>
+          </a:effectRef>
+          <a:fontRef idx="minor">
+            <a:schemeClr val="lt1"/>
+          </a:fontRef>
+        </p:style>
+        <p:txBody>
+          <a:bodyPr rtlCol="0" anchor="ctr"/>
+          <a:lstStyle/>
+          <a:p>
+            <a:pPr algn="ctr"/>
+            <a:endParaRPr lang="pt-BR"/>
+          </a:p>
+        </p:txBody>
+      </p:sp>
     </p:spTree>
     <p:extLst>
       <p:ext uri="{BB962C8B-B14F-4D97-AF65-F5344CB8AC3E}">
@@ -4404,6 +5641,879 @@
 </file>
 
 <file path=ppt/slides/slide4.xml><?xml version="1.0" encoding="utf-8"?>
+<p:sld xmlns:a="http://schemas.openxmlformats.org/drawingml/2006/main" xmlns:r="http://schemas.openxmlformats.org/officeDocument/2006/relationships" xmlns:p="http://schemas.openxmlformats.org/presentationml/2006/main">
+  <p:cSld>
+    <p:spTree>
+      <p:nvGrpSpPr>
+        <p:cNvPr id="1" name=""/>
+        <p:cNvGrpSpPr/>
+        <p:nvPr/>
+      </p:nvGrpSpPr>
+      <p:grpSpPr>
+        <a:xfrm>
+          <a:off x="0" y="0"/>
+          <a:ext cx="0" cy="0"/>
+          <a:chOff x="0" y="0"/>
+          <a:chExt cx="0" cy="0"/>
+        </a:xfrm>
+      </p:grpSpPr>
+      <p:pic>
+        <p:nvPicPr>
+          <p:cNvPr id="5" name="Imagem 4">
+            <a:extLst>
+              <a:ext uri="{FF2B5EF4-FFF2-40B4-BE49-F238E27FC236}">
+                <a16:creationId xmlns:a16="http://schemas.microsoft.com/office/drawing/2014/main" id="{778719FF-F7CE-4325-97A0-FF41192BC7AC}"/>
+              </a:ext>
+            </a:extLst>
+          </p:cNvPr>
+          <p:cNvPicPr>
+            <a:picLocks noChangeAspect="1"/>
+          </p:cNvPicPr>
+          <p:nvPr/>
+        </p:nvPicPr>
+        <p:blipFill>
+          <a:blip r:embed="rId3">
+            <a:extLst>
+              <a:ext uri="{28A0092B-C50C-407E-A947-70E740481C1C}">
+                <a14:useLocalDpi xmlns:a14="http://schemas.microsoft.com/office/drawing/2010/main" val="0"/>
+              </a:ext>
+            </a:extLst>
+          </a:blip>
+          <a:stretch>
+            <a:fillRect/>
+          </a:stretch>
+        </p:blipFill>
+        <p:spPr>
+          <a:xfrm>
+            <a:off x="-2" y="0"/>
+            <a:ext cx="12192000" cy="6858000"/>
+          </a:xfrm>
+          <a:prstGeom prst="rect">
+            <a:avLst/>
+          </a:prstGeom>
+        </p:spPr>
+      </p:pic>
+      <p:sp>
+        <p:nvSpPr>
+          <p:cNvPr id="6" name="CaixaDeTexto 5">
+            <a:extLst>
+              <a:ext uri="{FF2B5EF4-FFF2-40B4-BE49-F238E27FC236}">
+                <a16:creationId xmlns:a16="http://schemas.microsoft.com/office/drawing/2014/main" id="{39BBF6BF-6C28-843E-8D7C-54E5E79316A6}"/>
+              </a:ext>
+            </a:extLst>
+          </p:cNvPr>
+          <p:cNvSpPr txBox="1"/>
+          <p:nvPr/>
+        </p:nvSpPr>
+        <p:spPr>
+          <a:xfrm>
+            <a:off x="4279106" y="162426"/>
+            <a:ext cx="3633787" cy="646331"/>
+          </a:xfrm>
+          <a:prstGeom prst="rect">
+            <a:avLst/>
+          </a:prstGeom>
+          <a:noFill/>
+        </p:spPr>
+        <p:txBody>
+          <a:bodyPr wrap="square" rtlCol="0">
+            <a:spAutoFit/>
+          </a:bodyPr>
+          <a:lstStyle/>
+          <a:p>
+            <a:r>
+              <a:rPr lang="en-US" sz="3600" dirty="0"/>
+              <a:t>Comando CREATE</a:t>
+            </a:r>
+            <a:endParaRPr lang="pt-BR" sz="3600" dirty="0"/>
+          </a:p>
+        </p:txBody>
+      </p:sp>
+      <p:pic>
+        <p:nvPicPr>
+          <p:cNvPr id="8" name="Imagem 7">
+            <a:extLst>
+              <a:ext uri="{FF2B5EF4-FFF2-40B4-BE49-F238E27FC236}">
+                <a16:creationId xmlns:a16="http://schemas.microsoft.com/office/drawing/2014/main" id="{79C9AB27-9D6C-BFEE-3BFE-E3D84FCE42B2}"/>
+              </a:ext>
+            </a:extLst>
+          </p:cNvPr>
+          <p:cNvPicPr>
+            <a:picLocks noChangeAspect="1"/>
+          </p:cNvPicPr>
+          <p:nvPr/>
+        </p:nvPicPr>
+        <p:blipFill>
+          <a:blip r:embed="rId4"/>
+          <a:stretch>
+            <a:fillRect/>
+          </a:stretch>
+        </p:blipFill>
+        <p:spPr>
+          <a:xfrm>
+            <a:off x="2855266" y="1343658"/>
+            <a:ext cx="6481468" cy="2085342"/>
+          </a:xfrm>
+          <a:prstGeom prst="rect">
+            <a:avLst/>
+          </a:prstGeom>
+        </p:spPr>
+      </p:pic>
+      <p:pic>
+        <p:nvPicPr>
+          <p:cNvPr id="10" name="Imagem 9">
+            <a:extLst>
+              <a:ext uri="{FF2B5EF4-FFF2-40B4-BE49-F238E27FC236}">
+                <a16:creationId xmlns:a16="http://schemas.microsoft.com/office/drawing/2014/main" id="{1BF6E00B-9005-2186-FDAD-2F4834F595BF}"/>
+              </a:ext>
+            </a:extLst>
+          </p:cNvPr>
+          <p:cNvPicPr>
+            <a:picLocks noChangeAspect="1"/>
+          </p:cNvPicPr>
+          <p:nvPr/>
+        </p:nvPicPr>
+        <p:blipFill>
+          <a:blip r:embed="rId5"/>
+          <a:stretch>
+            <a:fillRect/>
+          </a:stretch>
+        </p:blipFill>
+        <p:spPr>
+          <a:xfrm>
+            <a:off x="1588171" y="3429000"/>
+            <a:ext cx="9015655" cy="657612"/>
+          </a:xfrm>
+          <a:prstGeom prst="rect">
+            <a:avLst/>
+          </a:prstGeom>
+        </p:spPr>
+      </p:pic>
+      <p:cxnSp>
+        <p:nvCxnSpPr>
+          <p:cNvPr id="12" name="Conector de Seta Reta 11">
+            <a:extLst>
+              <a:ext uri="{FF2B5EF4-FFF2-40B4-BE49-F238E27FC236}">
+                <a16:creationId xmlns:a16="http://schemas.microsoft.com/office/drawing/2014/main" id="{F2ADEBE6-B192-E25D-FBDE-E8F8065A0A74}"/>
+              </a:ext>
+            </a:extLst>
+          </p:cNvPr>
+          <p:cNvCxnSpPr>
+            <a:cxnSpLocks/>
+          </p:cNvCxnSpPr>
+          <p:nvPr/>
+        </p:nvCxnSpPr>
+        <p:spPr>
+          <a:xfrm flipH="1">
+            <a:off x="1441938" y="4018085"/>
+            <a:ext cx="852854" cy="754573"/>
+          </a:xfrm>
+          <a:prstGeom prst="straightConnector1">
+            <a:avLst/>
+          </a:prstGeom>
+          <a:ln>
+            <a:tailEnd type="triangle"/>
+          </a:ln>
+        </p:spPr>
+        <p:style>
+          <a:lnRef idx="1">
+            <a:schemeClr val="dk1"/>
+          </a:lnRef>
+          <a:fillRef idx="0">
+            <a:schemeClr val="dk1"/>
+          </a:fillRef>
+          <a:effectRef idx="0">
+            <a:schemeClr val="dk1"/>
+          </a:effectRef>
+          <a:fontRef idx="minor">
+            <a:schemeClr val="tx1"/>
+          </a:fontRef>
+        </p:style>
+      </p:cxnSp>
+      <p:cxnSp>
+        <p:nvCxnSpPr>
+          <p:cNvPr id="15" name="Conector de Seta Reta 14">
+            <a:extLst>
+              <a:ext uri="{FF2B5EF4-FFF2-40B4-BE49-F238E27FC236}">
+                <a16:creationId xmlns:a16="http://schemas.microsoft.com/office/drawing/2014/main" id="{3727BA92-63A0-F1BC-74DE-05A5AF25B4D7}"/>
+              </a:ext>
+            </a:extLst>
+          </p:cNvPr>
+          <p:cNvCxnSpPr>
+            <a:cxnSpLocks/>
+          </p:cNvCxnSpPr>
+          <p:nvPr/>
+        </p:nvCxnSpPr>
+        <p:spPr>
+          <a:xfrm flipH="1">
+            <a:off x="3226777" y="4086612"/>
+            <a:ext cx="79131" cy="928494"/>
+          </a:xfrm>
+          <a:prstGeom prst="straightConnector1">
+            <a:avLst/>
+          </a:prstGeom>
+          <a:ln>
+            <a:tailEnd type="triangle"/>
+          </a:ln>
+        </p:spPr>
+        <p:style>
+          <a:lnRef idx="1">
+            <a:schemeClr val="dk1"/>
+          </a:lnRef>
+          <a:fillRef idx="0">
+            <a:schemeClr val="dk1"/>
+          </a:fillRef>
+          <a:effectRef idx="0">
+            <a:schemeClr val="dk1"/>
+          </a:effectRef>
+          <a:fontRef idx="minor">
+            <a:schemeClr val="tx1"/>
+          </a:fontRef>
+        </p:style>
+      </p:cxnSp>
+      <p:cxnSp>
+        <p:nvCxnSpPr>
+          <p:cNvPr id="18" name="Conector de Seta Reta 17">
+            <a:extLst>
+              <a:ext uri="{FF2B5EF4-FFF2-40B4-BE49-F238E27FC236}">
+                <a16:creationId xmlns:a16="http://schemas.microsoft.com/office/drawing/2014/main" id="{B7DCBB4D-2820-209B-44C8-5BE88C126B99}"/>
+              </a:ext>
+            </a:extLst>
+          </p:cNvPr>
+          <p:cNvCxnSpPr>
+            <a:cxnSpLocks/>
+          </p:cNvCxnSpPr>
+          <p:nvPr/>
+        </p:nvCxnSpPr>
+        <p:spPr>
+          <a:xfrm>
+            <a:off x="4563208" y="4018085"/>
+            <a:ext cx="0" cy="997021"/>
+          </a:xfrm>
+          <a:prstGeom prst="straightConnector1">
+            <a:avLst/>
+          </a:prstGeom>
+          <a:ln>
+            <a:tailEnd type="triangle"/>
+          </a:ln>
+        </p:spPr>
+        <p:style>
+          <a:lnRef idx="1">
+            <a:schemeClr val="dk1"/>
+          </a:lnRef>
+          <a:fillRef idx="0">
+            <a:schemeClr val="dk1"/>
+          </a:fillRef>
+          <a:effectRef idx="0">
+            <a:schemeClr val="dk1"/>
+          </a:effectRef>
+          <a:fontRef idx="minor">
+            <a:schemeClr val="tx1"/>
+          </a:fontRef>
+        </p:style>
+      </p:cxnSp>
+      <p:cxnSp>
+        <p:nvCxnSpPr>
+          <p:cNvPr id="21" name="Conector de Seta Reta 20">
+            <a:extLst>
+              <a:ext uri="{FF2B5EF4-FFF2-40B4-BE49-F238E27FC236}">
+                <a16:creationId xmlns:a16="http://schemas.microsoft.com/office/drawing/2014/main" id="{A129D181-5AFE-1228-DF99-673156D75A82}"/>
+              </a:ext>
+            </a:extLst>
+          </p:cNvPr>
+          <p:cNvCxnSpPr>
+            <a:cxnSpLocks/>
+          </p:cNvCxnSpPr>
+          <p:nvPr/>
+        </p:nvCxnSpPr>
+        <p:spPr>
+          <a:xfrm>
+            <a:off x="6638193" y="4086612"/>
+            <a:ext cx="0" cy="928494"/>
+          </a:xfrm>
+          <a:prstGeom prst="straightConnector1">
+            <a:avLst/>
+          </a:prstGeom>
+          <a:ln>
+            <a:tailEnd type="triangle"/>
+          </a:ln>
+        </p:spPr>
+        <p:style>
+          <a:lnRef idx="1">
+            <a:schemeClr val="dk1"/>
+          </a:lnRef>
+          <a:fillRef idx="0">
+            <a:schemeClr val="dk1"/>
+          </a:fillRef>
+          <a:effectRef idx="0">
+            <a:schemeClr val="dk1"/>
+          </a:effectRef>
+          <a:fontRef idx="minor">
+            <a:schemeClr val="tx1"/>
+          </a:fontRef>
+        </p:style>
+      </p:cxnSp>
+      <p:cxnSp>
+        <p:nvCxnSpPr>
+          <p:cNvPr id="24" name="Conector de Seta Reta 23">
+            <a:extLst>
+              <a:ext uri="{FF2B5EF4-FFF2-40B4-BE49-F238E27FC236}">
+                <a16:creationId xmlns:a16="http://schemas.microsoft.com/office/drawing/2014/main" id="{74CC7A68-586D-A3BF-4331-42C01F368DFB}"/>
+              </a:ext>
+            </a:extLst>
+          </p:cNvPr>
+          <p:cNvCxnSpPr>
+            <a:cxnSpLocks/>
+          </p:cNvCxnSpPr>
+          <p:nvPr/>
+        </p:nvCxnSpPr>
+        <p:spPr>
+          <a:xfrm>
+            <a:off x="9336734" y="4018085"/>
+            <a:ext cx="0" cy="997021"/>
+          </a:xfrm>
+          <a:prstGeom prst="straightConnector1">
+            <a:avLst/>
+          </a:prstGeom>
+          <a:ln>
+            <a:tailEnd type="triangle"/>
+          </a:ln>
+        </p:spPr>
+        <p:style>
+          <a:lnRef idx="1">
+            <a:schemeClr val="dk1"/>
+          </a:lnRef>
+          <a:fillRef idx="0">
+            <a:schemeClr val="dk1"/>
+          </a:fillRef>
+          <a:effectRef idx="0">
+            <a:schemeClr val="dk1"/>
+          </a:effectRef>
+          <a:fontRef idx="minor">
+            <a:schemeClr val="tx1"/>
+          </a:fontRef>
+        </p:style>
+      </p:cxnSp>
+      <p:sp>
+        <p:nvSpPr>
+          <p:cNvPr id="26" name="CaixaDeTexto 25">
+            <a:extLst>
+              <a:ext uri="{FF2B5EF4-FFF2-40B4-BE49-F238E27FC236}">
+                <a16:creationId xmlns:a16="http://schemas.microsoft.com/office/drawing/2014/main" id="{4E55AD1B-D3AD-923B-0703-62D260DDE8C4}"/>
+              </a:ext>
+            </a:extLst>
+          </p:cNvPr>
+          <p:cNvSpPr txBox="1"/>
+          <p:nvPr/>
+        </p:nvSpPr>
+        <p:spPr>
+          <a:xfrm>
+            <a:off x="647233" y="4849323"/>
+            <a:ext cx="1060711" cy="646331"/>
+          </a:xfrm>
+          <a:prstGeom prst="rect">
+            <a:avLst/>
+          </a:prstGeom>
+          <a:noFill/>
+        </p:spPr>
+        <p:txBody>
+          <a:bodyPr wrap="square" rtlCol="0">
+            <a:spAutoFit/>
+          </a:bodyPr>
+          <a:lstStyle/>
+          <a:p>
+            <a:r>
+              <a:rPr lang="en-US" dirty="0"/>
+              <a:t>Nome do </a:t>
+            </a:r>
+            <a:r>
+              <a:rPr lang="en-US" dirty="0" err="1"/>
+              <a:t>Atributo</a:t>
+            </a:r>
+            <a:endParaRPr lang="pt-BR" dirty="0"/>
+          </a:p>
+        </p:txBody>
+      </p:sp>
+      <p:sp>
+        <p:nvSpPr>
+          <p:cNvPr id="27" name="CaixaDeTexto 26">
+            <a:extLst>
+              <a:ext uri="{FF2B5EF4-FFF2-40B4-BE49-F238E27FC236}">
+                <a16:creationId xmlns:a16="http://schemas.microsoft.com/office/drawing/2014/main" id="{F775F0BE-8064-6993-10C1-38805A4389C3}"/>
+              </a:ext>
+            </a:extLst>
+          </p:cNvPr>
+          <p:cNvSpPr txBox="1"/>
+          <p:nvPr/>
+        </p:nvSpPr>
+        <p:spPr>
+          <a:xfrm>
+            <a:off x="2696421" y="5146111"/>
+            <a:ext cx="1060711" cy="646331"/>
+          </a:xfrm>
+          <a:prstGeom prst="rect">
+            <a:avLst/>
+          </a:prstGeom>
+          <a:noFill/>
+        </p:spPr>
+        <p:txBody>
+          <a:bodyPr wrap="square" rtlCol="0">
+            <a:spAutoFit/>
+          </a:bodyPr>
+          <a:lstStyle/>
+          <a:p>
+            <a:r>
+              <a:rPr lang="en-US" dirty="0"/>
+              <a:t>Tipo do </a:t>
+            </a:r>
+            <a:r>
+              <a:rPr lang="en-US" dirty="0" err="1"/>
+              <a:t>Atributo</a:t>
+            </a:r>
+            <a:endParaRPr lang="pt-BR" dirty="0"/>
+          </a:p>
+        </p:txBody>
+      </p:sp>
+      <p:sp>
+        <p:nvSpPr>
+          <p:cNvPr id="28" name="CaixaDeTexto 27">
+            <a:extLst>
+              <a:ext uri="{FF2B5EF4-FFF2-40B4-BE49-F238E27FC236}">
+                <a16:creationId xmlns:a16="http://schemas.microsoft.com/office/drawing/2014/main" id="{F73AE8B8-376E-7DB2-EB08-98211C63B96E}"/>
+              </a:ext>
+            </a:extLst>
+          </p:cNvPr>
+          <p:cNvSpPr txBox="1"/>
+          <p:nvPr/>
+        </p:nvSpPr>
+        <p:spPr>
+          <a:xfrm>
+            <a:off x="3947746" y="5172488"/>
+            <a:ext cx="1371597" cy="1477328"/>
+          </a:xfrm>
+          <a:prstGeom prst="rect">
+            <a:avLst/>
+          </a:prstGeom>
+          <a:noFill/>
+        </p:spPr>
+        <p:txBody>
+          <a:bodyPr wrap="square" rtlCol="0">
+            <a:spAutoFit/>
+          </a:bodyPr>
+          <a:lstStyle/>
+          <a:p>
+            <a:pPr algn="ctr"/>
+            <a:r>
+              <a:rPr lang="en-US" dirty="0"/>
+              <a:t>Indica que o </a:t>
+            </a:r>
+            <a:r>
+              <a:rPr lang="en-US" dirty="0" err="1"/>
+              <a:t>Atributo</a:t>
+            </a:r>
+            <a:r>
+              <a:rPr lang="en-US" dirty="0"/>
+              <a:t> </a:t>
+            </a:r>
+            <a:r>
+              <a:rPr lang="en-US" u="sng" dirty="0" err="1"/>
+              <a:t>não</a:t>
+            </a:r>
+            <a:r>
+              <a:rPr lang="en-US" u="sng" dirty="0"/>
+              <a:t> </a:t>
+            </a:r>
+            <a:r>
+              <a:rPr lang="en-US" u="sng" dirty="0" err="1"/>
+              <a:t>pode</a:t>
+            </a:r>
+            <a:r>
+              <a:rPr lang="en-US" u="sng" dirty="0"/>
+              <a:t> ser </a:t>
+            </a:r>
+            <a:r>
+              <a:rPr lang="en-US" u="sng" dirty="0" err="1"/>
+              <a:t>nulo</a:t>
+            </a:r>
+            <a:r>
+              <a:rPr lang="en-US" dirty="0"/>
+              <a:t> (NOT NULL)</a:t>
+            </a:r>
+            <a:endParaRPr lang="pt-BR" dirty="0"/>
+          </a:p>
+        </p:txBody>
+      </p:sp>
+      <p:sp>
+        <p:nvSpPr>
+          <p:cNvPr id="29" name="CaixaDeTexto 28">
+            <a:extLst>
+              <a:ext uri="{FF2B5EF4-FFF2-40B4-BE49-F238E27FC236}">
+                <a16:creationId xmlns:a16="http://schemas.microsoft.com/office/drawing/2014/main" id="{AD911C3A-F14B-D6C5-5E59-858CCEC673FE}"/>
+              </a:ext>
+            </a:extLst>
+          </p:cNvPr>
+          <p:cNvSpPr txBox="1"/>
+          <p:nvPr/>
+        </p:nvSpPr>
+        <p:spPr>
+          <a:xfrm>
+            <a:off x="5459965" y="5103674"/>
+            <a:ext cx="2514599" cy="1754326"/>
+          </a:xfrm>
+          <a:prstGeom prst="rect">
+            <a:avLst/>
+          </a:prstGeom>
+          <a:noFill/>
+        </p:spPr>
+        <p:txBody>
+          <a:bodyPr wrap="square" rtlCol="0">
+            <a:spAutoFit/>
+          </a:bodyPr>
+          <a:lstStyle/>
+          <a:p>
+            <a:pPr algn="ctr"/>
+            <a:r>
+              <a:rPr lang="en-US" dirty="0"/>
+              <a:t>Para </a:t>
+            </a:r>
+            <a:r>
+              <a:rPr lang="en-US" dirty="0" err="1"/>
+              <a:t>Atributos</a:t>
+            </a:r>
+            <a:r>
+              <a:rPr lang="en-US" dirty="0"/>
+              <a:t> </a:t>
+            </a:r>
+            <a:r>
+              <a:rPr lang="en-US" dirty="0" err="1"/>
+              <a:t>numéricos</a:t>
+            </a:r>
+            <a:r>
+              <a:rPr lang="en-US" dirty="0"/>
+              <a:t>, </a:t>
+            </a:r>
+            <a:r>
+              <a:rPr lang="en-US" dirty="0" err="1"/>
+              <a:t>esse</a:t>
+            </a:r>
+            <a:r>
+              <a:rPr lang="en-US" dirty="0"/>
+              <a:t> </a:t>
+            </a:r>
+            <a:r>
+              <a:rPr lang="en-US" dirty="0" err="1"/>
+              <a:t>modificador</a:t>
+            </a:r>
+            <a:r>
+              <a:rPr lang="en-US" dirty="0"/>
+              <a:t> </a:t>
+            </a:r>
+            <a:r>
+              <a:rPr lang="en-US" dirty="0" err="1"/>
+              <a:t>incrementa</a:t>
+            </a:r>
+            <a:r>
+              <a:rPr lang="en-US" dirty="0"/>
+              <a:t> </a:t>
+            </a:r>
+            <a:r>
+              <a:rPr lang="en-US" dirty="0" err="1"/>
+              <a:t>em</a:t>
+            </a:r>
+            <a:r>
+              <a:rPr lang="en-US" dirty="0"/>
+              <a:t> 1 no </a:t>
+            </a:r>
+            <a:r>
+              <a:rPr lang="en-US" dirty="0" err="1"/>
+              <a:t>último</a:t>
+            </a:r>
+            <a:r>
+              <a:rPr lang="en-US" dirty="0"/>
+              <a:t> </a:t>
+            </a:r>
+            <a:r>
+              <a:rPr lang="en-US" dirty="0" err="1"/>
+              <a:t>inserido</a:t>
+            </a:r>
+            <a:r>
+              <a:rPr lang="en-US" dirty="0"/>
+              <a:t>, </a:t>
+            </a:r>
+            <a:r>
+              <a:rPr lang="en-US" dirty="0" err="1"/>
+              <a:t>sem</a:t>
+            </a:r>
+            <a:r>
+              <a:rPr lang="en-US" dirty="0"/>
+              <a:t> a </a:t>
+            </a:r>
+            <a:r>
+              <a:rPr lang="en-US" dirty="0" err="1"/>
+              <a:t>necessidade</a:t>
+            </a:r>
+            <a:r>
+              <a:rPr lang="en-US" dirty="0"/>
+              <a:t> de </a:t>
+            </a:r>
+            <a:r>
+              <a:rPr lang="en-US" dirty="0" err="1"/>
+              <a:t>inserir</a:t>
+            </a:r>
+            <a:r>
+              <a:rPr lang="en-US" dirty="0"/>
+              <a:t> </a:t>
+            </a:r>
+            <a:r>
+              <a:rPr lang="en-US" dirty="0" err="1"/>
+              <a:t>manualmente</a:t>
+            </a:r>
+            <a:endParaRPr lang="pt-BR" dirty="0"/>
+          </a:p>
+        </p:txBody>
+      </p:sp>
+      <p:sp>
+        <p:nvSpPr>
+          <p:cNvPr id="30" name="CaixaDeTexto 29">
+            <a:extLst>
+              <a:ext uri="{FF2B5EF4-FFF2-40B4-BE49-F238E27FC236}">
+                <a16:creationId xmlns:a16="http://schemas.microsoft.com/office/drawing/2014/main" id="{1CAC4345-3181-A751-F1B8-E5E633F729D3}"/>
+              </a:ext>
+            </a:extLst>
+          </p:cNvPr>
+          <p:cNvSpPr txBox="1"/>
+          <p:nvPr/>
+        </p:nvSpPr>
+        <p:spPr>
+          <a:xfrm>
+            <a:off x="8563708" y="5266592"/>
+            <a:ext cx="1740876" cy="1477328"/>
+          </a:xfrm>
+          <a:prstGeom prst="rect">
+            <a:avLst/>
+          </a:prstGeom>
+          <a:noFill/>
+        </p:spPr>
+        <p:txBody>
+          <a:bodyPr wrap="square" rtlCol="0">
+            <a:spAutoFit/>
+          </a:bodyPr>
+          <a:lstStyle/>
+          <a:p>
+            <a:pPr algn="ctr"/>
+            <a:r>
+              <a:rPr lang="en-US" dirty="0"/>
+              <a:t>Indica que </a:t>
+            </a:r>
+            <a:r>
+              <a:rPr lang="en-US" dirty="0" err="1"/>
+              <a:t>este</a:t>
+            </a:r>
+            <a:r>
+              <a:rPr lang="en-US" dirty="0"/>
+              <a:t> é um </a:t>
+            </a:r>
+            <a:r>
+              <a:rPr lang="en-US" dirty="0" err="1"/>
+              <a:t>Atributo</a:t>
+            </a:r>
+            <a:r>
+              <a:rPr lang="en-US" dirty="0"/>
+              <a:t> </a:t>
+            </a:r>
+            <a:r>
+              <a:rPr lang="en-US" dirty="0" err="1"/>
+              <a:t>chave</a:t>
+            </a:r>
+            <a:r>
+              <a:rPr lang="en-US" dirty="0"/>
+              <a:t> para a </a:t>
+            </a:r>
+            <a:r>
+              <a:rPr lang="en-US" dirty="0" err="1"/>
+              <a:t>tabela</a:t>
+            </a:r>
+            <a:r>
+              <a:rPr lang="en-US" dirty="0"/>
+              <a:t> </a:t>
+            </a:r>
+            <a:r>
+              <a:rPr lang="en-US" dirty="0" err="1"/>
+              <a:t>em</a:t>
+            </a:r>
+            <a:r>
+              <a:rPr lang="en-US" dirty="0"/>
+              <a:t> </a:t>
+            </a:r>
+            <a:r>
+              <a:rPr lang="en-US" dirty="0" err="1"/>
+              <a:t>questão</a:t>
+            </a:r>
+            <a:endParaRPr lang="pt-BR" dirty="0"/>
+          </a:p>
+        </p:txBody>
+      </p:sp>
+      <p:pic>
+        <p:nvPicPr>
+          <p:cNvPr id="32" name="Imagem 31">
+            <a:extLst>
+              <a:ext uri="{FF2B5EF4-FFF2-40B4-BE49-F238E27FC236}">
+                <a16:creationId xmlns:a16="http://schemas.microsoft.com/office/drawing/2014/main" id="{B2B0B117-7EBB-8952-6EFE-5DB3655D4B42}"/>
+              </a:ext>
+            </a:extLst>
+          </p:cNvPr>
+          <p:cNvPicPr>
+            <a:picLocks noChangeAspect="1"/>
+          </p:cNvPicPr>
+          <p:nvPr/>
+        </p:nvPicPr>
+        <p:blipFill>
+          <a:blip r:embed="rId6"/>
+          <a:stretch>
+            <a:fillRect/>
+          </a:stretch>
+        </p:blipFill>
+        <p:spPr>
+          <a:xfrm>
+            <a:off x="424813" y="485591"/>
+            <a:ext cx="1714739" cy="238158"/>
+          </a:xfrm>
+          <a:prstGeom prst="rect">
+            <a:avLst/>
+          </a:prstGeom>
+        </p:spPr>
+      </p:pic>
+      <p:pic>
+        <p:nvPicPr>
+          <p:cNvPr id="34" name="Imagem 33">
+            <a:extLst>
+              <a:ext uri="{FF2B5EF4-FFF2-40B4-BE49-F238E27FC236}">
+                <a16:creationId xmlns:a16="http://schemas.microsoft.com/office/drawing/2014/main" id="{4DA609A2-196C-8450-5FEB-881EF59C4F53}"/>
+              </a:ext>
+            </a:extLst>
+          </p:cNvPr>
+          <p:cNvPicPr>
+            <a:picLocks noChangeAspect="1"/>
+          </p:cNvPicPr>
+          <p:nvPr/>
+        </p:nvPicPr>
+        <p:blipFill>
+          <a:blip r:embed="rId7"/>
+          <a:stretch>
+            <a:fillRect/>
+          </a:stretch>
+        </p:blipFill>
+        <p:spPr>
+          <a:xfrm>
+            <a:off x="8251932" y="485591"/>
+            <a:ext cx="3781953" cy="428685"/>
+          </a:xfrm>
+          <a:prstGeom prst="rect">
+            <a:avLst/>
+          </a:prstGeom>
+        </p:spPr>
+      </p:pic>
+      <p:cxnSp>
+        <p:nvCxnSpPr>
+          <p:cNvPr id="36" name="Conector: Angulado 35">
+            <a:extLst>
+              <a:ext uri="{FF2B5EF4-FFF2-40B4-BE49-F238E27FC236}">
+                <a16:creationId xmlns:a16="http://schemas.microsoft.com/office/drawing/2014/main" id="{32F501D2-20E4-B124-FB9B-309440F6DF6E}"/>
+              </a:ext>
+            </a:extLst>
+          </p:cNvPr>
+          <p:cNvCxnSpPr>
+            <a:cxnSpLocks/>
+          </p:cNvCxnSpPr>
+          <p:nvPr/>
+        </p:nvCxnSpPr>
+        <p:spPr>
+          <a:xfrm flipV="1">
+            <a:off x="4070838" y="1101436"/>
+            <a:ext cx="562706" cy="334541"/>
+          </a:xfrm>
+          <a:prstGeom prst="bentConnector3">
+            <a:avLst>
+              <a:gd name="adj1" fmla="val -3125"/>
+            </a:avLst>
+          </a:prstGeom>
+          <a:ln>
+            <a:tailEnd type="triangle"/>
+          </a:ln>
+        </p:spPr>
+        <p:style>
+          <a:lnRef idx="1">
+            <a:schemeClr val="accent2"/>
+          </a:lnRef>
+          <a:fillRef idx="0">
+            <a:schemeClr val="accent2"/>
+          </a:fillRef>
+          <a:effectRef idx="0">
+            <a:schemeClr val="accent2"/>
+          </a:effectRef>
+          <a:fontRef idx="minor">
+            <a:schemeClr val="tx1"/>
+          </a:fontRef>
+        </p:style>
+      </p:cxnSp>
+      <p:sp>
+        <p:nvSpPr>
+          <p:cNvPr id="43" name="CaixaDeTexto 42">
+            <a:extLst>
+              <a:ext uri="{FF2B5EF4-FFF2-40B4-BE49-F238E27FC236}">
+                <a16:creationId xmlns:a16="http://schemas.microsoft.com/office/drawing/2014/main" id="{B8226EE7-7817-7E0C-CE39-EA396CFA9162}"/>
+              </a:ext>
+            </a:extLst>
+          </p:cNvPr>
+          <p:cNvSpPr txBox="1"/>
+          <p:nvPr/>
+        </p:nvSpPr>
+        <p:spPr>
+          <a:xfrm>
+            <a:off x="4633544" y="930042"/>
+            <a:ext cx="975946" cy="369332"/>
+          </a:xfrm>
+          <a:prstGeom prst="rect">
+            <a:avLst/>
+          </a:prstGeom>
+          <a:noFill/>
+        </p:spPr>
+        <p:txBody>
+          <a:bodyPr wrap="square" rtlCol="0">
+            <a:spAutoFit/>
+          </a:bodyPr>
+          <a:lstStyle/>
+          <a:p>
+            <a:r>
+              <a:rPr lang="en-US" dirty="0" err="1">
+                <a:solidFill>
+                  <a:srgbClr val="FF0000"/>
+                </a:solidFill>
+              </a:rPr>
+              <a:t>Cláusula</a:t>
+            </a:r>
+            <a:endParaRPr lang="pt-BR" dirty="0">
+              <a:solidFill>
+                <a:srgbClr val="FF0000"/>
+              </a:solidFill>
+            </a:endParaRPr>
+          </a:p>
+        </p:txBody>
+      </p:sp>
+    </p:spTree>
+    <p:extLst>
+      <p:ext uri="{BB962C8B-B14F-4D97-AF65-F5344CB8AC3E}">
+        <p14:creationId xmlns:p14="http://schemas.microsoft.com/office/powerpoint/2010/main" val="3456320147"/>
+      </p:ext>
+    </p:extLst>
+  </p:cSld>
+  <p:clrMapOvr>
+    <a:masterClrMapping/>
+  </p:clrMapOvr>
+</p:sld>
+</file>
+
+<file path=ppt/slides/slide5.xml><?xml version="1.0" encoding="utf-8"?>
 <p:sld xmlns:a="http://schemas.openxmlformats.org/drawingml/2006/main" xmlns:r="http://schemas.openxmlformats.org/officeDocument/2006/relationships" xmlns:p="http://schemas.openxmlformats.org/presentationml/2006/main">
   <p:cSld>
     <p:spTree>
@@ -4596,60 +6706,9 @@
           </a:prstGeom>
         </p:spPr>
       </p:pic>
-      <mc:AlternateContent xmlns:mc="http://schemas.openxmlformats.org/markup-compatibility/2006">
-        <mc:Choice xmlns:p14="http://schemas.microsoft.com/office/powerpoint/2010/main" Requires="p14">
+      <mc:AlternateContent xmlns:mc="http://schemas.openxmlformats.org/markup-compatibility/2006" xmlns:p14="http://schemas.microsoft.com/office/powerpoint/2010/main">
+        <mc:Choice Requires="p14">
           <p:contentPart p14:bwMode="auto" r:id="rId4">
-            <p14:nvContentPartPr>
-              <p14:cNvPr id="13" name="Tinta 12">
-                <a:extLst>
-                  <a:ext uri="{FF2B5EF4-FFF2-40B4-BE49-F238E27FC236}">
-                    <a16:creationId xmlns:a16="http://schemas.microsoft.com/office/drawing/2014/main" id="{B78524E7-214E-97FE-582B-5ADD4D913F6A}"/>
-                  </a:ext>
-                </a:extLst>
-              </p14:cNvPr>
-              <p14:cNvContentPartPr/>
-              <p14:nvPr/>
-            </p14:nvContentPartPr>
-            <p14:xfrm>
-              <a:off x="4290286" y="2620260"/>
-              <a:ext cx="1731960" cy="17640"/>
-            </p14:xfrm>
-          </p:contentPart>
-        </mc:Choice>
-        <mc:Fallback>
-          <p:pic>
-            <p:nvPicPr>
-              <p:cNvPr id="13" name="Tinta 12">
-                <a:extLst>
-                  <a:ext uri="{FF2B5EF4-FFF2-40B4-BE49-F238E27FC236}">
-                    <a16:creationId xmlns:a16="http://schemas.microsoft.com/office/drawing/2014/main" id="{B78524E7-214E-97FE-582B-5ADD4D913F6A}"/>
-                  </a:ext>
-                </a:extLst>
-              </p:cNvPr>
-              <p:cNvPicPr/>
-              <p:nvPr/>
-            </p:nvPicPr>
-            <p:blipFill>
-              <a:blip r:embed="rId5"/>
-              <a:stretch>
-                <a:fillRect/>
-              </a:stretch>
-            </p:blipFill>
-            <p:spPr>
-              <a:xfrm>
-                <a:off x="4284166" y="2613780"/>
-                <a:ext cx="1744200" cy="29880"/>
-              </a:xfrm>
-              <a:prstGeom prst="rect">
-                <a:avLst/>
-              </a:prstGeom>
-            </p:spPr>
-          </p:pic>
-        </mc:Fallback>
-      </mc:AlternateContent>
-      <mc:AlternateContent xmlns:mc="http://schemas.openxmlformats.org/markup-compatibility/2006">
-        <mc:Choice xmlns:p14="http://schemas.microsoft.com/office/powerpoint/2010/main" Requires="p14">
-          <p:contentPart p14:bwMode="auto" r:id="rId6">
             <p14:nvContentPartPr>
               <p14:cNvPr id="17" name="Tinta 16">
                 <a:extLst>
@@ -4667,7 +6726,7 @@
             </p14:xfrm>
           </p:contentPart>
         </mc:Choice>
-        <mc:Fallback>
+        <mc:Fallback xmlns="">
           <p:pic>
             <p:nvPicPr>
               <p:cNvPr id="17" name="Tinta 16">
@@ -4698,8 +6757,8 @@
           </p:pic>
         </mc:Fallback>
       </mc:AlternateContent>
-      <mc:AlternateContent xmlns:mc="http://schemas.openxmlformats.org/markup-compatibility/2006">
-        <mc:Choice xmlns:p14="http://schemas.microsoft.com/office/powerpoint/2010/main" Requires="p14">
+      <mc:AlternateContent xmlns:mc="http://schemas.openxmlformats.org/markup-compatibility/2006" xmlns:p14="http://schemas.microsoft.com/office/powerpoint/2010/main">
+        <mc:Choice Requires="p14">
           <p:contentPart p14:bwMode="auto" r:id="rId8">
             <p14:nvContentPartPr>
               <p14:cNvPr id="19" name="Tinta 18">
@@ -4718,7 +6777,7 @@
             </p14:xfrm>
           </p:contentPart>
         </mc:Choice>
-        <mc:Fallback>
+        <mc:Fallback xmlns="">
           <p:pic>
             <p:nvPicPr>
               <p:cNvPr id="19" name="Tinta 18">
@@ -4763,8 +6822,8 @@
         </p:nvSpPr>
         <p:spPr>
           <a:xfrm>
-            <a:off x="4376005" y="5314746"/>
-            <a:ext cx="1047240" cy="369332"/>
+            <a:off x="4346285" y="5292740"/>
+            <a:ext cx="987801" cy="369332"/>
           </a:xfrm>
           <a:prstGeom prst="rect">
             <a:avLst/>
@@ -4807,7 +6866,7 @@
         </p:nvSpPr>
         <p:spPr>
           <a:xfrm>
-            <a:off x="4211086" y="3976323"/>
+            <a:off x="4211086" y="3912146"/>
             <a:ext cx="1047240" cy="369332"/>
           </a:xfrm>
           <a:prstGeom prst="rect">
@@ -4881,6 +6940,57 @@
           </a:p>
         </p:txBody>
       </p:sp>
+      <mc:AlternateContent xmlns:mc="http://schemas.openxmlformats.org/markup-compatibility/2006">
+        <mc:Choice xmlns:p14="http://schemas.microsoft.com/office/powerpoint/2010/main" Requires="p14">
+          <p:contentPart p14:bwMode="auto" r:id="rId10">
+            <p14:nvContentPartPr>
+              <p14:cNvPr id="2" name="Tinta 1">
+                <a:extLst>
+                  <a:ext uri="{FF2B5EF4-FFF2-40B4-BE49-F238E27FC236}">
+                    <a16:creationId xmlns:a16="http://schemas.microsoft.com/office/drawing/2014/main" id="{E727C470-A265-AF3C-4586-127D492D5AB9}"/>
+                  </a:ext>
+                </a:extLst>
+              </p14:cNvPr>
+              <p14:cNvContentPartPr/>
+              <p14:nvPr/>
+            </p14:nvContentPartPr>
+            <p14:xfrm>
+              <a:off x="4316565" y="2615267"/>
+              <a:ext cx="1662203" cy="720"/>
+            </p14:xfrm>
+          </p:contentPart>
+        </mc:Choice>
+        <mc:Fallback>
+          <p:pic>
+            <p:nvPicPr>
+              <p:cNvPr id="2" name="Tinta 1">
+                <a:extLst>
+                  <a:ext uri="{FF2B5EF4-FFF2-40B4-BE49-F238E27FC236}">
+                    <a16:creationId xmlns:a16="http://schemas.microsoft.com/office/drawing/2014/main" id="{E727C470-A265-AF3C-4586-127D492D5AB9}"/>
+                  </a:ext>
+                </a:extLst>
+              </p:cNvPr>
+              <p:cNvPicPr/>
+              <p:nvPr/>
+            </p:nvPicPr>
+            <p:blipFill>
+              <a:blip r:embed="rId11"/>
+              <a:stretch>
+                <a:fillRect/>
+              </a:stretch>
+            </p:blipFill>
+            <p:spPr>
+              <a:xfrm>
+                <a:off x="4310441" y="2603027"/>
+                <a:ext cx="1674452" cy="25200"/>
+              </a:xfrm>
+              <a:prstGeom prst="rect">
+                <a:avLst/>
+              </a:prstGeom>
+            </p:spPr>
+          </p:pic>
+        </mc:Fallback>
+      </mc:AlternateContent>
     </p:spTree>
     <p:extLst>
       <p:ext uri="{BB962C8B-B14F-4D97-AF65-F5344CB8AC3E}">
@@ -4894,7 +7004,7 @@
 </p:sld>
 </file>
 
-<file path=ppt/slides/slide5.xml><?xml version="1.0" encoding="utf-8"?>
+<file path=ppt/slides/slide6.xml><?xml version="1.0" encoding="utf-8"?>
 <p:sld xmlns:a="http://schemas.openxmlformats.org/drawingml/2006/main" xmlns:r="http://schemas.openxmlformats.org/officeDocument/2006/relationships" xmlns:p="http://schemas.openxmlformats.org/presentationml/2006/main">
   <p:cSld>
     <p:spTree>
@@ -5087,8 +7197,8 @@
           </a:prstGeom>
         </p:spPr>
       </p:pic>
-      <mc:AlternateContent xmlns:mc="http://schemas.openxmlformats.org/markup-compatibility/2006">
-        <mc:Choice xmlns:p14="http://schemas.microsoft.com/office/powerpoint/2010/main" Requires="p14">
+      <mc:AlternateContent xmlns:mc="http://schemas.openxmlformats.org/markup-compatibility/2006" xmlns:p14="http://schemas.microsoft.com/office/powerpoint/2010/main">
+        <mc:Choice Requires="p14">
           <p:contentPart p14:bwMode="auto" r:id="rId4">
             <p14:nvContentPartPr>
               <p14:cNvPr id="9" name="Tinta 8">
@@ -5107,7 +7217,7 @@
             </p14:xfrm>
           </p:contentPart>
         </mc:Choice>
-        <mc:Fallback>
+        <mc:Fallback xmlns="">
           <p:pic>
             <p:nvPicPr>
               <p:cNvPr id="9" name="Tinta 8">
@@ -5577,7 +7687,7 @@
 </p:sld>
 </file>
 
-<file path=ppt/slides/slide6.xml><?xml version="1.0" encoding="utf-8"?>
+<file path=ppt/slides/slide7.xml><?xml version="1.0" encoding="utf-8"?>
 <p:sld xmlns:a="http://schemas.openxmlformats.org/drawingml/2006/main" xmlns:r="http://schemas.openxmlformats.org/officeDocument/2006/relationships" xmlns:p="http://schemas.openxmlformats.org/presentationml/2006/main">
   <p:cSld>
     <p:spTree>
@@ -5778,8 +7888,8 @@
           </a:prstGeom>
         </p:spPr>
       </p:pic>
-      <mc:AlternateContent xmlns:mc="http://schemas.openxmlformats.org/markup-compatibility/2006">
-        <mc:Choice xmlns:p14="http://schemas.microsoft.com/office/powerpoint/2010/main" Requires="p14">
+      <mc:AlternateContent xmlns:mc="http://schemas.openxmlformats.org/markup-compatibility/2006" xmlns:p14="http://schemas.microsoft.com/office/powerpoint/2010/main">
+        <mc:Choice Requires="p14">
           <p:contentPart p14:bwMode="auto" r:id="rId4">
             <p14:nvContentPartPr>
               <p14:cNvPr id="10" name="Tinta 9">
@@ -5798,7 +7908,7 @@
             </p14:xfrm>
           </p:contentPart>
         </mc:Choice>
-        <mc:Fallback>
+        <mc:Fallback xmlns="">
           <p:pic>
             <p:nvPicPr>
               <p:cNvPr id="10" name="Tinta 9">
@@ -5829,8 +7939,8 @@
           </p:pic>
         </mc:Fallback>
       </mc:AlternateContent>
-      <mc:AlternateContent xmlns:mc="http://schemas.openxmlformats.org/markup-compatibility/2006">
-        <mc:Choice xmlns:p14="http://schemas.microsoft.com/office/powerpoint/2010/main" Requires="p14">
+      <mc:AlternateContent xmlns:mc="http://schemas.openxmlformats.org/markup-compatibility/2006" xmlns:p14="http://schemas.microsoft.com/office/powerpoint/2010/main">
+        <mc:Choice Requires="p14">
           <p:contentPart p14:bwMode="auto" r:id="rId6">
             <p14:nvContentPartPr>
               <p14:cNvPr id="12" name="Tinta 11">
@@ -5849,7 +7959,7 @@
             </p14:xfrm>
           </p:contentPart>
         </mc:Choice>
-        <mc:Fallback>
+        <mc:Fallback xmlns="">
           <p:pic>
             <p:nvPicPr>
               <p:cNvPr id="12" name="Tinta 11">
@@ -5880,8 +7990,8 @@
           </p:pic>
         </mc:Fallback>
       </mc:AlternateContent>
-      <mc:AlternateContent xmlns:mc="http://schemas.openxmlformats.org/markup-compatibility/2006">
-        <mc:Choice xmlns:p14="http://schemas.microsoft.com/office/powerpoint/2010/main" Requires="p14">
+      <mc:AlternateContent xmlns:mc="http://schemas.openxmlformats.org/markup-compatibility/2006" xmlns:p14="http://schemas.microsoft.com/office/powerpoint/2010/main">
+        <mc:Choice Requires="p14">
           <p:contentPart p14:bwMode="auto" r:id="rId8">
             <p14:nvContentPartPr>
               <p14:cNvPr id="14" name="Tinta 13">
@@ -5900,7 +8010,7 @@
             </p14:xfrm>
           </p:contentPart>
         </mc:Choice>
-        <mc:Fallback>
+        <mc:Fallback xmlns="">
           <p:pic>
             <p:nvPicPr>
               <p:cNvPr id="14" name="Tinta 13">
@@ -6076,7 +8186,7 @@
 </p:sld>
 </file>
 
-<file path=ppt/slides/slide7.xml><?xml version="1.0" encoding="utf-8"?>
+<file path=ppt/slides/slide8.xml><?xml version="1.0" encoding="utf-8"?>
 <p:sld xmlns:a="http://schemas.openxmlformats.org/drawingml/2006/main" xmlns:r="http://schemas.openxmlformats.org/officeDocument/2006/relationships" xmlns:p="http://schemas.openxmlformats.org/presentationml/2006/main">
   <p:cSld>
     <p:spTree>
@@ -6472,7 +8582,7 @@
 </p:sld>
 </file>
 
-<file path=ppt/slides/slide8.xml><?xml version="1.0" encoding="utf-8"?>
+<file path=ppt/slides/slide9.xml><?xml version="1.0" encoding="utf-8"?>
 <p:sld xmlns:a="http://schemas.openxmlformats.org/drawingml/2006/main" xmlns:r="http://schemas.openxmlformats.org/officeDocument/2006/relationships" xmlns:p="http://schemas.openxmlformats.org/presentationml/2006/main">
   <p:cSld>
     <p:spTree>
@@ -6943,752 +9053,6 @@
     <p:extLst>
       <p:ext uri="{BB962C8B-B14F-4D97-AF65-F5344CB8AC3E}">
         <p14:creationId xmlns:p14="http://schemas.microsoft.com/office/powerpoint/2010/main" val="1962222289"/>
-      </p:ext>
-    </p:extLst>
-  </p:cSld>
-  <p:clrMapOvr>
-    <a:masterClrMapping/>
-  </p:clrMapOvr>
-</p:sld>
-</file>
-
-<file path=ppt/slides/slide9.xml><?xml version="1.0" encoding="utf-8"?>
-<p:sld xmlns:a="http://schemas.openxmlformats.org/drawingml/2006/main" xmlns:r="http://schemas.openxmlformats.org/officeDocument/2006/relationships" xmlns:p="http://schemas.openxmlformats.org/presentationml/2006/main">
-  <p:cSld>
-    <p:spTree>
-      <p:nvGrpSpPr>
-        <p:cNvPr id="1" name="">
-          <a:extLst>
-            <a:ext uri="{FF2B5EF4-FFF2-40B4-BE49-F238E27FC236}">
-              <a16:creationId xmlns:a16="http://schemas.microsoft.com/office/drawing/2014/main" id="{DFD74B3E-BF56-2FB0-BD21-370EC9442A46}"/>
-            </a:ext>
-          </a:extLst>
-        </p:cNvPr>
-        <p:cNvGrpSpPr/>
-        <p:nvPr/>
-      </p:nvGrpSpPr>
-      <p:grpSpPr>
-        <a:xfrm>
-          <a:off x="0" y="0"/>
-          <a:ext cx="0" cy="0"/>
-          <a:chOff x="0" y="0"/>
-          <a:chExt cx="0" cy="0"/>
-        </a:xfrm>
-      </p:grpSpPr>
-      <p:pic>
-        <p:nvPicPr>
-          <p:cNvPr id="5" name="Imagem 4">
-            <a:extLst>
-              <a:ext uri="{FF2B5EF4-FFF2-40B4-BE49-F238E27FC236}">
-                <a16:creationId xmlns:a16="http://schemas.microsoft.com/office/drawing/2014/main" id="{9F0E214E-D45B-BB9E-2317-56B6D93F6627}"/>
-              </a:ext>
-            </a:extLst>
-          </p:cNvPr>
-          <p:cNvPicPr>
-            <a:picLocks noChangeAspect="1"/>
-          </p:cNvPicPr>
-          <p:nvPr/>
-        </p:nvPicPr>
-        <p:blipFill>
-          <a:blip r:embed="rId2">
-            <a:extLst>
-              <a:ext uri="{28A0092B-C50C-407E-A947-70E740481C1C}">
-                <a14:useLocalDpi xmlns:a14="http://schemas.microsoft.com/office/drawing/2010/main" val="0"/>
-              </a:ext>
-            </a:extLst>
-          </a:blip>
-          <a:stretch>
-            <a:fillRect/>
-          </a:stretch>
-        </p:blipFill>
-        <p:spPr>
-          <a:xfrm>
-            <a:off x="0" y="0"/>
-            <a:ext cx="12192000" cy="6858000"/>
-          </a:xfrm>
-          <a:prstGeom prst="rect">
-            <a:avLst/>
-          </a:prstGeom>
-        </p:spPr>
-      </p:pic>
-      <p:sp>
-        <p:nvSpPr>
-          <p:cNvPr id="2" name="CaixaDeTexto 1">
-            <a:extLst>
-              <a:ext uri="{FF2B5EF4-FFF2-40B4-BE49-F238E27FC236}">
-                <a16:creationId xmlns:a16="http://schemas.microsoft.com/office/drawing/2014/main" id="{209A396E-A5FD-0E7C-4C13-36A282E1FEE1}"/>
-              </a:ext>
-            </a:extLst>
-          </p:cNvPr>
-          <p:cNvSpPr txBox="1"/>
-          <p:nvPr/>
-        </p:nvSpPr>
-        <p:spPr>
-          <a:xfrm>
-            <a:off x="5186740" y="197595"/>
-            <a:ext cx="1818520" cy="646331"/>
-          </a:xfrm>
-          <a:prstGeom prst="rect">
-            <a:avLst/>
-          </a:prstGeom>
-          <a:noFill/>
-        </p:spPr>
-        <p:txBody>
-          <a:bodyPr wrap="square" rtlCol="0">
-            <a:spAutoFit/>
-          </a:bodyPr>
-          <a:lstStyle/>
-          <a:p>
-            <a:r>
-              <a:rPr lang="en-US" sz="3600" dirty="0" err="1"/>
-              <a:t>Exercício</a:t>
-            </a:r>
-            <a:endParaRPr lang="pt-BR" sz="3600" dirty="0"/>
-          </a:p>
-        </p:txBody>
-      </p:sp>
-      <p:sp>
-        <p:nvSpPr>
-          <p:cNvPr id="3" name="CaixaDeTexto 2">
-            <a:extLst>
-              <a:ext uri="{FF2B5EF4-FFF2-40B4-BE49-F238E27FC236}">
-                <a16:creationId xmlns:a16="http://schemas.microsoft.com/office/drawing/2014/main" id="{BDC55075-4B50-0E84-DEF8-D1AFBA0E2829}"/>
-              </a:ext>
-            </a:extLst>
-          </p:cNvPr>
-          <p:cNvSpPr txBox="1"/>
-          <p:nvPr/>
-        </p:nvSpPr>
-        <p:spPr>
-          <a:xfrm>
-            <a:off x="1459523" y="1011115"/>
-            <a:ext cx="8976946" cy="5632311"/>
-          </a:xfrm>
-          <a:prstGeom prst="rect">
-            <a:avLst/>
-          </a:prstGeom>
-          <a:noFill/>
-        </p:spPr>
-        <p:txBody>
-          <a:bodyPr wrap="square" rtlCol="0">
-            <a:spAutoFit/>
-          </a:bodyPr>
-          <a:lstStyle/>
-          <a:p>
-            <a:r>
-              <a:rPr lang="en-US" sz="2000" dirty="0" err="1"/>
-              <a:t>Utilizando</a:t>
-            </a:r>
-            <a:r>
-              <a:rPr lang="en-US" sz="2000" dirty="0"/>
-              <a:t> </a:t>
-            </a:r>
-            <a:r>
-              <a:rPr lang="en-US" sz="2000" dirty="0" err="1"/>
-              <a:t>os</a:t>
-            </a:r>
-            <a:r>
-              <a:rPr lang="en-US" sz="2000" dirty="0"/>
-              <a:t> </a:t>
-            </a:r>
-            <a:r>
-              <a:rPr lang="en-US" sz="2000" dirty="0" err="1"/>
-              <a:t>conceitos</a:t>
-            </a:r>
-            <a:r>
-              <a:rPr lang="en-US" sz="2000" dirty="0"/>
-              <a:t> </a:t>
-            </a:r>
-            <a:r>
-              <a:rPr lang="en-US" sz="2000" dirty="0" err="1"/>
-              <a:t>abordados</a:t>
-            </a:r>
-            <a:r>
-              <a:rPr lang="en-US" sz="2000" dirty="0"/>
-              <a:t> </a:t>
-            </a:r>
-            <a:r>
-              <a:rPr lang="en-US" sz="2000" dirty="0" err="1"/>
-              <a:t>nesta</a:t>
-            </a:r>
-            <a:r>
-              <a:rPr lang="en-US" sz="2000" dirty="0"/>
-              <a:t> aula, </a:t>
-            </a:r>
-            <a:r>
-              <a:rPr lang="en-US" sz="2000" dirty="0" err="1"/>
-              <a:t>faça</a:t>
-            </a:r>
-            <a:r>
-              <a:rPr lang="en-US" sz="2000" dirty="0"/>
-              <a:t> o que se </a:t>
-            </a:r>
-            <a:r>
-              <a:rPr lang="en-US" sz="2000" dirty="0" err="1"/>
-              <a:t>pede</a:t>
-            </a:r>
-            <a:r>
-              <a:rPr lang="en-US" sz="2000" dirty="0"/>
-              <a:t>:</a:t>
-            </a:r>
-          </a:p>
-          <a:p>
-            <a:endParaRPr lang="en-US" sz="2000" dirty="0"/>
-          </a:p>
-          <a:p>
-            <a:pPr marL="342900" indent="-342900">
-              <a:buAutoNum type="arabicPeriod"/>
-            </a:pPr>
-            <a:r>
-              <a:rPr lang="en-US" sz="2000" dirty="0" err="1"/>
-              <a:t>Crie</a:t>
-            </a:r>
-            <a:r>
-              <a:rPr lang="en-US" sz="2000" dirty="0"/>
-              <a:t> um banco de dados </a:t>
-            </a:r>
-            <a:r>
-              <a:rPr lang="en-US" sz="2000" dirty="0" err="1"/>
-              <a:t>chamado</a:t>
-            </a:r>
-            <a:r>
-              <a:rPr lang="en-US" sz="2000" dirty="0"/>
-              <a:t> ‘database1’ </a:t>
-            </a:r>
-            <a:r>
-              <a:rPr lang="en-US" sz="2000" dirty="0" err="1"/>
-              <a:t>verificando</a:t>
-            </a:r>
-            <a:r>
-              <a:rPr lang="en-US" sz="2000" dirty="0"/>
-              <a:t> </a:t>
-            </a:r>
-            <a:r>
-              <a:rPr lang="en-US" sz="2000" dirty="0" err="1"/>
-              <a:t>sua</a:t>
-            </a:r>
-            <a:r>
-              <a:rPr lang="en-US" sz="2000" dirty="0"/>
-              <a:t> </a:t>
-            </a:r>
-            <a:r>
-              <a:rPr lang="en-US" sz="2000" dirty="0" err="1"/>
-              <a:t>existência</a:t>
-            </a:r>
-            <a:r>
-              <a:rPr lang="en-US" sz="2000" dirty="0"/>
-              <a:t>. Caso </a:t>
-            </a:r>
-            <a:r>
-              <a:rPr lang="en-US" sz="2000" dirty="0" err="1"/>
-              <a:t>exista</a:t>
-            </a:r>
-            <a:r>
-              <a:rPr lang="en-US" sz="2000" dirty="0"/>
-              <a:t>, </a:t>
-            </a:r>
-            <a:r>
-              <a:rPr lang="en-US" sz="2000" dirty="0" err="1"/>
-              <a:t>exclua</a:t>
-            </a:r>
-            <a:r>
-              <a:rPr lang="en-US" sz="2000" dirty="0"/>
-              <a:t> antes </a:t>
-            </a:r>
-            <a:r>
-              <a:rPr lang="en-US" sz="2000" dirty="0" err="1"/>
-              <a:t>mesmo</a:t>
-            </a:r>
-            <a:r>
-              <a:rPr lang="en-US" sz="2000" dirty="0"/>
-              <a:t> de </a:t>
-            </a:r>
-            <a:r>
-              <a:rPr lang="en-US" sz="2000" dirty="0" err="1"/>
-              <a:t>criá</a:t>
-            </a:r>
-            <a:r>
-              <a:rPr lang="en-US" sz="2000" dirty="0"/>
-              <a:t>-lo;</a:t>
-            </a:r>
-          </a:p>
-          <a:p>
-            <a:pPr marL="342900" indent="-342900">
-              <a:buAutoNum type="arabicPeriod"/>
-            </a:pPr>
-            <a:r>
-              <a:rPr lang="en-US" sz="2000" dirty="0"/>
-              <a:t>Execute o </a:t>
-            </a:r>
-            <a:r>
-              <a:rPr lang="en-US" sz="2000" dirty="0" err="1"/>
-              <a:t>comando</a:t>
-            </a:r>
-            <a:r>
-              <a:rPr lang="en-US" sz="2000" dirty="0"/>
-              <a:t> para </a:t>
-            </a:r>
-            <a:r>
-              <a:rPr lang="en-US" sz="2000" dirty="0" err="1"/>
-              <a:t>utilizar</a:t>
-            </a:r>
-            <a:r>
-              <a:rPr lang="en-US" sz="2000" dirty="0"/>
-              <a:t> </a:t>
-            </a:r>
-            <a:r>
-              <a:rPr lang="en-US" sz="2000" dirty="0" err="1"/>
-              <a:t>seu</a:t>
-            </a:r>
-            <a:r>
-              <a:rPr lang="en-US" sz="2000" dirty="0"/>
-              <a:t> banco de dados;</a:t>
-            </a:r>
-          </a:p>
-          <a:p>
-            <a:pPr marL="342900" indent="-342900">
-              <a:buAutoNum type="arabicPeriod"/>
-            </a:pPr>
-            <a:r>
-              <a:rPr lang="en-US" sz="2000" dirty="0" err="1"/>
-              <a:t>Crie</a:t>
-            </a:r>
-            <a:r>
-              <a:rPr lang="en-US" sz="2000" dirty="0"/>
-              <a:t> </a:t>
-            </a:r>
-            <a:r>
-              <a:rPr lang="en-US" sz="2000" dirty="0" err="1"/>
-              <a:t>uma</a:t>
-            </a:r>
-            <a:r>
-              <a:rPr lang="en-US" sz="2000" dirty="0"/>
-              <a:t> nova </a:t>
-            </a:r>
-            <a:r>
-              <a:rPr lang="en-US" sz="2000" dirty="0" err="1"/>
-              <a:t>tabela</a:t>
-            </a:r>
-            <a:r>
-              <a:rPr lang="en-US" sz="2000" dirty="0"/>
-              <a:t> ‘Pessoa’, </a:t>
-            </a:r>
-            <a:r>
-              <a:rPr lang="en-US" sz="2000" dirty="0" err="1"/>
-              <a:t>esta</a:t>
-            </a:r>
-            <a:r>
-              <a:rPr lang="en-US" sz="2000" dirty="0"/>
-              <a:t> </a:t>
-            </a:r>
-            <a:r>
-              <a:rPr lang="en-US" sz="2000" dirty="0" err="1"/>
-              <a:t>tabela</a:t>
-            </a:r>
-            <a:r>
-              <a:rPr lang="en-US" sz="2000" dirty="0"/>
-              <a:t> </a:t>
-            </a:r>
-            <a:r>
-              <a:rPr lang="en-US" sz="2000" dirty="0" err="1"/>
-              <a:t>deve</a:t>
-            </a:r>
-            <a:r>
-              <a:rPr lang="en-US" sz="2000" dirty="0"/>
-              <a:t> </a:t>
-            </a:r>
-            <a:r>
-              <a:rPr lang="en-US" sz="2000" dirty="0" err="1"/>
-              <a:t>conter</a:t>
-            </a:r>
-            <a:r>
-              <a:rPr lang="en-US" sz="2000" dirty="0"/>
-              <a:t> um </a:t>
-            </a:r>
-            <a:r>
-              <a:rPr lang="en-US" sz="2000" dirty="0" err="1"/>
-              <a:t>identificador</a:t>
-            </a:r>
-            <a:r>
-              <a:rPr lang="en-US" sz="2000" dirty="0"/>
-              <a:t> </a:t>
-            </a:r>
-            <a:r>
-              <a:rPr lang="en-US" sz="2000" dirty="0" err="1"/>
-              <a:t>único</a:t>
-            </a:r>
-            <a:r>
-              <a:rPr lang="en-US" sz="2000" dirty="0"/>
-              <a:t> </a:t>
-            </a:r>
-            <a:r>
-              <a:rPr lang="en-US" sz="2000" dirty="0" err="1"/>
-              <a:t>obrigatório</a:t>
-            </a:r>
-            <a:r>
-              <a:rPr lang="en-US" sz="2000" dirty="0"/>
-              <a:t> e auto-incremental, um </a:t>
-            </a:r>
-            <a:r>
-              <a:rPr lang="en-US" sz="2000" dirty="0" err="1"/>
-              <a:t>nome</a:t>
-            </a:r>
-            <a:r>
-              <a:rPr lang="en-US" sz="2000" dirty="0"/>
-              <a:t> (40 </a:t>
-            </a:r>
-            <a:r>
-              <a:rPr lang="en-US" sz="2000" dirty="0" err="1"/>
-              <a:t>caracteres</a:t>
-            </a:r>
-            <a:r>
-              <a:rPr lang="en-US" sz="2000" dirty="0"/>
-              <a:t>), um campo de </a:t>
-            </a:r>
-            <a:r>
-              <a:rPr lang="en-US" sz="2000" dirty="0" err="1"/>
-              <a:t>endereço</a:t>
-            </a:r>
-            <a:r>
-              <a:rPr lang="en-US" sz="2000" dirty="0"/>
-              <a:t> e </a:t>
-            </a:r>
-            <a:r>
-              <a:rPr lang="en-US" sz="2000" dirty="0" err="1"/>
-              <a:t>uma</a:t>
-            </a:r>
-            <a:r>
-              <a:rPr lang="en-US" sz="2000" dirty="0"/>
-              <a:t> </a:t>
-            </a:r>
-            <a:r>
-              <a:rPr lang="en-US" sz="2000" dirty="0" err="1"/>
-              <a:t>profissão</a:t>
-            </a:r>
-            <a:r>
-              <a:rPr lang="en-US" sz="2000" dirty="0"/>
-              <a:t> (</a:t>
-            </a:r>
-            <a:r>
-              <a:rPr lang="en-US" sz="2000" dirty="0" err="1"/>
-              <a:t>obrigatório</a:t>
-            </a:r>
-            <a:r>
-              <a:rPr lang="en-US" sz="2000" dirty="0"/>
-              <a:t>);</a:t>
-            </a:r>
-          </a:p>
-          <a:p>
-            <a:pPr marL="342900" indent="-342900">
-              <a:buAutoNum type="arabicPeriod"/>
-            </a:pPr>
-            <a:r>
-              <a:rPr lang="en-US" sz="2000" dirty="0" err="1"/>
-              <a:t>Faça</a:t>
-            </a:r>
-            <a:r>
-              <a:rPr lang="en-US" sz="2000" dirty="0"/>
-              <a:t> a </a:t>
-            </a:r>
-            <a:r>
-              <a:rPr lang="en-US" sz="2000" dirty="0" err="1"/>
-              <a:t>inserção</a:t>
-            </a:r>
-            <a:r>
-              <a:rPr lang="en-US" sz="2000" dirty="0"/>
-              <a:t> de 3 </a:t>
-            </a:r>
-            <a:r>
-              <a:rPr lang="en-US" sz="2000" dirty="0" err="1"/>
-              <a:t>pessoas</a:t>
-            </a:r>
-            <a:r>
-              <a:rPr lang="en-US" sz="2000" dirty="0"/>
-              <a:t>;</a:t>
-            </a:r>
-          </a:p>
-          <a:p>
-            <a:pPr marL="342900" indent="-342900">
-              <a:buAutoNum type="arabicPeriod"/>
-            </a:pPr>
-            <a:r>
-              <a:rPr lang="en-US" sz="2000" dirty="0" err="1"/>
-              <a:t>Inclua</a:t>
-            </a:r>
-            <a:r>
-              <a:rPr lang="en-US" sz="2000" dirty="0"/>
-              <a:t> </a:t>
-            </a:r>
-            <a:r>
-              <a:rPr lang="en-US" sz="2000" dirty="0" err="1"/>
-              <a:t>uma</a:t>
-            </a:r>
-            <a:r>
-              <a:rPr lang="en-US" sz="2000" dirty="0"/>
-              <a:t> nova </a:t>
-            </a:r>
-            <a:r>
-              <a:rPr lang="en-US" sz="2000" dirty="0" err="1"/>
-              <a:t>coluna</a:t>
-            </a:r>
-            <a:r>
-              <a:rPr lang="en-US" sz="2000" dirty="0"/>
-              <a:t> para o </a:t>
-            </a:r>
-            <a:r>
-              <a:rPr lang="en-US" sz="2000" dirty="0" err="1"/>
-              <a:t>telefone</a:t>
-            </a:r>
-            <a:r>
-              <a:rPr lang="en-US" sz="2000" dirty="0"/>
-              <a:t>;</a:t>
-            </a:r>
-          </a:p>
-          <a:p>
-            <a:pPr marL="342900" indent="-342900">
-              <a:buAutoNum type="arabicPeriod"/>
-            </a:pPr>
-            <a:r>
-              <a:rPr lang="en-US" sz="2000" dirty="0" err="1"/>
-              <a:t>Exclua</a:t>
-            </a:r>
-            <a:r>
-              <a:rPr lang="en-US" sz="2000" dirty="0"/>
-              <a:t> a </a:t>
-            </a:r>
-            <a:r>
-              <a:rPr lang="en-US" sz="2000" dirty="0" err="1"/>
-              <a:t>coluna</a:t>
-            </a:r>
-            <a:r>
-              <a:rPr lang="en-US" sz="2000" dirty="0"/>
-              <a:t> de </a:t>
-            </a:r>
-            <a:r>
-              <a:rPr lang="en-US" sz="2000" dirty="0" err="1"/>
-              <a:t>endereço</a:t>
-            </a:r>
-            <a:r>
-              <a:rPr lang="en-US" sz="2000" dirty="0"/>
-              <a:t>;</a:t>
-            </a:r>
-          </a:p>
-          <a:p>
-            <a:pPr marL="342900" indent="-342900">
-              <a:buAutoNum type="arabicPeriod"/>
-            </a:pPr>
-            <a:r>
-              <a:rPr lang="en-US" sz="2000" dirty="0" err="1"/>
-              <a:t>Atualize</a:t>
-            </a:r>
-            <a:r>
-              <a:rPr lang="en-US" sz="2000" dirty="0"/>
-              <a:t> as </a:t>
-            </a:r>
-            <a:r>
-              <a:rPr lang="en-US" sz="2000" dirty="0" err="1"/>
-              <a:t>pessoas</a:t>
-            </a:r>
-            <a:r>
-              <a:rPr lang="en-US" sz="2000" dirty="0"/>
-              <a:t> </a:t>
-            </a:r>
-            <a:r>
-              <a:rPr lang="en-US" sz="2000" dirty="0" err="1"/>
-              <a:t>adicionando</a:t>
-            </a:r>
-            <a:r>
-              <a:rPr lang="en-US" sz="2000" dirty="0"/>
-              <a:t> </a:t>
-            </a:r>
-            <a:r>
-              <a:rPr lang="en-US" sz="2000" dirty="0" err="1"/>
-              <a:t>telefone</a:t>
-            </a:r>
-            <a:r>
-              <a:rPr lang="en-US" sz="2000" dirty="0"/>
-              <a:t> para as duas </a:t>
-            </a:r>
-            <a:r>
-              <a:rPr lang="en-US" sz="2000" dirty="0" err="1"/>
-              <a:t>últimas</a:t>
-            </a:r>
-            <a:r>
-              <a:rPr lang="en-US" sz="2000" dirty="0"/>
-              <a:t>;</a:t>
-            </a:r>
-          </a:p>
-          <a:p>
-            <a:pPr marL="342900" indent="-342900">
-              <a:buAutoNum type="arabicPeriod"/>
-            </a:pPr>
-            <a:r>
-              <a:rPr lang="en-US" sz="2000" dirty="0" err="1"/>
-              <a:t>Modifique</a:t>
-            </a:r>
-            <a:r>
-              <a:rPr lang="en-US" sz="2000" dirty="0"/>
-              <a:t> a </a:t>
-            </a:r>
-            <a:r>
-              <a:rPr lang="en-US" sz="2000" dirty="0" err="1"/>
-              <a:t>capacidade</a:t>
-            </a:r>
-            <a:r>
-              <a:rPr lang="en-US" sz="2000" dirty="0"/>
-              <a:t> do </a:t>
-            </a:r>
-            <a:r>
-              <a:rPr lang="en-US" sz="2000" dirty="0" err="1"/>
-              <a:t>tipo</a:t>
-            </a:r>
-            <a:r>
-              <a:rPr lang="en-US" sz="2000" dirty="0"/>
-              <a:t> do campo ‘</a:t>
-            </a:r>
-            <a:r>
-              <a:rPr lang="en-US" sz="2000" dirty="0" err="1"/>
-              <a:t>nome</a:t>
-            </a:r>
-            <a:r>
-              <a:rPr lang="en-US" sz="2000" dirty="0"/>
-              <a:t>’ para 30;</a:t>
-            </a:r>
-          </a:p>
-          <a:p>
-            <a:pPr marL="342900" indent="-342900">
-              <a:buAutoNum type="arabicPeriod"/>
-            </a:pPr>
-            <a:r>
-              <a:rPr lang="en-US" sz="2000" dirty="0" err="1"/>
-              <a:t>Exclua</a:t>
-            </a:r>
-            <a:r>
-              <a:rPr lang="en-US" sz="2000" dirty="0"/>
-              <a:t> a </a:t>
-            </a:r>
-            <a:r>
-              <a:rPr lang="en-US" sz="2000" dirty="0" err="1"/>
-              <a:t>primeira</a:t>
-            </a:r>
-            <a:r>
-              <a:rPr lang="en-US" sz="2000" dirty="0"/>
-              <a:t> </a:t>
-            </a:r>
-            <a:r>
-              <a:rPr lang="en-US" sz="2000" dirty="0" err="1"/>
-              <a:t>pessoa</a:t>
-            </a:r>
-            <a:r>
-              <a:rPr lang="en-US" sz="2000" dirty="0"/>
-              <a:t>;</a:t>
-            </a:r>
-          </a:p>
-          <a:p>
-            <a:pPr marL="342900" indent="-342900">
-              <a:buAutoNum type="arabicPeriod"/>
-            </a:pPr>
-            <a:r>
-              <a:rPr lang="en-US" sz="2000" dirty="0"/>
-              <a:t> </a:t>
-            </a:r>
-            <a:r>
-              <a:rPr lang="en-US" sz="2000" dirty="0" err="1"/>
-              <a:t>Mostre</a:t>
-            </a:r>
-            <a:r>
-              <a:rPr lang="en-US" sz="2000" dirty="0"/>
-              <a:t> </a:t>
-            </a:r>
-            <a:r>
-              <a:rPr lang="en-US" sz="2000" dirty="0" err="1"/>
-              <a:t>todos</a:t>
-            </a:r>
-            <a:r>
-              <a:rPr lang="en-US" sz="2000" dirty="0"/>
-              <a:t> </a:t>
-            </a:r>
-            <a:r>
-              <a:rPr lang="en-US" sz="2000" dirty="0" err="1"/>
-              <a:t>os</a:t>
-            </a:r>
-            <a:r>
-              <a:rPr lang="en-US" sz="2000" dirty="0"/>
-              <a:t> dados;</a:t>
-            </a:r>
-          </a:p>
-          <a:p>
-            <a:pPr marL="342900" indent="-342900">
-              <a:buAutoNum type="arabicPeriod"/>
-            </a:pPr>
-            <a:r>
-              <a:rPr lang="en-US" sz="2000" dirty="0"/>
-              <a:t> Delete </a:t>
-            </a:r>
-            <a:r>
-              <a:rPr lang="en-US" sz="2000" dirty="0" err="1"/>
-              <a:t>todos</a:t>
-            </a:r>
-            <a:r>
-              <a:rPr lang="en-US" sz="2000" dirty="0"/>
-              <a:t> </a:t>
-            </a:r>
-            <a:r>
-              <a:rPr lang="en-US" sz="2000" dirty="0" err="1"/>
-              <a:t>os</a:t>
-            </a:r>
-            <a:r>
-              <a:rPr lang="en-US" sz="2000" dirty="0"/>
-              <a:t> dados das </a:t>
-            </a:r>
-            <a:r>
-              <a:rPr lang="en-US" sz="2000" dirty="0" err="1"/>
-              <a:t>tabelas</a:t>
-            </a:r>
-            <a:r>
-              <a:rPr lang="en-US" sz="2000" dirty="0"/>
-              <a:t> com um </a:t>
-            </a:r>
-            <a:r>
-              <a:rPr lang="en-US" sz="2000" dirty="0" err="1"/>
-              <a:t>comando</a:t>
-            </a:r>
-            <a:r>
-              <a:rPr lang="en-US" sz="2000" dirty="0"/>
-              <a:t>.</a:t>
-            </a:r>
-          </a:p>
-          <a:p>
-            <a:endParaRPr lang="en-US" sz="2000" dirty="0"/>
-          </a:p>
-          <a:p>
-            <a:r>
-              <a:rPr lang="en-US" sz="2000" dirty="0"/>
-              <a:t>OBS: </a:t>
-            </a:r>
-            <a:r>
-              <a:rPr lang="en-US" sz="2000" dirty="0" err="1"/>
-              <a:t>Não</a:t>
-            </a:r>
-            <a:r>
-              <a:rPr lang="en-US" sz="2000" dirty="0"/>
-              <a:t> se </a:t>
-            </a:r>
-            <a:r>
-              <a:rPr lang="en-US" sz="2000" dirty="0" err="1"/>
-              <a:t>esqueça</a:t>
-            </a:r>
-            <a:r>
-              <a:rPr lang="en-US" sz="2000" dirty="0"/>
-              <a:t> de usar SET SQL_SAFE_UPDATES = 0;</a:t>
-            </a:r>
-          </a:p>
-        </p:txBody>
-      </p:sp>
-    </p:spTree>
-    <p:extLst>
-      <p:ext uri="{BB962C8B-B14F-4D97-AF65-F5344CB8AC3E}">
-        <p14:creationId xmlns:p14="http://schemas.microsoft.com/office/powerpoint/2010/main" val="2334101492"/>
       </p:ext>
     </p:extLst>
   </p:cSld>
@@ -7991,4 +9355,299 @@
     </a:ext>
   </a:extLst>
 </a:theme>
+</file>
+
+<file path=ppt/theme/theme2.xml><?xml version="1.0" encoding="utf-8"?>
+<a:theme xmlns:a="http://schemas.openxmlformats.org/drawingml/2006/main" name="Tema do Office">
+  <a:themeElements>
+    <a:clrScheme name="Office">
+      <a:dk1>
+        <a:sysClr val="windowText" lastClr="000000"/>
+      </a:dk1>
+      <a:lt1>
+        <a:sysClr val="window" lastClr="FFFFFF"/>
+      </a:lt1>
+      <a:dk2>
+        <a:srgbClr val="44546A"/>
+      </a:dk2>
+      <a:lt2>
+        <a:srgbClr val="E7E6E6"/>
+      </a:lt2>
+      <a:accent1>
+        <a:srgbClr val="4472C4"/>
+      </a:accent1>
+      <a:accent2>
+        <a:srgbClr val="ED7D31"/>
+      </a:accent2>
+      <a:accent3>
+        <a:srgbClr val="A5A5A5"/>
+      </a:accent3>
+      <a:accent4>
+        <a:srgbClr val="FFC000"/>
+      </a:accent4>
+      <a:accent5>
+        <a:srgbClr val="5B9BD5"/>
+      </a:accent5>
+      <a:accent6>
+        <a:srgbClr val="70AD47"/>
+      </a:accent6>
+      <a:hlink>
+        <a:srgbClr val="0563C1"/>
+      </a:hlink>
+      <a:folHlink>
+        <a:srgbClr val="954F72"/>
+      </a:folHlink>
+    </a:clrScheme>
+    <a:fontScheme name="Office">
+      <a:majorFont>
+        <a:latin typeface="Calibri Light" panose="020F0302020204030204"/>
+        <a:ea typeface=""/>
+        <a:cs typeface=""/>
+        <a:font script="Jpan" typeface="游ゴシック Light"/>
+        <a:font script="Hang" typeface="맑은 고딕"/>
+        <a:font script="Hans" typeface="等线 Light"/>
+        <a:font script="Hant" typeface="新細明體"/>
+        <a:font script="Arab" typeface="Times New Roman"/>
+        <a:font script="Hebr" typeface="Times New Roman"/>
+        <a:font script="Thai" typeface="Angsana New"/>
+        <a:font script="Ethi" typeface="Nyala"/>
+        <a:font script="Beng" typeface="Vrinda"/>
+        <a:font script="Gujr" typeface="Shruti"/>
+        <a:font script="Khmr" typeface="MoolBoran"/>
+        <a:font script="Knda" typeface="Tunga"/>
+        <a:font script="Guru" typeface="Raavi"/>
+        <a:font script="Cans" typeface="Euphemia"/>
+        <a:font script="Cher" typeface="Plantagenet Cherokee"/>
+        <a:font script="Yiii" typeface="Microsoft Yi Baiti"/>
+        <a:font script="Tibt" typeface="Microsoft Himalaya"/>
+        <a:font script="Thaa" typeface="MV Boli"/>
+        <a:font script="Deva" typeface="Mangal"/>
+        <a:font script="Telu" typeface="Gautami"/>
+        <a:font script="Taml" typeface="Latha"/>
+        <a:font script="Syrc" typeface="Estrangelo Edessa"/>
+        <a:font script="Orya" typeface="Kalinga"/>
+        <a:font script="Mlym" typeface="Kartika"/>
+        <a:font script="Laoo" typeface="DokChampa"/>
+        <a:font script="Sinh" typeface="Iskoola Pota"/>
+        <a:font script="Mong" typeface="Mongolian Baiti"/>
+        <a:font script="Viet" typeface="Times New Roman"/>
+        <a:font script="Uigh" typeface="Microsoft Uighur"/>
+        <a:font script="Geor" typeface="Sylfaen"/>
+        <a:font script="Armn" typeface="Arial"/>
+        <a:font script="Bugi" typeface="Leelawadee UI"/>
+        <a:font script="Bopo" typeface="Microsoft JhengHei"/>
+        <a:font script="Java" typeface="Javanese Text"/>
+        <a:font script="Lisu" typeface="Segoe UI"/>
+        <a:font script="Mymr" typeface="Myanmar Text"/>
+        <a:font script="Nkoo" typeface="Ebrima"/>
+        <a:font script="Olck" typeface="Nirmala UI"/>
+        <a:font script="Osma" typeface="Ebrima"/>
+        <a:font script="Phag" typeface="Phagspa"/>
+        <a:font script="Syrn" typeface="Estrangelo Edessa"/>
+        <a:font script="Syrj" typeface="Estrangelo Edessa"/>
+        <a:font script="Syre" typeface="Estrangelo Edessa"/>
+        <a:font script="Sora" typeface="Nirmala UI"/>
+        <a:font script="Tale" typeface="Microsoft Tai Le"/>
+        <a:font script="Talu" typeface="Microsoft New Tai Lue"/>
+        <a:font script="Tfng" typeface="Ebrima"/>
+      </a:majorFont>
+      <a:minorFont>
+        <a:latin typeface="Calibri" panose="020F0502020204030204"/>
+        <a:ea typeface=""/>
+        <a:cs typeface=""/>
+        <a:font script="Jpan" typeface="游ゴシック"/>
+        <a:font script="Hang" typeface="맑은 고딕"/>
+        <a:font script="Hans" typeface="等线"/>
+        <a:font script="Hant" typeface="新細明體"/>
+        <a:font script="Arab" typeface="Arial"/>
+        <a:font script="Hebr" typeface="Arial"/>
+        <a:font script="Thai" typeface="Cordia New"/>
+        <a:font script="Ethi" typeface="Nyala"/>
+        <a:font script="Beng" typeface="Vrinda"/>
+        <a:font script="Gujr" typeface="Shruti"/>
+        <a:font script="Khmr" typeface="DaunPenh"/>
+        <a:font script="Knda" typeface="Tunga"/>
+        <a:font script="Guru" typeface="Raavi"/>
+        <a:font script="Cans" typeface="Euphemia"/>
+        <a:font script="Cher" typeface="Plantagenet Cherokee"/>
+        <a:font script="Yiii" typeface="Microsoft Yi Baiti"/>
+        <a:font script="Tibt" typeface="Microsoft Himalaya"/>
+        <a:font script="Thaa" typeface="MV Boli"/>
+        <a:font script="Deva" typeface="Mangal"/>
+        <a:font script="Telu" typeface="Gautami"/>
+        <a:font script="Taml" typeface="Latha"/>
+        <a:font script="Syrc" typeface="Estrangelo Edessa"/>
+        <a:font script="Orya" typeface="Kalinga"/>
+        <a:font script="Mlym" typeface="Kartika"/>
+        <a:font script="Laoo" typeface="DokChampa"/>
+        <a:font script="Sinh" typeface="Iskoola Pota"/>
+        <a:font script="Mong" typeface="Mongolian Baiti"/>
+        <a:font script="Viet" typeface="Arial"/>
+        <a:font script="Uigh" typeface="Microsoft Uighur"/>
+        <a:font script="Geor" typeface="Sylfaen"/>
+        <a:font script="Armn" typeface="Arial"/>
+        <a:font script="Bugi" typeface="Leelawadee UI"/>
+        <a:font script="Bopo" typeface="Microsoft JhengHei"/>
+        <a:font script="Java" typeface="Javanese Text"/>
+        <a:font script="Lisu" typeface="Segoe UI"/>
+        <a:font script="Mymr" typeface="Myanmar Text"/>
+        <a:font script="Nkoo" typeface="Ebrima"/>
+        <a:font script="Olck" typeface="Nirmala UI"/>
+        <a:font script="Osma" typeface="Ebrima"/>
+        <a:font script="Phag" typeface="Phagspa"/>
+        <a:font script="Syrn" typeface="Estrangelo Edessa"/>
+        <a:font script="Syrj" typeface="Estrangelo Edessa"/>
+        <a:font script="Syre" typeface="Estrangelo Edessa"/>
+        <a:font script="Sora" typeface="Nirmala UI"/>
+        <a:font script="Tale" typeface="Microsoft Tai Le"/>
+        <a:font script="Talu" typeface="Microsoft New Tai Lue"/>
+        <a:font script="Tfng" typeface="Ebrima"/>
+      </a:minorFont>
+    </a:fontScheme>
+    <a:fmtScheme name="Office">
+      <a:fillStyleLst>
+        <a:solidFill>
+          <a:schemeClr val="phClr"/>
+        </a:solidFill>
+        <a:gradFill rotWithShape="1">
+          <a:gsLst>
+            <a:gs pos="0">
+              <a:schemeClr val="phClr">
+                <a:lumMod val="110000"/>
+                <a:satMod val="105000"/>
+                <a:tint val="67000"/>
+              </a:schemeClr>
+            </a:gs>
+            <a:gs pos="50000">
+              <a:schemeClr val="phClr">
+                <a:lumMod val="105000"/>
+                <a:satMod val="103000"/>
+                <a:tint val="73000"/>
+              </a:schemeClr>
+            </a:gs>
+            <a:gs pos="100000">
+              <a:schemeClr val="phClr">
+                <a:lumMod val="105000"/>
+                <a:satMod val="109000"/>
+                <a:tint val="81000"/>
+              </a:schemeClr>
+            </a:gs>
+          </a:gsLst>
+          <a:lin ang="5400000" scaled="0"/>
+        </a:gradFill>
+        <a:gradFill rotWithShape="1">
+          <a:gsLst>
+            <a:gs pos="0">
+              <a:schemeClr val="phClr">
+                <a:satMod val="103000"/>
+                <a:lumMod val="102000"/>
+                <a:tint val="94000"/>
+              </a:schemeClr>
+            </a:gs>
+            <a:gs pos="50000">
+              <a:schemeClr val="phClr">
+                <a:satMod val="110000"/>
+                <a:lumMod val="100000"/>
+                <a:shade val="100000"/>
+              </a:schemeClr>
+            </a:gs>
+            <a:gs pos="100000">
+              <a:schemeClr val="phClr">
+                <a:lumMod val="99000"/>
+                <a:satMod val="120000"/>
+                <a:shade val="78000"/>
+              </a:schemeClr>
+            </a:gs>
+          </a:gsLst>
+          <a:lin ang="5400000" scaled="0"/>
+        </a:gradFill>
+      </a:fillStyleLst>
+      <a:lnStyleLst>
+        <a:ln w="6350" cap="flat" cmpd="sng" algn="ctr">
+          <a:solidFill>
+            <a:schemeClr val="phClr"/>
+          </a:solidFill>
+          <a:prstDash val="solid"/>
+          <a:miter lim="800000"/>
+        </a:ln>
+        <a:ln w="12700" cap="flat" cmpd="sng" algn="ctr">
+          <a:solidFill>
+            <a:schemeClr val="phClr"/>
+          </a:solidFill>
+          <a:prstDash val="solid"/>
+          <a:miter lim="800000"/>
+        </a:ln>
+        <a:ln w="19050" cap="flat" cmpd="sng" algn="ctr">
+          <a:solidFill>
+            <a:schemeClr val="phClr"/>
+          </a:solidFill>
+          <a:prstDash val="solid"/>
+          <a:miter lim="800000"/>
+        </a:ln>
+      </a:lnStyleLst>
+      <a:effectStyleLst>
+        <a:effectStyle>
+          <a:effectLst/>
+        </a:effectStyle>
+        <a:effectStyle>
+          <a:effectLst/>
+        </a:effectStyle>
+        <a:effectStyle>
+          <a:effectLst>
+            <a:outerShdw blurRad="57150" dist="19050" dir="5400000" algn="ctr" rotWithShape="0">
+              <a:srgbClr val="000000">
+                <a:alpha val="63000"/>
+              </a:srgbClr>
+            </a:outerShdw>
+          </a:effectLst>
+        </a:effectStyle>
+      </a:effectStyleLst>
+      <a:bgFillStyleLst>
+        <a:solidFill>
+          <a:schemeClr val="phClr"/>
+        </a:solidFill>
+        <a:solidFill>
+          <a:schemeClr val="phClr">
+            <a:tint val="95000"/>
+            <a:satMod val="170000"/>
+          </a:schemeClr>
+        </a:solidFill>
+        <a:gradFill rotWithShape="1">
+          <a:gsLst>
+            <a:gs pos="0">
+              <a:schemeClr val="phClr">
+                <a:tint val="93000"/>
+                <a:satMod val="150000"/>
+                <a:shade val="98000"/>
+                <a:lumMod val="102000"/>
+              </a:schemeClr>
+            </a:gs>
+            <a:gs pos="50000">
+              <a:schemeClr val="phClr">
+                <a:tint val="98000"/>
+                <a:satMod val="130000"/>
+                <a:shade val="90000"/>
+                <a:lumMod val="103000"/>
+              </a:schemeClr>
+            </a:gs>
+            <a:gs pos="100000">
+              <a:schemeClr val="phClr">
+                <a:shade val="63000"/>
+                <a:satMod val="120000"/>
+              </a:schemeClr>
+            </a:gs>
+          </a:gsLst>
+          <a:lin ang="5400000" scaled="0"/>
+        </a:gradFill>
+      </a:bgFillStyleLst>
+    </a:fmtScheme>
+  </a:themeElements>
+  <a:objectDefaults/>
+  <a:extraClrSchemeLst/>
+  <a:extLst>
+    <a:ext uri="{05A4C25C-085E-4340-85A3-A5531E510DB2}">
+      <thm15:themeFamily xmlns:thm15="http://schemas.microsoft.com/office/thememl/2012/main" name="Office Theme" id="{62F939B6-93AF-4DB8-9C6B-D6C7DFDC589F}" vid="{4A3C46E8-61CC-4603-A589-7422A47A8E4A}"/>
+    </a:ext>
+  </a:extLst>
+</a:theme>
 </file>
</xml_diff>

<commit_message>
feat: add new exercise to `Aula 5`
</commit_message>
<xml_diff>
--- a/Aula 5/ComandosDDL.pptx
+++ b/Aula 5/ComandosDDL.pptx
@@ -5,7 +5,7 @@
     <p:sldMasterId id="2147483648" r:id="rId1"/>
   </p:sldMasterIdLst>
   <p:notesMasterIdLst>
-    <p:notesMasterId r:id="rId13"/>
+    <p:notesMasterId r:id="rId14"/>
   </p:notesMasterIdLst>
   <p:sldIdLst>
     <p:sldId id="256" r:id="rId2"/>
@@ -18,7 +18,8 @@
     <p:sldId id="261" r:id="rId9"/>
     <p:sldId id="262" r:id="rId10"/>
     <p:sldId id="265" r:id="rId11"/>
-    <p:sldId id="275" r:id="rId12"/>
+    <p:sldId id="277" r:id="rId12"/>
+    <p:sldId id="275" r:id="rId13"/>
   </p:sldIdLst>
   <p:sldSz cx="12192000" cy="6858000"/>
   <p:notesSz cx="6858000" cy="9144000"/>
@@ -403,7 +404,7 @@
           <a:p>
             <a:fld id="{E2588FEF-F436-4522-91D9-3FBB4B3CDA67}" type="datetimeFigureOut">
               <a:rPr lang="pt-BR" smtClean="0"/>
-              <a:t>20/01/2026</a:t>
+              <a:t>25/01/2026</a:t>
             </a:fld>
             <a:endParaRPr lang="pt-BR"/>
           </a:p>
@@ -901,7 +902,7 @@
           <a:p>
             <a:fld id="{8ADEC918-6A4C-437B-AF1C-9622FE800873}" type="datetimeFigureOut">
               <a:rPr lang="pt-BR" smtClean="0"/>
-              <a:t>20/01/2026</a:t>
+              <a:t>25/01/2026</a:t>
             </a:fld>
             <a:endParaRPr lang="pt-BR"/>
           </a:p>
@@ -1099,7 +1100,7 @@
           <a:p>
             <a:fld id="{8ADEC918-6A4C-437B-AF1C-9622FE800873}" type="datetimeFigureOut">
               <a:rPr lang="pt-BR" smtClean="0"/>
-              <a:t>20/01/2026</a:t>
+              <a:t>25/01/2026</a:t>
             </a:fld>
             <a:endParaRPr lang="pt-BR"/>
           </a:p>
@@ -1307,7 +1308,7 @@
           <a:p>
             <a:fld id="{8ADEC918-6A4C-437B-AF1C-9622FE800873}" type="datetimeFigureOut">
               <a:rPr lang="pt-BR" smtClean="0"/>
-              <a:t>20/01/2026</a:t>
+              <a:t>25/01/2026</a:t>
             </a:fld>
             <a:endParaRPr lang="pt-BR"/>
           </a:p>
@@ -1505,7 +1506,7 @@
           <a:p>
             <a:fld id="{8ADEC918-6A4C-437B-AF1C-9622FE800873}" type="datetimeFigureOut">
               <a:rPr lang="pt-BR" smtClean="0"/>
-              <a:t>20/01/2026</a:t>
+              <a:t>25/01/2026</a:t>
             </a:fld>
             <a:endParaRPr lang="pt-BR"/>
           </a:p>
@@ -1780,7 +1781,7 @@
           <a:p>
             <a:fld id="{8ADEC918-6A4C-437B-AF1C-9622FE800873}" type="datetimeFigureOut">
               <a:rPr lang="pt-BR" smtClean="0"/>
-              <a:t>20/01/2026</a:t>
+              <a:t>25/01/2026</a:t>
             </a:fld>
             <a:endParaRPr lang="pt-BR"/>
           </a:p>
@@ -2045,7 +2046,7 @@
           <a:p>
             <a:fld id="{8ADEC918-6A4C-437B-AF1C-9622FE800873}" type="datetimeFigureOut">
               <a:rPr lang="pt-BR" smtClean="0"/>
-              <a:t>20/01/2026</a:t>
+              <a:t>25/01/2026</a:t>
             </a:fld>
             <a:endParaRPr lang="pt-BR"/>
           </a:p>
@@ -2457,7 +2458,7 @@
           <a:p>
             <a:fld id="{8ADEC918-6A4C-437B-AF1C-9622FE800873}" type="datetimeFigureOut">
               <a:rPr lang="pt-BR" smtClean="0"/>
-              <a:t>20/01/2026</a:t>
+              <a:t>25/01/2026</a:t>
             </a:fld>
             <a:endParaRPr lang="pt-BR"/>
           </a:p>
@@ -2598,7 +2599,7 @@
           <a:p>
             <a:fld id="{8ADEC918-6A4C-437B-AF1C-9622FE800873}" type="datetimeFigureOut">
               <a:rPr lang="pt-BR" smtClean="0"/>
-              <a:t>20/01/2026</a:t>
+              <a:t>25/01/2026</a:t>
             </a:fld>
             <a:endParaRPr lang="pt-BR"/>
           </a:p>
@@ -2711,7 +2712,7 @@
           <a:p>
             <a:fld id="{8ADEC918-6A4C-437B-AF1C-9622FE800873}" type="datetimeFigureOut">
               <a:rPr lang="pt-BR" smtClean="0"/>
-              <a:t>20/01/2026</a:t>
+              <a:t>25/01/2026</a:t>
             </a:fld>
             <a:endParaRPr lang="pt-BR"/>
           </a:p>
@@ -3022,7 +3023,7 @@
           <a:p>
             <a:fld id="{8ADEC918-6A4C-437B-AF1C-9622FE800873}" type="datetimeFigureOut">
               <a:rPr lang="pt-BR" smtClean="0"/>
-              <a:t>20/01/2026</a:t>
+              <a:t>25/01/2026</a:t>
             </a:fld>
             <a:endParaRPr lang="pt-BR"/>
           </a:p>
@@ -3310,7 +3311,7 @@
           <a:p>
             <a:fld id="{8ADEC918-6A4C-437B-AF1C-9622FE800873}" type="datetimeFigureOut">
               <a:rPr lang="pt-BR" smtClean="0"/>
-              <a:t>20/01/2026</a:t>
+              <a:t>25/01/2026</a:t>
             </a:fld>
             <a:endParaRPr lang="pt-BR"/>
           </a:p>
@@ -3551,7 +3552,7 @@
           <a:p>
             <a:fld id="{8ADEC918-6A4C-437B-AF1C-9622FE800873}" type="datetimeFigureOut">
               <a:rPr lang="pt-BR" smtClean="0"/>
-              <a:t>20/01/2026</a:t>
+              <a:t>25/01/2026</a:t>
             </a:fld>
             <a:endParaRPr lang="pt-BR"/>
           </a:p>
@@ -4269,7 +4270,7 @@
         <p:spPr>
           <a:xfrm>
             <a:off x="1459523" y="1011115"/>
-            <a:ext cx="8976946" cy="5632311"/>
+            <a:ext cx="8976946" cy="4708981"/>
           </a:xfrm>
           <a:prstGeom prst="rect">
             <a:avLst/>
@@ -4347,6 +4348,16 @@
               <a:buAutoNum type="arabicPeriod"/>
             </a:pPr>
             <a:r>
+              <a:rPr lang="en-US" sz="2000" dirty="0"/>
+              <a:t>Banco de Dados:</a:t>
+            </a:r>
+          </a:p>
+          <a:p>
+            <a:pPr marL="342900" indent="-342900">
+              <a:buFont typeface="Arial" panose="020B0604020202020204" pitchFamily="34" charset="0"/>
+              <a:buChar char="•"/>
+            </a:pPr>
+            <a:r>
               <a:rPr lang="en-US" sz="2000" dirty="0" err="1"/>
               <a:t>Crie</a:t>
             </a:r>
@@ -4360,7 +4371,15 @@
             </a:r>
             <a:r>
               <a:rPr lang="en-US" sz="2000" dirty="0"/>
-              <a:t> ‘database1’ </a:t>
+              <a:t> ‘</a:t>
+            </a:r>
+            <a:r>
+              <a:rPr lang="en-US" sz="2000" dirty="0" err="1"/>
+              <a:t>streaming_db</a:t>
+            </a:r>
+            <a:r>
+              <a:rPr lang="en-US" sz="2000" dirty="0"/>
+              <a:t>’ </a:t>
             </a:r>
             <a:r>
               <a:rPr lang="en-US" sz="2000" dirty="0" err="1"/>
@@ -4421,7 +4440,8 @@
           </a:p>
           <a:p>
             <a:pPr marL="342900" indent="-342900">
-              <a:buAutoNum type="arabicPeriod"/>
+              <a:buFont typeface="Arial" panose="020B0604020202020204" pitchFamily="34" charset="0"/>
+              <a:buChar char="•"/>
             </a:pPr>
             <a:r>
               <a:rPr lang="en-US" sz="2000" dirty="0"/>
@@ -4454,8 +4474,29 @@
           </a:p>
           <a:p>
             <a:pPr marL="342900" indent="-342900">
-              <a:buAutoNum type="arabicPeriod"/>
+              <a:buFont typeface="Arial" panose="020B0604020202020204" pitchFamily="34" charset="0"/>
+              <a:buChar char="•"/>
             </a:pPr>
+            <a:endParaRPr lang="en-US" sz="2000" dirty="0"/>
+          </a:p>
+          <a:p>
+            <a:pPr marL="457200" indent="-457200">
+              <a:buAutoNum type="arabicPeriod" startAt="2"/>
+            </a:pPr>
+            <a:r>
+              <a:rPr lang="en-US" sz="2000" dirty="0" err="1"/>
+              <a:t>Tabela</a:t>
+            </a:r>
+            <a:r>
+              <a:rPr lang="en-US" sz="2000" dirty="0"/>
+              <a:t>:</a:t>
+            </a:r>
+          </a:p>
+          <a:p>
+            <a:pPr marL="342900" indent="-342900">
+              <a:buFont typeface="Arial" panose="020B0604020202020204" pitchFamily="34" charset="0"/>
+              <a:buChar char="•"/>
+            </a:pPr>
             <a:r>
               <a:rPr lang="en-US" sz="2000" dirty="0" err="1"/>
               <a:t>Crie</a:t>
@@ -4478,11 +4519,19 @@
             </a:r>
             <a:r>
               <a:rPr lang="en-US" sz="2000" dirty="0"/>
-              <a:t> ‘Pessoa’, </a:t>
-            </a:r>
-            <a:r>
-              <a:rPr lang="en-US" sz="2000" dirty="0" err="1"/>
-              <a:t>esta</a:t>
+              <a:t> ‘</a:t>
+            </a:r>
+            <a:r>
+              <a:rPr lang="en-US" sz="2000" dirty="0" err="1"/>
+              <a:t>Filme</a:t>
+            </a:r>
+            <a:r>
+              <a:rPr lang="en-US" sz="2000" dirty="0"/>
+              <a:t>’, </a:t>
+            </a:r>
+            <a:r>
+              <a:rPr lang="en-US" sz="2000" dirty="0" err="1"/>
+              <a:t>que</a:t>
             </a:r>
             <a:r>
               <a:rPr lang="en-US" sz="2000" dirty="0"/>
@@ -4490,7 +4539,7 @@
             </a:r>
             <a:r>
               <a:rPr lang="en-US" sz="2000" dirty="0" err="1"/>
-              <a:t>tabela</a:t>
+              <a:t>deve</a:t>
             </a:r>
             <a:r>
               <a:rPr lang="en-US" sz="2000" dirty="0"/>
@@ -4498,7 +4547,15 @@
             </a:r>
             <a:r>
               <a:rPr lang="en-US" sz="2000" dirty="0" err="1"/>
-              <a:t>deve</a:t>
+              <a:t>conter</a:t>
+            </a:r>
+            <a:r>
+              <a:rPr lang="en-US" sz="2000" dirty="0"/>
+              <a:t> um </a:t>
+            </a:r>
+            <a:r>
+              <a:rPr lang="en-US" sz="2000" dirty="0" err="1"/>
+              <a:t>identificador</a:t>
             </a:r>
             <a:r>
               <a:rPr lang="en-US" sz="2000" dirty="0"/>
@@ -4506,15 +4563,7 @@
             </a:r>
             <a:r>
               <a:rPr lang="en-US" sz="2000" dirty="0" err="1"/>
-              <a:t>conter</a:t>
-            </a:r>
-            <a:r>
-              <a:rPr lang="en-US" sz="2000" dirty="0"/>
-              <a:t> um </a:t>
-            </a:r>
-            <a:r>
-              <a:rPr lang="en-US" sz="2000" dirty="0" err="1"/>
-              <a:t>identificador</a:t>
+              <a:t>único</a:t>
             </a:r>
             <a:r>
               <a:rPr lang="en-US" sz="2000" dirty="0"/>
@@ -4522,7 +4571,97 @@
             </a:r>
             <a:r>
               <a:rPr lang="en-US" sz="2000" dirty="0" err="1"/>
-              <a:t>único</a:t>
+              <a:t>obrigatório</a:t>
+            </a:r>
+            <a:r>
+              <a:rPr lang="en-US" sz="2000" dirty="0"/>
+              <a:t> e auto-incremental, um </a:t>
+            </a:r>
+            <a:r>
+              <a:rPr lang="en-US" sz="2000" dirty="0" err="1"/>
+              <a:t>título</a:t>
+            </a:r>
+            <a:r>
+              <a:rPr lang="en-US" sz="2000" dirty="0"/>
+              <a:t> (20 </a:t>
+            </a:r>
+            <a:r>
+              <a:rPr lang="en-US" sz="2000" dirty="0" err="1"/>
+              <a:t>caracteres</a:t>
+            </a:r>
+            <a:r>
+              <a:rPr lang="en-US" sz="2000" dirty="0"/>
+              <a:t>), um </a:t>
+            </a:r>
+            <a:r>
+              <a:rPr lang="en-US" sz="2000" dirty="0" err="1"/>
+              <a:t>gênero</a:t>
+            </a:r>
+            <a:r>
+              <a:rPr lang="en-US" sz="2000" dirty="0"/>
+              <a:t> (30 </a:t>
+            </a:r>
+            <a:r>
+              <a:rPr lang="en-US" sz="2000" dirty="0" err="1"/>
+              <a:t>caracteres</a:t>
+            </a:r>
+            <a:r>
+              <a:rPr lang="en-US" sz="2000" dirty="0"/>
+              <a:t>) e o </a:t>
+            </a:r>
+            <a:r>
+              <a:rPr lang="en-US" sz="2000" dirty="0" err="1"/>
+              <a:t>ano</a:t>
+            </a:r>
+            <a:r>
+              <a:rPr lang="en-US" sz="2000" dirty="0"/>
+              <a:t> de </a:t>
+            </a:r>
+            <a:r>
+              <a:rPr lang="en-US" sz="2000" dirty="0" err="1"/>
+              <a:t>lançamento</a:t>
+            </a:r>
+            <a:r>
+              <a:rPr lang="en-US" sz="2000" dirty="0"/>
+              <a:t> (</a:t>
+            </a:r>
+            <a:r>
+              <a:rPr lang="en-US" sz="2000" dirty="0" err="1"/>
+              <a:t>obrigatório</a:t>
+            </a:r>
+            <a:r>
+              <a:rPr lang="en-US" sz="2000" dirty="0"/>
+              <a:t>);</a:t>
+            </a:r>
+          </a:p>
+          <a:p>
+            <a:pPr marL="342900" indent="-342900">
+              <a:buFont typeface="Arial" panose="020B0604020202020204" pitchFamily="34" charset="0"/>
+              <a:buChar char="•"/>
+            </a:pPr>
+            <a:endParaRPr lang="en-US" sz="2000" dirty="0"/>
+          </a:p>
+          <a:p>
+            <a:pPr marL="457200" indent="-457200">
+              <a:buAutoNum type="arabicPeriod" startAt="3"/>
+            </a:pPr>
+            <a:r>
+              <a:rPr lang="en-US" sz="2000" dirty="0" err="1"/>
+              <a:t>Manutenção</a:t>
+            </a:r>
+            <a:r>
+              <a:rPr lang="en-US" sz="2000" dirty="0"/>
+              <a:t>:</a:t>
+            </a:r>
+          </a:p>
+          <a:p>
+            <a:pPr marL="342900" indent="-342900">
+              <a:buFont typeface="Arial" panose="020B0604020202020204" pitchFamily="34" charset="0"/>
+              <a:buChar char="•"/>
+            </a:pPr>
+            <a:r>
+              <a:rPr lang="en-US" sz="2000" dirty="0" err="1"/>
+              <a:t>Inclua</a:t>
             </a:r>
             <a:r>
               <a:rPr lang="en-US" sz="2000" dirty="0"/>
@@ -4530,19 +4669,57 @@
             </a:r>
             <a:r>
               <a:rPr lang="en-US" sz="2000" dirty="0" err="1"/>
-              <a:t>obrigatório</a:t>
-            </a:r>
-            <a:r>
-              <a:rPr lang="en-US" sz="2000" dirty="0"/>
-              <a:t> e auto-incremental, um </a:t>
-            </a:r>
-            <a:r>
-              <a:rPr lang="en-US" sz="2000" dirty="0" err="1"/>
-              <a:t>nome</a:t>
-            </a:r>
-            <a:r>
-              <a:rPr lang="en-US" sz="2000" dirty="0"/>
-              <a:t> (40 </a:t>
+              <a:t>uma</a:t>
+            </a:r>
+            <a:r>
+              <a:rPr lang="en-US" sz="2000" dirty="0"/>
+              <a:t> nova </a:t>
+            </a:r>
+            <a:r>
+              <a:rPr lang="en-US" sz="2000" dirty="0" err="1"/>
+              <a:t>coluna</a:t>
+            </a:r>
+            <a:r>
+              <a:rPr lang="en-US" sz="2000" dirty="0"/>
+              <a:t> para a </a:t>
+            </a:r>
+            <a:r>
+              <a:rPr lang="en-US" sz="2000" dirty="0" err="1"/>
+              <a:t>classificação</a:t>
+            </a:r>
+            <a:r>
+              <a:rPr lang="en-US" sz="2000" dirty="0"/>
+              <a:t> </a:t>
+            </a:r>
+            <a:r>
+              <a:rPr lang="en-US" sz="2000" dirty="0" err="1"/>
+              <a:t>etária</a:t>
+            </a:r>
+            <a:r>
+              <a:rPr lang="en-US" sz="2000" dirty="0"/>
+              <a:t>;</a:t>
+            </a:r>
+          </a:p>
+          <a:p>
+            <a:pPr marL="342900" indent="-342900">
+              <a:buFont typeface="Arial" panose="020B0604020202020204" pitchFamily="34" charset="0"/>
+              <a:buChar char="•"/>
+            </a:pPr>
+            <a:r>
+              <a:rPr lang="en-US" sz="2000" dirty="0" err="1"/>
+              <a:t>Percebeu</a:t>
+            </a:r>
+            <a:r>
+              <a:rPr lang="en-US" sz="2000" dirty="0"/>
+              <a:t>-se </a:t>
+            </a:r>
+            <a:r>
+              <a:rPr lang="en-US" sz="2000" dirty="0" err="1"/>
+              <a:t>que</a:t>
+            </a:r>
+            <a:r>
+              <a:rPr lang="en-US" sz="2000" dirty="0"/>
+              <a:t> 20 </a:t>
             </a:r>
             <a:r>
               <a:rPr lang="en-US" sz="2000" dirty="0" err="1"/>
@@ -4550,19 +4727,11 @@
             </a:r>
             <a:r>
               <a:rPr lang="en-US" sz="2000" dirty="0"/>
-              <a:t>), um campo de </a:t>
-            </a:r>
-            <a:r>
-              <a:rPr lang="en-US" sz="2000" dirty="0" err="1"/>
-              <a:t>endereço</a:t>
-            </a:r>
-            <a:r>
-              <a:rPr lang="en-US" sz="2000" dirty="0"/>
-              <a:t> e </a:t>
-            </a:r>
-            <a:r>
-              <a:rPr lang="en-US" sz="2000" dirty="0" err="1"/>
-              <a:t>uma</a:t>
+              <a:t> para o </a:t>
+            </a:r>
+            <a:r>
+              <a:rPr lang="en-US" sz="2000" dirty="0" err="1"/>
+              <a:t>título</a:t>
             </a:r>
             <a:r>
               <a:rPr lang="en-US" sz="2000" dirty="0"/>
@@ -4570,57 +4739,7 @@
             </a:r>
             <a:r>
               <a:rPr lang="en-US" sz="2000" dirty="0" err="1"/>
-              <a:t>profissão</a:t>
-            </a:r>
-            <a:r>
-              <a:rPr lang="en-US" sz="2000" dirty="0"/>
-              <a:t> (</a:t>
-            </a:r>
-            <a:r>
-              <a:rPr lang="en-US" sz="2000" dirty="0" err="1"/>
-              <a:t>obrigatório</a:t>
-            </a:r>
-            <a:r>
-              <a:rPr lang="en-US" sz="2000" dirty="0"/>
-              <a:t>);</a:t>
-            </a:r>
-          </a:p>
-          <a:p>
-            <a:pPr marL="342900" indent="-342900">
-              <a:buAutoNum type="arabicPeriod"/>
-            </a:pPr>
-            <a:r>
-              <a:rPr lang="en-US" sz="2000" dirty="0" err="1"/>
-              <a:t>Faça</a:t>
-            </a:r>
-            <a:r>
-              <a:rPr lang="en-US" sz="2000" dirty="0"/>
-              <a:t> a </a:t>
-            </a:r>
-            <a:r>
-              <a:rPr lang="en-US" sz="2000" dirty="0" err="1"/>
-              <a:t>inserção</a:t>
-            </a:r>
-            <a:r>
-              <a:rPr lang="en-US" sz="2000" dirty="0"/>
-              <a:t> de 3 </a:t>
-            </a:r>
-            <a:r>
-              <a:rPr lang="en-US" sz="2000" dirty="0" err="1"/>
-              <a:t>pessoas</a:t>
-            </a:r>
-            <a:r>
-              <a:rPr lang="en-US" sz="2000" dirty="0"/>
-              <a:t>;</a:t>
-            </a:r>
-          </a:p>
-          <a:p>
-            <a:pPr marL="342900" indent="-342900">
-              <a:buAutoNum type="arabicPeriod"/>
-            </a:pPr>
-            <a:r>
-              <a:rPr lang="en-US" sz="2000" dirty="0" err="1"/>
-              <a:t>Inclua</a:t>
+              <a:t>são</a:t>
             </a:r>
             <a:r>
               <a:rPr lang="en-US" sz="2000" dirty="0"/>
@@ -4628,266 +4747,19 @@
             </a:r>
             <a:r>
               <a:rPr lang="en-US" sz="2000" dirty="0" err="1"/>
-              <a:t>uma</a:t>
-            </a:r>
-            <a:r>
-              <a:rPr lang="en-US" sz="2000" dirty="0"/>
-              <a:t> nova </a:t>
-            </a:r>
-            <a:r>
-              <a:rPr lang="en-US" sz="2000" dirty="0" err="1"/>
-              <a:t>coluna</a:t>
-            </a:r>
-            <a:r>
-              <a:rPr lang="en-US" sz="2000" dirty="0"/>
-              <a:t> para o </a:t>
-            </a:r>
-            <a:r>
-              <a:rPr lang="en-US" sz="2000" dirty="0" err="1"/>
-              <a:t>telefone</a:t>
-            </a:r>
-            <a:r>
-              <a:rPr lang="en-US" sz="2000" dirty="0"/>
-              <a:t>;</a:t>
-            </a:r>
-          </a:p>
-          <a:p>
-            <a:pPr marL="342900" indent="-342900">
-              <a:buAutoNum type="arabicPeriod"/>
-            </a:pPr>
-            <a:r>
-              <a:rPr lang="en-US" sz="2000" dirty="0" err="1"/>
-              <a:t>Exclua</a:t>
-            </a:r>
-            <a:r>
-              <a:rPr lang="en-US" sz="2000" dirty="0"/>
-              <a:t> a </a:t>
-            </a:r>
-            <a:r>
-              <a:rPr lang="en-US" sz="2000" dirty="0" err="1"/>
-              <a:t>coluna</a:t>
-            </a:r>
-            <a:r>
-              <a:rPr lang="en-US" sz="2000" dirty="0"/>
-              <a:t> de </a:t>
-            </a:r>
-            <a:r>
-              <a:rPr lang="en-US" sz="2000" dirty="0" err="1"/>
-              <a:t>endereço</a:t>
-            </a:r>
-            <a:r>
-              <a:rPr lang="en-US" sz="2000" dirty="0"/>
-              <a:t>;</a:t>
-            </a:r>
-          </a:p>
-          <a:p>
-            <a:pPr marL="342900" indent="-342900">
-              <a:buAutoNum type="arabicPeriod"/>
-            </a:pPr>
-            <a:r>
-              <a:rPr lang="en-US" sz="2000" dirty="0" err="1"/>
-              <a:t>Atualize</a:t>
-            </a:r>
-            <a:r>
-              <a:rPr lang="en-US" sz="2000" dirty="0"/>
-              <a:t> as </a:t>
-            </a:r>
-            <a:r>
-              <a:rPr lang="en-US" sz="2000" dirty="0" err="1"/>
-              <a:t>pessoas</a:t>
-            </a:r>
-            <a:r>
-              <a:rPr lang="en-US" sz="2000" dirty="0"/>
-              <a:t> </a:t>
-            </a:r>
-            <a:r>
-              <a:rPr lang="en-US" sz="2000" dirty="0" err="1"/>
-              <a:t>adicionando</a:t>
-            </a:r>
-            <a:r>
-              <a:rPr lang="en-US" sz="2000" dirty="0"/>
-              <a:t> </a:t>
-            </a:r>
-            <a:r>
-              <a:rPr lang="en-US" sz="2000" dirty="0" err="1"/>
-              <a:t>telefone</a:t>
-            </a:r>
-            <a:r>
-              <a:rPr lang="en-US" sz="2000" dirty="0"/>
-              <a:t> para as duas </a:t>
-            </a:r>
-            <a:r>
-              <a:rPr lang="en-US" sz="2000" dirty="0" err="1"/>
-              <a:t>últimas</a:t>
-            </a:r>
-            <a:r>
-              <a:rPr lang="en-US" sz="2000" dirty="0"/>
-              <a:t>;</a:t>
-            </a:r>
-          </a:p>
-          <a:p>
-            <a:pPr marL="342900" indent="-342900">
-              <a:buAutoNum type="arabicPeriod"/>
-            </a:pPr>
-            <a:r>
-              <a:rPr lang="en-US" sz="2000" dirty="0" err="1"/>
-              <a:t>Modifique</a:t>
-            </a:r>
-            <a:r>
-              <a:rPr lang="en-US" sz="2000" dirty="0"/>
-              <a:t> a </a:t>
-            </a:r>
-            <a:r>
-              <a:rPr lang="en-US" sz="2000" dirty="0" err="1"/>
-              <a:t>capacidade</a:t>
-            </a:r>
-            <a:r>
-              <a:rPr lang="en-US" sz="2000" dirty="0"/>
-              <a:t> do </a:t>
-            </a:r>
-            <a:r>
-              <a:rPr lang="en-US" sz="2000" dirty="0" err="1"/>
-              <a:t>tipo</a:t>
-            </a:r>
-            <a:r>
-              <a:rPr lang="en-US" sz="2000" dirty="0"/>
-              <a:t> do campo ‘</a:t>
-            </a:r>
-            <a:r>
-              <a:rPr lang="en-US" sz="2000" dirty="0" err="1"/>
-              <a:t>nome</a:t>
-            </a:r>
-            <a:r>
-              <a:rPr lang="en-US" sz="2000" dirty="0"/>
-              <a:t>’ para 30;</a:t>
-            </a:r>
-          </a:p>
-          <a:p>
-            <a:pPr marL="342900" indent="-342900">
-              <a:buAutoNum type="arabicPeriod"/>
-            </a:pPr>
-            <a:r>
-              <a:rPr lang="en-US" sz="2000" dirty="0" err="1"/>
-              <a:t>Exclua</a:t>
-            </a:r>
-            <a:r>
-              <a:rPr lang="en-US" sz="2000" dirty="0"/>
-              <a:t> a </a:t>
-            </a:r>
-            <a:r>
-              <a:rPr lang="en-US" sz="2000" dirty="0" err="1"/>
-              <a:t>primeira</a:t>
-            </a:r>
-            <a:r>
-              <a:rPr lang="en-US" sz="2000" dirty="0"/>
-              <a:t> </a:t>
-            </a:r>
-            <a:r>
-              <a:rPr lang="en-US" sz="2000" dirty="0" err="1"/>
-              <a:t>pessoa</a:t>
-            </a:r>
-            <a:r>
-              <a:rPr lang="en-US" sz="2000" dirty="0"/>
-              <a:t>;</a:t>
-            </a:r>
-          </a:p>
-          <a:p>
-            <a:pPr marL="342900" indent="-342900">
-              <a:buAutoNum type="arabicPeriod"/>
-            </a:pPr>
-            <a:r>
-              <a:rPr lang="en-US" sz="2000" dirty="0"/>
-              <a:t> </a:t>
-            </a:r>
-            <a:r>
-              <a:rPr lang="en-US" sz="2000" dirty="0" err="1"/>
-              <a:t>Mostre</a:t>
-            </a:r>
-            <a:r>
-              <a:rPr lang="en-US" sz="2000" dirty="0"/>
-              <a:t> </a:t>
-            </a:r>
-            <a:r>
-              <a:rPr lang="en-US" sz="2000" dirty="0" err="1"/>
-              <a:t>todos</a:t>
-            </a:r>
-            <a:r>
-              <a:rPr lang="en-US" sz="2000" dirty="0"/>
-              <a:t> </a:t>
-            </a:r>
-            <a:r>
-              <a:rPr lang="en-US" sz="2000" dirty="0" err="1"/>
-              <a:t>os</a:t>
-            </a:r>
-            <a:r>
-              <a:rPr lang="en-US" sz="2000" dirty="0"/>
-              <a:t> dados;</a:t>
-            </a:r>
-          </a:p>
-          <a:p>
-            <a:pPr marL="342900" indent="-342900">
-              <a:buAutoNum type="arabicPeriod"/>
-            </a:pPr>
-            <a:r>
-              <a:rPr lang="en-US" sz="2000" dirty="0"/>
-              <a:t> Delete </a:t>
-            </a:r>
-            <a:r>
-              <a:rPr lang="en-US" sz="2000" dirty="0" err="1"/>
-              <a:t>todos</a:t>
-            </a:r>
-            <a:r>
-              <a:rPr lang="en-US" sz="2000" dirty="0"/>
-              <a:t> </a:t>
-            </a:r>
-            <a:r>
-              <a:rPr lang="en-US" sz="2000" dirty="0" err="1"/>
-              <a:t>os</a:t>
-            </a:r>
-            <a:r>
-              <a:rPr lang="en-US" sz="2000" dirty="0"/>
-              <a:t> dados das </a:t>
-            </a:r>
-            <a:r>
-              <a:rPr lang="en-US" sz="2000" dirty="0" err="1"/>
-              <a:t>tabelas</a:t>
-            </a:r>
-            <a:r>
-              <a:rPr lang="en-US" sz="2000" dirty="0"/>
-              <a:t> com um </a:t>
-            </a:r>
-            <a:r>
-              <a:rPr lang="en-US" sz="2000" dirty="0" err="1"/>
-              <a:t>comando</a:t>
-            </a:r>
-            <a:r>
-              <a:rPr lang="en-US" sz="2000" dirty="0"/>
-              <a:t>.</a:t>
-            </a:r>
-          </a:p>
-          <a:p>
-            <a:endParaRPr lang="en-US" sz="2000" dirty="0"/>
-          </a:p>
-          <a:p>
-            <a:r>
-              <a:rPr lang="en-US" sz="2000" dirty="0"/>
-              <a:t>OBS: </a:t>
-            </a:r>
-            <a:r>
-              <a:rPr lang="en-US" sz="2000" dirty="0" err="1"/>
-              <a:t>Não</a:t>
-            </a:r>
-            <a:r>
-              <a:rPr lang="en-US" sz="2000" dirty="0"/>
-              <a:t> se </a:t>
-            </a:r>
-            <a:r>
-              <a:rPr lang="en-US" sz="2000" dirty="0" err="1"/>
-              <a:t>esqueça</a:t>
-            </a:r>
-            <a:r>
-              <a:rPr lang="en-US" sz="2000" dirty="0"/>
-              <a:t> de usar SET SQL_SAFE_UPDATES = 0;</a:t>
+              <a:t>insuficientes</a:t>
+            </a:r>
+            <a:r>
+              <a:rPr lang="en-US" sz="2000" dirty="0"/>
+              <a:t>, </a:t>
+            </a:r>
+            <a:r>
+              <a:rPr lang="en-US" sz="2000" dirty="0" err="1"/>
+              <a:t>aumente</a:t>
+            </a:r>
+            <a:r>
+              <a:rPr lang="en-US" sz="2000" dirty="0"/>
+              <a:t> para 60;</a:t>
             </a:r>
           </a:p>
         </p:txBody>
@@ -4906,6 +4778,527 @@
 </file>
 
 <file path=ppt/slides/slide11.xml><?xml version="1.0" encoding="utf-8"?>
+<p:sld xmlns:a="http://schemas.openxmlformats.org/drawingml/2006/main" xmlns:r="http://schemas.openxmlformats.org/officeDocument/2006/relationships" xmlns:p="http://schemas.openxmlformats.org/presentationml/2006/main">
+  <p:cSld>
+    <p:spTree>
+      <p:nvGrpSpPr>
+        <p:cNvPr id="1" name="">
+          <a:extLst>
+            <a:ext uri="{FF2B5EF4-FFF2-40B4-BE49-F238E27FC236}">
+              <a16:creationId xmlns:a16="http://schemas.microsoft.com/office/drawing/2014/main" id="{B7A19E49-E462-BDC9-428F-B0EF13D0E328}"/>
+            </a:ext>
+          </a:extLst>
+        </p:cNvPr>
+        <p:cNvGrpSpPr/>
+        <p:nvPr/>
+      </p:nvGrpSpPr>
+      <p:grpSpPr>
+        <a:xfrm>
+          <a:off x="0" y="0"/>
+          <a:ext cx="0" cy="0"/>
+          <a:chOff x="0" y="0"/>
+          <a:chExt cx="0" cy="0"/>
+        </a:xfrm>
+      </p:grpSpPr>
+      <p:pic>
+        <p:nvPicPr>
+          <p:cNvPr id="5" name="Imagem 4">
+            <a:extLst>
+              <a:ext uri="{FF2B5EF4-FFF2-40B4-BE49-F238E27FC236}">
+                <a16:creationId xmlns:a16="http://schemas.microsoft.com/office/drawing/2014/main" id="{70A02F65-5CC2-47A4-BD18-AA2E43AB67FC}"/>
+              </a:ext>
+            </a:extLst>
+          </p:cNvPr>
+          <p:cNvPicPr>
+            <a:picLocks noChangeAspect="1"/>
+          </p:cNvPicPr>
+          <p:nvPr/>
+        </p:nvPicPr>
+        <p:blipFill>
+          <a:blip r:embed="rId2">
+            <a:extLst>
+              <a:ext uri="{28A0092B-C50C-407E-A947-70E740481C1C}">
+                <a14:useLocalDpi xmlns:a14="http://schemas.microsoft.com/office/drawing/2010/main" val="0"/>
+              </a:ext>
+            </a:extLst>
+          </a:blip>
+          <a:stretch>
+            <a:fillRect/>
+          </a:stretch>
+        </p:blipFill>
+        <p:spPr>
+          <a:xfrm>
+            <a:off x="0" y="0"/>
+            <a:ext cx="12192000" cy="6858000"/>
+          </a:xfrm>
+          <a:prstGeom prst="rect">
+            <a:avLst/>
+          </a:prstGeom>
+        </p:spPr>
+      </p:pic>
+      <p:sp>
+        <p:nvSpPr>
+          <p:cNvPr id="2" name="CaixaDeTexto 1">
+            <a:extLst>
+              <a:ext uri="{FF2B5EF4-FFF2-40B4-BE49-F238E27FC236}">
+                <a16:creationId xmlns:a16="http://schemas.microsoft.com/office/drawing/2014/main" id="{2E097277-0FA1-01BE-0D90-CA77001EF4A7}"/>
+              </a:ext>
+            </a:extLst>
+          </p:cNvPr>
+          <p:cNvSpPr txBox="1"/>
+          <p:nvPr/>
+        </p:nvSpPr>
+        <p:spPr>
+          <a:xfrm>
+            <a:off x="5186740" y="197595"/>
+            <a:ext cx="1818520" cy="646331"/>
+          </a:xfrm>
+          <a:prstGeom prst="rect">
+            <a:avLst/>
+          </a:prstGeom>
+          <a:noFill/>
+        </p:spPr>
+        <p:txBody>
+          <a:bodyPr wrap="square" rtlCol="0">
+            <a:spAutoFit/>
+          </a:bodyPr>
+          <a:lstStyle/>
+          <a:p>
+            <a:r>
+              <a:rPr lang="en-US" sz="3600" dirty="0" err="1"/>
+              <a:t>Exercício</a:t>
+            </a:r>
+            <a:endParaRPr lang="pt-BR" sz="3600" dirty="0"/>
+          </a:p>
+        </p:txBody>
+      </p:sp>
+      <p:sp>
+        <p:nvSpPr>
+          <p:cNvPr id="3" name="CaixaDeTexto 2">
+            <a:extLst>
+              <a:ext uri="{FF2B5EF4-FFF2-40B4-BE49-F238E27FC236}">
+                <a16:creationId xmlns:a16="http://schemas.microsoft.com/office/drawing/2014/main" id="{9ADDB81D-FAE6-589A-65E1-1615071252EA}"/>
+              </a:ext>
+            </a:extLst>
+          </p:cNvPr>
+          <p:cNvSpPr txBox="1"/>
+          <p:nvPr/>
+        </p:nvSpPr>
+        <p:spPr>
+          <a:xfrm>
+            <a:off x="1459523" y="1011115"/>
+            <a:ext cx="8976946" cy="4093428"/>
+          </a:xfrm>
+          <a:prstGeom prst="rect">
+            <a:avLst/>
+          </a:prstGeom>
+          <a:noFill/>
+        </p:spPr>
+        <p:txBody>
+          <a:bodyPr wrap="square" rtlCol="0">
+            <a:spAutoFit/>
+          </a:bodyPr>
+          <a:lstStyle/>
+          <a:p>
+            <a:r>
+              <a:rPr lang="en-US" sz="2000" dirty="0" err="1"/>
+              <a:t>Utilizando</a:t>
+            </a:r>
+            <a:r>
+              <a:rPr lang="en-US" sz="2000" dirty="0"/>
+              <a:t> </a:t>
+            </a:r>
+            <a:r>
+              <a:rPr lang="en-US" sz="2000" dirty="0" err="1"/>
+              <a:t>os</a:t>
+            </a:r>
+            <a:r>
+              <a:rPr lang="en-US" sz="2000" dirty="0"/>
+              <a:t> </a:t>
+            </a:r>
+            <a:r>
+              <a:rPr lang="en-US" sz="2000" dirty="0" err="1"/>
+              <a:t>conceitos</a:t>
+            </a:r>
+            <a:r>
+              <a:rPr lang="en-US" sz="2000" dirty="0"/>
+              <a:t> </a:t>
+            </a:r>
+            <a:r>
+              <a:rPr lang="en-US" sz="2000" dirty="0" err="1"/>
+              <a:t>abordados</a:t>
+            </a:r>
+            <a:r>
+              <a:rPr lang="en-US" sz="2000" dirty="0"/>
+              <a:t> </a:t>
+            </a:r>
+            <a:r>
+              <a:rPr lang="en-US" sz="2000" dirty="0" err="1"/>
+              <a:t>nesta</a:t>
+            </a:r>
+            <a:r>
+              <a:rPr lang="en-US" sz="2000" dirty="0"/>
+              <a:t> aula, </a:t>
+            </a:r>
+            <a:r>
+              <a:rPr lang="en-US" sz="2000" dirty="0" err="1"/>
+              <a:t>faça</a:t>
+            </a:r>
+            <a:r>
+              <a:rPr lang="en-US" sz="2000" dirty="0"/>
+              <a:t> o que se </a:t>
+            </a:r>
+            <a:r>
+              <a:rPr lang="en-US" sz="2000" dirty="0" err="1"/>
+              <a:t>pede</a:t>
+            </a:r>
+            <a:r>
+              <a:rPr lang="en-US" sz="2000" dirty="0"/>
+              <a:t>:</a:t>
+            </a:r>
+          </a:p>
+          <a:p>
+            <a:endParaRPr lang="en-US" sz="2000" dirty="0"/>
+          </a:p>
+          <a:p>
+            <a:r>
+              <a:rPr lang="en-US" sz="2000" dirty="0"/>
+              <a:t>4.   </a:t>
+            </a:r>
+            <a:r>
+              <a:rPr lang="en-US" sz="2000" dirty="0" err="1"/>
+              <a:t>Operação</a:t>
+            </a:r>
+            <a:r>
+              <a:rPr lang="en-US" sz="2000" dirty="0"/>
+              <a:t> de Dados:</a:t>
+            </a:r>
+          </a:p>
+          <a:p>
+            <a:pPr marL="342900" indent="-342900">
+              <a:buFont typeface="Arial" panose="020B0604020202020204" pitchFamily="34" charset="0"/>
+              <a:buChar char="•"/>
+            </a:pPr>
+            <a:r>
+              <a:rPr lang="en-US" sz="2000" dirty="0" err="1"/>
+              <a:t>Faça</a:t>
+            </a:r>
+            <a:r>
+              <a:rPr lang="en-US" sz="2000" dirty="0"/>
+              <a:t> a </a:t>
+            </a:r>
+            <a:r>
+              <a:rPr lang="en-US" sz="2000" dirty="0" err="1"/>
+              <a:t>inserção</a:t>
+            </a:r>
+            <a:r>
+              <a:rPr lang="en-US" sz="2000" dirty="0"/>
+              <a:t> de 3 </a:t>
+            </a:r>
+            <a:r>
+              <a:rPr lang="en-US" sz="2000" dirty="0" err="1"/>
+              <a:t>filmes</a:t>
+            </a:r>
+            <a:r>
+              <a:rPr lang="en-US" sz="2000" dirty="0"/>
+              <a:t>;</a:t>
+            </a:r>
+          </a:p>
+          <a:p>
+            <a:pPr marL="342900" indent="-342900">
+              <a:buFont typeface="Arial" panose="020B0604020202020204" pitchFamily="34" charset="0"/>
+              <a:buChar char="•"/>
+            </a:pPr>
+            <a:r>
+              <a:rPr lang="en-US" sz="2000" dirty="0" err="1"/>
+              <a:t>Desative</a:t>
+            </a:r>
+            <a:r>
+              <a:rPr lang="en-US" sz="2000" dirty="0"/>
+              <a:t> a </a:t>
+            </a:r>
+            <a:r>
+              <a:rPr lang="en-US" sz="2000" dirty="0" err="1"/>
+              <a:t>trava</a:t>
+            </a:r>
+            <a:r>
+              <a:rPr lang="en-US" sz="2000" dirty="0"/>
+              <a:t> de </a:t>
+            </a:r>
+            <a:r>
+              <a:rPr lang="en-US" sz="2000" dirty="0" err="1"/>
+              <a:t>segurança</a:t>
+            </a:r>
+            <a:r>
+              <a:rPr lang="en-US" sz="2000" dirty="0"/>
+              <a:t> de updates;</a:t>
+            </a:r>
+          </a:p>
+          <a:p>
+            <a:pPr marL="342900" indent="-342900">
+              <a:buFont typeface="Arial" panose="020B0604020202020204" pitchFamily="34" charset="0"/>
+              <a:buChar char="•"/>
+            </a:pPr>
+            <a:r>
+              <a:rPr lang="en-US" sz="2000" dirty="0" err="1"/>
+              <a:t>Atualize</a:t>
+            </a:r>
+            <a:r>
+              <a:rPr lang="en-US" sz="2000" dirty="0"/>
+              <a:t> o </a:t>
+            </a:r>
+            <a:r>
+              <a:rPr lang="en-US" sz="2000" dirty="0" err="1"/>
+              <a:t>gênero</a:t>
+            </a:r>
+            <a:r>
+              <a:rPr lang="en-US" sz="2000" dirty="0"/>
+              <a:t> de um dos </a:t>
+            </a:r>
+            <a:r>
+              <a:rPr lang="en-US" sz="2000" dirty="0" err="1"/>
+              <a:t>filmes</a:t>
+            </a:r>
+            <a:r>
+              <a:rPr lang="en-US" sz="2000" dirty="0"/>
+              <a:t> </a:t>
+            </a:r>
+            <a:r>
+              <a:rPr lang="en-US" sz="2000" dirty="0" err="1"/>
+              <a:t>inseridos</a:t>
+            </a:r>
+            <a:r>
+              <a:rPr lang="en-US" sz="2000" dirty="0"/>
+              <a:t>;</a:t>
+            </a:r>
+          </a:p>
+          <a:p>
+            <a:pPr marL="342900" indent="-342900">
+              <a:buFont typeface="Arial" panose="020B0604020202020204" pitchFamily="34" charset="0"/>
+              <a:buChar char="•"/>
+            </a:pPr>
+            <a:r>
+              <a:rPr lang="en-US" sz="2000" dirty="0"/>
+              <a:t>Delete </a:t>
+            </a:r>
+            <a:r>
+              <a:rPr lang="en-US" sz="2000" dirty="0" err="1"/>
+              <a:t>apenas</a:t>
+            </a:r>
+            <a:r>
+              <a:rPr lang="en-US" sz="2000" dirty="0"/>
+              <a:t> o </a:t>
+            </a:r>
+            <a:r>
+              <a:rPr lang="en-US" sz="2000" dirty="0" err="1"/>
+              <a:t>filme</a:t>
+            </a:r>
+            <a:r>
+              <a:rPr lang="en-US" sz="2000" dirty="0"/>
+              <a:t> </a:t>
+            </a:r>
+            <a:r>
+              <a:rPr lang="en-US" sz="2000" dirty="0" err="1"/>
+              <a:t>que</a:t>
+            </a:r>
+            <a:r>
+              <a:rPr lang="en-US" sz="2000" dirty="0"/>
+              <a:t> </a:t>
+            </a:r>
+            <a:r>
+              <a:rPr lang="en-US" sz="2000" dirty="0" err="1"/>
+              <a:t>tiver</a:t>
+            </a:r>
+            <a:r>
+              <a:rPr lang="en-US" sz="2000" dirty="0"/>
+              <a:t> o </a:t>
+            </a:r>
+            <a:r>
+              <a:rPr lang="en-US" sz="2000" dirty="0" err="1"/>
+              <a:t>primeiro</a:t>
+            </a:r>
+            <a:r>
+              <a:rPr lang="en-US" sz="2000" dirty="0"/>
+              <a:t> ID;</a:t>
+            </a:r>
+          </a:p>
+          <a:p>
+            <a:pPr marL="342900" indent="-342900">
+              <a:buFont typeface="Arial" panose="020B0604020202020204" pitchFamily="34" charset="0"/>
+              <a:buChar char="•"/>
+            </a:pPr>
+            <a:r>
+              <a:rPr lang="en-US" sz="2000" dirty="0" err="1"/>
+              <a:t>Mostre</a:t>
+            </a:r>
+            <a:r>
+              <a:rPr lang="en-US" sz="2000" dirty="0"/>
+              <a:t> </a:t>
+            </a:r>
+            <a:r>
+              <a:rPr lang="en-US" sz="2000" dirty="0" err="1"/>
+              <a:t>todos</a:t>
+            </a:r>
+            <a:r>
+              <a:rPr lang="en-US" sz="2000" dirty="0"/>
+              <a:t> </a:t>
+            </a:r>
+            <a:r>
+              <a:rPr lang="en-US" sz="2000" dirty="0" err="1"/>
+              <a:t>os</a:t>
+            </a:r>
+            <a:r>
+              <a:rPr lang="en-US" sz="2000" dirty="0"/>
+              <a:t> dados da </a:t>
+            </a:r>
+            <a:r>
+              <a:rPr lang="en-US" sz="2000" dirty="0" err="1"/>
+              <a:t>tabela</a:t>
+            </a:r>
+            <a:r>
+              <a:rPr lang="en-US" sz="2000" dirty="0"/>
+              <a:t> para </a:t>
+            </a:r>
+            <a:r>
+              <a:rPr lang="en-US" sz="2000" dirty="0" err="1"/>
+              <a:t>validar</a:t>
+            </a:r>
+            <a:r>
+              <a:rPr lang="en-US" sz="2000" dirty="0"/>
+              <a:t> as </a:t>
+            </a:r>
+            <a:r>
+              <a:rPr lang="en-US" sz="2000" dirty="0" err="1"/>
+              <a:t>operações</a:t>
+            </a:r>
+            <a:r>
+              <a:rPr lang="en-US" sz="2000" dirty="0"/>
+              <a:t>.</a:t>
+            </a:r>
+          </a:p>
+          <a:p>
+            <a:r>
+              <a:rPr lang="en-US" sz="2000" dirty="0"/>
+              <a:t>OBS: </a:t>
+            </a:r>
+            <a:r>
+              <a:rPr lang="en-US" sz="2000" dirty="0" err="1"/>
+              <a:t>Não</a:t>
+            </a:r>
+            <a:r>
+              <a:rPr lang="en-US" sz="2000" dirty="0"/>
+              <a:t> se </a:t>
+            </a:r>
+            <a:r>
+              <a:rPr lang="en-US" sz="2000" dirty="0" err="1"/>
+              <a:t>esqueça</a:t>
+            </a:r>
+            <a:r>
+              <a:rPr lang="en-US" sz="2000" dirty="0"/>
+              <a:t> de usar SET SQL_SAFE_UPDATES = 0.</a:t>
+            </a:r>
+          </a:p>
+          <a:p>
+            <a:endParaRPr lang="en-US" sz="2000" dirty="0"/>
+          </a:p>
+          <a:p>
+            <a:r>
+              <a:rPr lang="en-US" sz="2000" dirty="0"/>
+              <a:t>5. </a:t>
+            </a:r>
+            <a:r>
+              <a:rPr lang="en-US" sz="2000" dirty="0" err="1"/>
+              <a:t>Finalização</a:t>
+            </a:r>
+            <a:r>
+              <a:rPr lang="en-US" sz="2000" dirty="0"/>
+              <a:t>:</a:t>
+            </a:r>
+          </a:p>
+          <a:p>
+            <a:pPr marL="342900" indent="-342900">
+              <a:buFont typeface="Arial" panose="020B0604020202020204" pitchFamily="34" charset="0"/>
+              <a:buChar char="•"/>
+            </a:pPr>
+            <a:r>
+              <a:rPr lang="en-US" sz="2000" dirty="0"/>
+              <a:t>Use o commando SHOW para </a:t>
+            </a:r>
+            <a:r>
+              <a:rPr lang="en-US" sz="2000" dirty="0" err="1"/>
+              <a:t>visualizar</a:t>
+            </a:r>
+            <a:r>
+              <a:rPr lang="en-US" sz="2000" dirty="0"/>
+              <a:t> as </a:t>
+            </a:r>
+            <a:r>
+              <a:rPr lang="en-US" sz="2000" dirty="0" err="1"/>
+              <a:t>tabelas</a:t>
+            </a:r>
+            <a:r>
+              <a:rPr lang="en-US" sz="2000" dirty="0"/>
+              <a:t>;</a:t>
+            </a:r>
+          </a:p>
+          <a:p>
+            <a:pPr marL="342900" indent="-342900">
+              <a:buFont typeface="Arial" panose="020B0604020202020204" pitchFamily="34" charset="0"/>
+              <a:buChar char="•"/>
+            </a:pPr>
+            <a:r>
+              <a:rPr lang="en-US" sz="2000" dirty="0"/>
+              <a:t>Use UM </a:t>
+            </a:r>
+            <a:r>
+              <a:rPr lang="en-US" sz="2000" dirty="0" err="1"/>
+              <a:t>comando</a:t>
+            </a:r>
+            <a:r>
+              <a:rPr lang="en-US" sz="2000" dirty="0"/>
+              <a:t> para remover </a:t>
+            </a:r>
+            <a:r>
+              <a:rPr lang="en-US" sz="2000" dirty="0" err="1"/>
+              <a:t>todos</a:t>
+            </a:r>
+            <a:r>
+              <a:rPr lang="en-US" sz="2000" dirty="0"/>
+              <a:t> </a:t>
+            </a:r>
+            <a:r>
+              <a:rPr lang="en-US" sz="2000" dirty="0" err="1"/>
+              <a:t>os</a:t>
+            </a:r>
+            <a:r>
+              <a:rPr lang="en-US" sz="2000" dirty="0"/>
+              <a:t> Registros da </a:t>
+            </a:r>
+            <a:r>
+              <a:rPr lang="en-US" sz="2000" dirty="0" err="1"/>
+              <a:t>tabela</a:t>
+            </a:r>
+            <a:r>
+              <a:rPr lang="en-US" sz="2000" dirty="0"/>
+              <a:t>.</a:t>
+            </a:r>
+          </a:p>
+        </p:txBody>
+      </p:sp>
+    </p:spTree>
+    <p:extLst>
+      <p:ext uri="{BB962C8B-B14F-4D97-AF65-F5344CB8AC3E}">
+        <p14:creationId xmlns:p14="http://schemas.microsoft.com/office/powerpoint/2010/main" val="1238809061"/>
+      </p:ext>
+    </p:extLst>
+  </p:cSld>
+  <p:clrMapOvr>
+    <a:masterClrMapping/>
+  </p:clrMapOvr>
+</p:sld>
+</file>
+
+<file path=ppt/slides/slide12.xml><?xml version="1.0" encoding="utf-8"?>
 <p:sld xmlns:a="http://schemas.openxmlformats.org/drawingml/2006/main" xmlns:r="http://schemas.openxmlformats.org/officeDocument/2006/relationships" xmlns:p="http://schemas.openxmlformats.org/presentationml/2006/main">
   <p:cSld>
     <p:spTree>
@@ -6940,8 +7333,8 @@
           </a:p>
         </p:txBody>
       </p:sp>
-      <mc:AlternateContent xmlns:mc="http://schemas.openxmlformats.org/markup-compatibility/2006">
-        <mc:Choice xmlns:p14="http://schemas.microsoft.com/office/powerpoint/2010/main" Requires="p14">
+      <mc:AlternateContent xmlns:mc="http://schemas.openxmlformats.org/markup-compatibility/2006" xmlns:p14="http://schemas.microsoft.com/office/powerpoint/2010/main">
+        <mc:Choice Requires="p14">
           <p:contentPart p14:bwMode="auto" r:id="rId10">
             <p14:nvContentPartPr>
               <p14:cNvPr id="2" name="Tinta 1">
@@ -6960,7 +7353,7 @@
             </p14:xfrm>
           </p:contentPart>
         </mc:Choice>
-        <mc:Fallback>
+        <mc:Fallback xmlns="">
           <p:pic>
             <p:nvPicPr>
               <p:cNvPr id="2" name="Tinta 1">
@@ -8789,7 +9182,7 @@
         <p:spPr>
           <a:xfrm>
             <a:off x="6268915" y="1178169"/>
-            <a:ext cx="5251939" cy="1908215"/>
+            <a:ext cx="5251939" cy="1538883"/>
           </a:xfrm>
           <a:prstGeom prst="rect">
             <a:avLst/>
@@ -8812,15 +9205,7 @@
             </a:r>
             <a:r>
               <a:rPr lang="en-US" sz="2400" dirty="0"/>
-              <a:t>– </a:t>
-            </a:r>
-            <a:r>
-              <a:rPr lang="en-US" sz="2400" dirty="0" err="1"/>
-              <a:t>opcional</a:t>
-            </a:r>
-            <a:r>
-              <a:rPr lang="en-US" sz="2400" dirty="0"/>
-              <a:t>, mas fundamental para </a:t>
+              <a:t>–  fundamental para </a:t>
             </a:r>
             <a:r>
               <a:rPr lang="en-US" sz="2400" dirty="0" err="1"/>
@@ -8860,31 +9245,7 @@
             </a:r>
             <a:r>
               <a:rPr lang="en-US" sz="2400" dirty="0"/>
-              <a:t> (</a:t>
-            </a:r>
-            <a:r>
-              <a:rPr lang="en-US" sz="2400" dirty="0" err="1"/>
-              <a:t>não</a:t>
-            </a:r>
-            <a:r>
-              <a:rPr lang="en-US" sz="2400" dirty="0"/>
-              <a:t> </a:t>
-            </a:r>
-            <a:r>
-              <a:rPr lang="en-US" sz="2400" dirty="0" err="1"/>
-              <a:t>pode</a:t>
-            </a:r>
-            <a:r>
-              <a:rPr lang="en-US" sz="2400" dirty="0"/>
-              <a:t> </a:t>
-            </a:r>
-            <a:r>
-              <a:rPr lang="en-US" sz="2400" dirty="0" err="1"/>
-              <a:t>ocorrer</a:t>
-            </a:r>
-            <a:r>
-              <a:rPr lang="en-US" sz="2400" dirty="0"/>
-              <a:t>).</a:t>
+              <a:t>.</a:t>
             </a:r>
           </a:p>
           <a:p>
@@ -8914,8 +9275,8 @@
         </p:blipFill>
         <p:spPr>
           <a:xfrm>
-            <a:off x="6320222" y="3253760"/>
-            <a:ext cx="5149324" cy="2795348"/>
+            <a:off x="6096000" y="2787161"/>
+            <a:ext cx="5749706" cy="3121270"/>
           </a:xfrm>
           <a:prstGeom prst="rect">
             <a:avLst/>

</xml_diff>